<commit_message>
updated figures on poster; rearranged a few sections.
</commit_message>
<xml_diff>
--- a/poster/poster.pptx
+++ b/poster/poster.pptx
@@ -562,7 +562,7 @@
               <a:pPr>
                 <a:defRPr/>
               </a:pPr>
-              <a:t>4/5/2015</a:t>
+              <a:t>4/6/2015</a:t>
             </a:fld>
             <a:endParaRPr lang="en-US"/>
           </a:p>
@@ -4252,289 +4252,14 @@
       </p:grpSpPr>
       <p:sp>
         <p:nvSpPr>
-          <p:cNvPr id="77" name="TextBox 76"/>
-          <p:cNvSpPr txBox="1"/>
-          <p:nvPr/>
-        </p:nvSpPr>
-        <p:spPr>
-          <a:xfrm>
-            <a:off x="662796" y="19499908"/>
-            <a:ext cx="13756588" cy="10910679"/>
-          </a:xfrm>
-          <a:prstGeom prst="rect">
-            <a:avLst/>
-          </a:prstGeom>
-          <a:noFill/>
-          <a:ln>
-            <a:solidFill>
-              <a:schemeClr val="bg1">
-                <a:lumMod val="65000"/>
-              </a:schemeClr>
-            </a:solidFill>
-          </a:ln>
-        </p:spPr>
-        <p:txBody>
-          <a:bodyPr wrap="square" lIns="137160" tIns="68580" rIns="137160" bIns="68580">
-            <a:spAutoFit/>
-          </a:bodyPr>
-          <a:lstStyle/>
-          <a:p>
-            <a:pPr algn="just">
-              <a:defRPr/>
-            </a:pPr>
-            <a:endParaRPr lang="en-US" sz="4000" dirty="0" smtClean="0">
-              <a:latin typeface="Arial" charset="0"/>
-            </a:endParaRPr>
-          </a:p>
-          <a:p>
-            <a:pPr algn="just">
-              <a:defRPr/>
-            </a:pPr>
-            <a:endParaRPr lang="en-US" sz="4000" dirty="0">
-              <a:latin typeface="Arial" charset="0"/>
-            </a:endParaRPr>
-          </a:p>
-          <a:p>
-            <a:pPr algn="just">
-              <a:defRPr/>
-            </a:pPr>
-            <a:endParaRPr lang="en-US" sz="4000" dirty="0" smtClean="0">
-              <a:latin typeface="Arial" charset="0"/>
-            </a:endParaRPr>
-          </a:p>
-          <a:p>
-            <a:pPr algn="just">
-              <a:defRPr/>
-            </a:pPr>
-            <a:endParaRPr lang="en-US" sz="4000" dirty="0" smtClean="0">
-              <a:latin typeface="Arial" charset="0"/>
-            </a:endParaRPr>
-          </a:p>
-          <a:p>
-            <a:pPr algn="just">
-              <a:defRPr/>
-            </a:pPr>
-            <a:endParaRPr lang="en-US" sz="4000" dirty="0">
-              <a:latin typeface="Arial" charset="0"/>
-            </a:endParaRPr>
-          </a:p>
-          <a:p>
-            <a:pPr algn="just">
-              <a:defRPr/>
-            </a:pPr>
-            <a:endParaRPr lang="en-US" sz="4000" dirty="0" smtClean="0">
-              <a:latin typeface="Arial" charset="0"/>
-            </a:endParaRPr>
-          </a:p>
-          <a:p>
-            <a:pPr algn="just">
-              <a:defRPr/>
-            </a:pPr>
-            <a:endParaRPr lang="en-US" sz="4000" dirty="0">
-              <a:latin typeface="Arial" charset="0"/>
-            </a:endParaRPr>
-          </a:p>
-          <a:p>
-            <a:pPr algn="just">
-              <a:defRPr/>
-            </a:pPr>
-            <a:endParaRPr lang="en-US" sz="4000" dirty="0" smtClean="0">
-              <a:latin typeface="Arial" charset="0"/>
-            </a:endParaRPr>
-          </a:p>
-          <a:p>
-            <a:pPr algn="just">
-              <a:defRPr/>
-            </a:pPr>
-            <a:endParaRPr lang="en-US" sz="4000" dirty="0">
-              <a:latin typeface="Arial" charset="0"/>
-            </a:endParaRPr>
-          </a:p>
-          <a:p>
-            <a:pPr algn="just">
-              <a:defRPr/>
-            </a:pPr>
-            <a:endParaRPr lang="en-US" sz="4000" dirty="0" smtClean="0">
-              <a:latin typeface="Arial" charset="0"/>
-            </a:endParaRPr>
-          </a:p>
-          <a:p>
-            <a:pPr algn="just">
-              <a:defRPr/>
-            </a:pPr>
-            <a:endParaRPr lang="en-US" sz="4000" dirty="0" smtClean="0">
-              <a:latin typeface="Arial" charset="0"/>
-            </a:endParaRPr>
-          </a:p>
-          <a:p>
-            <a:pPr algn="just">
-              <a:defRPr/>
-            </a:pPr>
-            <a:endParaRPr lang="en-US" sz="4000" dirty="0" smtClean="0">
-              <a:latin typeface="Arial" charset="0"/>
-            </a:endParaRPr>
-          </a:p>
-          <a:p>
-            <a:pPr algn="just">
-              <a:defRPr/>
-            </a:pPr>
-            <a:endParaRPr lang="en-US" sz="4000" dirty="0">
-              <a:latin typeface="Arial" charset="0"/>
-            </a:endParaRPr>
-          </a:p>
-          <a:p>
-            <a:pPr algn="just">
-              <a:defRPr/>
-            </a:pPr>
-            <a:endParaRPr lang="en-US" sz="3000" dirty="0" smtClean="0">
-              <a:latin typeface="Arial" charset="0"/>
-            </a:endParaRPr>
-          </a:p>
-          <a:p>
-            <a:pPr algn="just">
-              <a:defRPr/>
-            </a:pPr>
-            <a:endParaRPr lang="en-US" sz="3000" dirty="0" smtClean="0">
-              <a:latin typeface="Arial" charset="0"/>
-            </a:endParaRPr>
-          </a:p>
-          <a:p>
-            <a:pPr algn="just">
-              <a:defRPr/>
-            </a:pPr>
-            <a:endParaRPr lang="en-US" sz="3000" dirty="0" smtClean="0">
-              <a:latin typeface="Arial" charset="0"/>
-            </a:endParaRPr>
-          </a:p>
-          <a:p>
-            <a:pPr algn="just">
-              <a:defRPr/>
-            </a:pPr>
-            <a:endParaRPr lang="en-US" sz="3000" dirty="0" smtClean="0">
-              <a:latin typeface="Arial" charset="0"/>
-            </a:endParaRPr>
-          </a:p>
-          <a:p>
-            <a:pPr algn="just">
-              <a:defRPr/>
-            </a:pPr>
-            <a:r>
-              <a:rPr lang="en-US" sz="3000" b="1" dirty="0" smtClean="0">
-                <a:latin typeface="Arial" charset="0"/>
-              </a:rPr>
-              <a:t>Figure 1.</a:t>
-            </a:r>
-            <a:r>
-              <a:rPr lang="en-US" sz="3000" dirty="0" smtClean="0">
-                <a:latin typeface="Arial" charset="0"/>
-              </a:rPr>
-              <a:t> </a:t>
-            </a:r>
-            <a:r>
-              <a:rPr lang="en-US" sz="3000" dirty="0" smtClean="0">
-                <a:latin typeface="Arial" charset="0"/>
-              </a:rPr>
-              <a:t>Ward’s method of hierarchical </a:t>
-            </a:r>
-            <a:r>
-              <a:rPr lang="en-US" sz="3000" dirty="0" smtClean="0">
-                <a:latin typeface="Arial" charset="0"/>
-              </a:rPr>
-              <a:t>clustering </a:t>
-            </a:r>
-            <a:r>
-              <a:rPr lang="en-US" sz="3000" dirty="0" smtClean="0">
-                <a:latin typeface="Arial" charset="0"/>
-              </a:rPr>
-              <a:t>using the </a:t>
-            </a:r>
-            <a:r>
-              <a:rPr lang="en-US" sz="3000" dirty="0" smtClean="0">
-                <a:latin typeface="Arial" charset="0"/>
-              </a:rPr>
-              <a:t>Euclidean distance function </a:t>
-            </a:r>
-            <a:r>
-              <a:rPr lang="en-US" sz="3000" dirty="0" smtClean="0">
-                <a:latin typeface="Arial" charset="0"/>
-              </a:rPr>
-              <a:t>after removing probes </a:t>
-            </a:r>
-            <a:r>
-              <a:rPr lang="en-US" sz="3000" dirty="0" smtClean="0">
-                <a:latin typeface="Arial" charset="0"/>
-              </a:rPr>
-              <a:t>in </a:t>
-            </a:r>
-            <a:r>
-              <a:rPr lang="en-US" sz="3000" dirty="0" err="1" smtClean="0">
-                <a:latin typeface="Arial" charset="0"/>
-              </a:rPr>
-              <a:t>chrX</a:t>
-            </a:r>
-            <a:r>
-              <a:rPr lang="en-US" sz="3000" dirty="0" smtClean="0">
-                <a:latin typeface="Arial" charset="0"/>
-              </a:rPr>
-              <a:t> and those not in </a:t>
-            </a:r>
-            <a:r>
-              <a:rPr lang="en-US" sz="3000" dirty="0" err="1" smtClean="0">
-                <a:latin typeface="Arial" charset="0"/>
-              </a:rPr>
-              <a:t>CpG</a:t>
-            </a:r>
-            <a:r>
-              <a:rPr lang="en-US" sz="3000" dirty="0" smtClean="0">
-                <a:latin typeface="Arial" charset="0"/>
-              </a:rPr>
-              <a:t> islands. </a:t>
-            </a:r>
-            <a:endParaRPr lang="en-US" sz="3000" dirty="0">
-              <a:latin typeface="Arial" charset="0"/>
-            </a:endParaRPr>
-          </a:p>
-        </p:txBody>
-      </p:sp>
-      <p:pic>
-        <p:nvPicPr>
-          <p:cNvPr id="6" name="Picture 5"/>
-          <p:cNvPicPr>
-            <a:picLocks noChangeAspect="1"/>
-          </p:cNvPicPr>
-          <p:nvPr/>
-        </p:nvPicPr>
-        <p:blipFill rotWithShape="1">
-          <a:blip r:embed="rId3">
-            <a:extLst>
-              <a:ext uri="{28A0092B-C50C-407E-A947-70E740481C1C}">
-                <a14:useLocalDpi xmlns:a14="http://schemas.microsoft.com/office/drawing/2010/main" val="0"/>
-              </a:ext>
-            </a:extLst>
-          </a:blip>
-          <a:srcRect t="4818"/>
-          <a:stretch/>
-        </p:blipFill>
-        <p:spPr>
-          <a:xfrm>
-            <a:off x="871800" y="19715402"/>
-            <a:ext cx="13332110" cy="9517327"/>
-          </a:xfrm>
-          <a:prstGeom prst="rect">
-            <a:avLst/>
-          </a:prstGeom>
-        </p:spPr>
-      </p:pic>
-      <p:sp>
-        <p:nvSpPr>
-          <p:cNvPr id="2" name="Rectangle 1"/>
+          <p:cNvPr id="3" name="Rectangle 2"/>
           <p:cNvSpPr/>
           <p:nvPr/>
         </p:nvSpPr>
         <p:spPr bwMode="auto">
           <a:xfrm>
-            <a:off x="0" y="-19656"/>
-            <a:ext cx="43891200" cy="3663542"/>
+            <a:off x="0" y="0"/>
+            <a:ext cx="43891200" cy="3831771"/>
           </a:xfrm>
           <a:prstGeom prst="rect">
             <a:avLst/>
@@ -4543,20 +4268,15 @@
             <a:srgbClr val="000066"/>
           </a:solidFill>
           <a:ln w="9525" cap="flat" cmpd="sng" algn="ctr">
-            <a:noFill/>
+            <a:solidFill>
+              <a:srgbClr val="333399"/>
+            </a:solidFill>
             <a:prstDash val="solid"/>
             <a:round/>
             <a:headEnd type="none" w="med" len="med"/>
             <a:tailEnd type="none" w="med" len="med"/>
           </a:ln>
-          <a:effectLst>
-            <a:outerShdw blurRad="50800" dist="38100" dir="2700000" algn="tl" rotWithShape="0">
-              <a:prstClr val="black">
-                <a:alpha val="40000"/>
-              </a:prstClr>
-            </a:outerShdw>
-            <a:reflection blurRad="6350" stA="50000" endA="300" endPos="55000" dir="5400000" sy="-100000" algn="bl" rotWithShape="0"/>
-          </a:effectLst>
+          <a:effectLst/>
         </p:spPr>
         <p:txBody>
           <a:bodyPr vert="horz" wrap="square" lIns="91440" tIns="45720" rIns="91440" bIns="45720" numCol="1" rtlCol="0" anchor="t" anchorCtr="0" compatLnSpc="1">
@@ -4597,6 +4317,91 @@
       </p:sp>
       <p:sp>
         <p:nvSpPr>
+          <p:cNvPr id="77" name="TextBox 76"/>
+          <p:cNvSpPr txBox="1"/>
+          <p:nvPr/>
+        </p:nvSpPr>
+        <p:spPr>
+          <a:xfrm>
+            <a:off x="472296" y="28629225"/>
+            <a:ext cx="13697201" cy="1061829"/>
+          </a:xfrm>
+          <a:prstGeom prst="rect">
+            <a:avLst/>
+          </a:prstGeom>
+          <a:noFill/>
+          <a:ln>
+            <a:noFill/>
+          </a:ln>
+        </p:spPr>
+        <p:txBody>
+          <a:bodyPr wrap="square" lIns="137160" tIns="68580" rIns="137160" bIns="68580">
+            <a:spAutoFit/>
+          </a:bodyPr>
+          <a:lstStyle/>
+          <a:p>
+            <a:pPr algn="just">
+              <a:defRPr/>
+            </a:pPr>
+            <a:r>
+              <a:rPr lang="en-US" sz="3000" b="1" dirty="0" smtClean="0">
+                <a:latin typeface="Arial" charset="0"/>
+              </a:rPr>
+              <a:t>Figure </a:t>
+            </a:r>
+            <a:r>
+              <a:rPr lang="en-US" sz="3000" b="1" dirty="0" smtClean="0">
+                <a:latin typeface="Arial" charset="0"/>
+              </a:rPr>
+              <a:t>1.</a:t>
+            </a:r>
+            <a:r>
+              <a:rPr lang="en-US" sz="3000" dirty="0" smtClean="0">
+                <a:latin typeface="Arial" charset="0"/>
+              </a:rPr>
+              <a:t> </a:t>
+            </a:r>
+            <a:r>
+              <a:rPr lang="en-US" sz="3000" dirty="0" smtClean="0">
+                <a:latin typeface="Arial" charset="0"/>
+              </a:rPr>
+              <a:t>Density </a:t>
+            </a:r>
+            <a:r>
+              <a:rPr lang="en-US" sz="3000" dirty="0">
+                <a:latin typeface="Arial" charset="0"/>
+              </a:rPr>
+              <a:t>plot of </a:t>
+            </a:r>
+            <a:r>
+              <a:rPr lang="en-US" sz="3000" dirty="0" smtClean="0">
+                <a:latin typeface="Arial" charset="0"/>
+              </a:rPr>
+              <a:t>beta values average across corresponding CGIs </a:t>
+            </a:r>
+            <a:r>
+              <a:rPr lang="en-US" sz="3000" dirty="0">
+                <a:latin typeface="Arial" charset="0"/>
+              </a:rPr>
+              <a:t>before and after </a:t>
+            </a:r>
+            <a:r>
+              <a:rPr lang="en-US" sz="3000" dirty="0" err="1">
+                <a:latin typeface="Arial" charset="0"/>
+              </a:rPr>
+              <a:t>quantile</a:t>
+            </a:r>
+            <a:r>
+              <a:rPr lang="en-US" sz="3000" dirty="0">
+                <a:latin typeface="Arial" charset="0"/>
+              </a:rPr>
+              <a:t> normalization.</a:t>
+            </a:r>
+          </a:p>
+        </p:txBody>
+      </p:sp>
+      <p:sp>
+        <p:nvSpPr>
           <p:cNvPr id="2055" name="Text Box 9"/>
           <p:cNvSpPr txBox="1">
             <a:spLocks noChangeArrowheads="1"/>
@@ -4644,8 +4449,8 @@
         </p:nvSpPr>
         <p:spPr>
           <a:xfrm>
-            <a:off x="660803" y="5432238"/>
-            <a:ext cx="13758223" cy="5555367"/>
+            <a:off x="495276" y="9949379"/>
+            <a:ext cx="13674222" cy="3585597"/>
           </a:xfrm>
           <a:prstGeom prst="rect">
             <a:avLst/>
@@ -4654,11 +4459,7 @@
             <a:schemeClr val="bg1"/>
           </a:solidFill>
           <a:ln>
-            <a:solidFill>
-              <a:schemeClr val="bg1">
-                <a:lumMod val="65000"/>
-              </a:schemeClr>
-            </a:solidFill>
+            <a:noFill/>
             <a:prstDash val="solid"/>
           </a:ln>
         </p:spPr>
@@ -4668,79 +4469,48 @@
           </a:bodyPr>
           <a:lstStyle/>
           <a:p>
-            <a:pPr algn="just">
-              <a:defRPr/>
-            </a:pPr>
-            <a:endParaRPr lang="en-CA" sz="3200" dirty="0" smtClean="0">
-              <a:latin typeface="Arial" charset="0"/>
-            </a:endParaRPr>
-          </a:p>
-          <a:p>
-            <a:pPr algn="just">
-              <a:defRPr/>
-            </a:pPr>
-            <a:endParaRPr lang="en-CA" sz="3200" dirty="0">
-              <a:latin typeface="Arial" charset="0"/>
-            </a:endParaRPr>
-          </a:p>
-          <a:p>
-            <a:pPr algn="just">
-              <a:defRPr/>
-            </a:pPr>
-            <a:endParaRPr lang="en-CA" sz="3200" dirty="0" smtClean="0">
-              <a:latin typeface="Arial" charset="0"/>
-            </a:endParaRPr>
-          </a:p>
-          <a:p>
-            <a:pPr algn="just">
-              <a:defRPr/>
-            </a:pPr>
-            <a:endParaRPr lang="en-CA" sz="3200" dirty="0">
-              <a:latin typeface="Arial" charset="0"/>
-            </a:endParaRPr>
-          </a:p>
-          <a:p>
-            <a:pPr algn="just">
-              <a:defRPr/>
-            </a:pPr>
-            <a:endParaRPr lang="en-CA" sz="3200" dirty="0" smtClean="0">
-              <a:latin typeface="Arial" charset="0"/>
-            </a:endParaRPr>
-          </a:p>
-          <a:p>
-            <a:pPr algn="just">
-              <a:defRPr/>
-            </a:pPr>
-            <a:endParaRPr lang="en-CA" sz="3200" dirty="0">
-              <a:latin typeface="Arial" charset="0"/>
-            </a:endParaRPr>
-          </a:p>
-          <a:p>
-            <a:pPr algn="just">
-              <a:defRPr/>
-            </a:pPr>
-            <a:endParaRPr lang="en-CA" sz="3200" dirty="0" smtClean="0">
-              <a:latin typeface="Arial" charset="0"/>
-            </a:endParaRPr>
-          </a:p>
-          <a:p>
-            <a:pPr algn="just">
-              <a:defRPr/>
-            </a:pPr>
-            <a:endParaRPr lang="en-CA" sz="3200" dirty="0">
-              <a:latin typeface="Arial" charset="0"/>
-            </a:endParaRPr>
-          </a:p>
-          <a:p>
-            <a:pPr algn="just">
-              <a:defRPr/>
-            </a:pPr>
-            <a:r>
-              <a:rPr lang="en-CA" sz="3200" dirty="0">
-                <a:latin typeface="Arial" charset="0"/>
-              </a:rPr>
-              <a:t>Changes in DNA methylation is one of the early molecular events involved in cancer progression [1]. In this study, we identified differentially methylated CGI underlying CRC progression.</a:t>
-            </a:r>
+            <a:pPr algn="just"/>
+            <a:r>
+              <a:rPr lang="en-US" sz="3200" dirty="0" smtClean="0"/>
+              <a:t>Colorectal </a:t>
+            </a:r>
+            <a:r>
+              <a:rPr lang="en-US" sz="3200" dirty="0"/>
+              <a:t>cancer (CRC) accounts for the second highest cancer-related mortality among men and third among women in Canada, and it progresses from precursor lesions such as </a:t>
+            </a:r>
+            <a:r>
+              <a:rPr lang="en-US" sz="3200" dirty="0" smtClean="0"/>
+              <a:t>adenomas</a:t>
+            </a:r>
+            <a:r>
+              <a:rPr lang="en-US" sz="3200" baseline="30000" dirty="0" smtClean="0"/>
+              <a:t>1,3</a:t>
+            </a:r>
+            <a:r>
+              <a:rPr lang="en-US" sz="3200" dirty="0" smtClean="0"/>
+              <a:t>. </a:t>
+            </a:r>
+            <a:r>
+              <a:rPr lang="en-US" sz="3200" dirty="0"/>
+              <a:t>For our project, we compared methylation patterns between normal mucosa, adenoma, and colorectal </a:t>
+            </a:r>
+            <a:r>
+              <a:rPr lang="en-US" sz="3200" dirty="0" smtClean="0"/>
+              <a:t>tumor</a:t>
+            </a:r>
+            <a:r>
+              <a:rPr lang="en-US" sz="3200" dirty="0"/>
+              <a:t>. By identifying differentially methylated (DM) </a:t>
+            </a:r>
+            <a:r>
+              <a:rPr lang="en-US" sz="3200" dirty="0" smtClean="0"/>
+              <a:t>CGIs </a:t>
+            </a:r>
+            <a:r>
+              <a:rPr lang="en-US" sz="3200" dirty="0"/>
+              <a:t>between these three groups, we hope to determine aberrant methylation driving CRC progression. </a:t>
+            </a:r>
+            <a:endParaRPr lang="en-CA" sz="3200" dirty="0"/>
           </a:p>
         </p:txBody>
       </p:sp>
@@ -4903,7 +4673,7 @@
           <a:p>
             <a:pPr algn="ctr"/>
             <a:r>
-              <a:rPr lang="en-US" sz="6000" b="1" dirty="0" smtClean="0">
+              <a:rPr lang="en-US" sz="6000" dirty="0" smtClean="0">
                 <a:solidFill>
                   <a:schemeClr val="bg1"/>
                 </a:solidFill>
@@ -4911,33 +4681,32 @@
               <a:t> </a:t>
             </a:r>
             <a:r>
-              <a:rPr lang="en-US" sz="6000" b="1" dirty="0">
+              <a:rPr lang="en-US" sz="6000" dirty="0" smtClean="0">
                 <a:solidFill>
-                  <a:srgbClr val="C00000"/>
+                  <a:schemeClr val="bg1"/>
                 </a:solidFill>
-                <a:sym typeface="Wingdings 2" panose="05020102010507070707" pitchFamily="18" charset="2"/>
-              </a:rPr>
-              <a:t></a:t>
-            </a:r>
-            <a:r>
-              <a:rPr lang="en-US" sz="6000" b="1" dirty="0">
+              </a:rPr>
+              <a:t>Beryl </a:t>
+            </a:r>
+            <a:r>
+              <a:rPr lang="en-US" sz="6000" dirty="0" smtClean="0">
+                <a:solidFill>
+                  <a:schemeClr val="bg1"/>
+                </a:solidFill>
+              </a:rPr>
+              <a:t>Zhuang </a:t>
+            </a:r>
+            <a:r>
+              <a:rPr lang="en-US" sz="6000" dirty="0" smtClean="0">
                 <a:solidFill>
                   <a:schemeClr val="bg1"/>
                 </a:solidFill>
                 <a:sym typeface="Wingdings 2" panose="05020102010507070707" pitchFamily="18" charset="2"/>
               </a:rPr>
-              <a:t> </a:t>
-            </a:r>
-            <a:r>
-              <a:rPr lang="en-US" sz="6000" b="1" dirty="0" smtClean="0">
-                <a:solidFill>
-                  <a:srgbClr val="FFCCCC"/>
-                </a:solidFill>
-              </a:rPr>
-              <a:t>Beryl Zhuang</a:t>
-            </a:r>
-            <a:r>
-              <a:rPr lang="en-US" sz="6000" b="1" dirty="0" smtClean="0">
+              <a:t></a:t>
+            </a:r>
+            <a:r>
+              <a:rPr lang="en-US" sz="6000" dirty="0" smtClean="0">
                 <a:solidFill>
                   <a:schemeClr val="bg1"/>
                 </a:solidFill>
@@ -4945,74 +4714,24 @@
               <a:t> </a:t>
             </a:r>
             <a:r>
-              <a:rPr lang="en-US" sz="6000" b="1" dirty="0" smtClean="0">
-                <a:solidFill>
-                  <a:srgbClr val="00B050"/>
-                </a:solidFill>
-                <a:sym typeface="Wingdings 2" panose="05020102010507070707" pitchFamily="18" charset="2"/>
-              </a:rPr>
-              <a:t></a:t>
-            </a:r>
-            <a:r>
-              <a:rPr lang="en-US" sz="6000" b="1" dirty="0" smtClean="0">
+              <a:rPr lang="en-US" sz="6000" dirty="0" smtClean="0">
                 <a:solidFill>
                   <a:schemeClr val="bg1"/>
                 </a:solidFill>
               </a:rPr>
-              <a:t> </a:t>
-            </a:r>
-            <a:r>
-              <a:rPr lang="en-US" sz="6000" b="1" dirty="0" smtClean="0">
-                <a:solidFill>
-                  <a:srgbClr val="CCFFCC"/>
-                </a:solidFill>
-              </a:rPr>
               <a:t>Eva Yap </a:t>
             </a:r>
             <a:r>
-              <a:rPr lang="en-US" sz="6000" b="1" dirty="0" smtClean="0">
-                <a:solidFill>
-                  <a:srgbClr val="7030A0"/>
-                </a:solidFill>
-                <a:sym typeface="Wingdings 2" panose="05020102010507070707" pitchFamily="18" charset="2"/>
-              </a:rPr>
-              <a:t></a:t>
-            </a:r>
-            <a:r>
-              <a:rPr lang="en-US" sz="6000" b="1" dirty="0" smtClean="0">
+              <a:rPr lang="en-US" sz="6000" dirty="0" smtClean="0">
                 <a:solidFill>
                   <a:schemeClr val="bg1"/>
                 </a:solidFill>
-              </a:rPr>
-              <a:t> </a:t>
-            </a:r>
-            <a:r>
-              <a:rPr lang="en-US" sz="6000" b="1" dirty="0" err="1" smtClean="0">
-                <a:solidFill>
-                  <a:srgbClr val="CC99FF"/>
-                </a:solidFill>
-              </a:rPr>
-              <a:t>Ka</a:t>
-            </a:r>
-            <a:r>
-              <a:rPr lang="en-US" sz="6000" b="1" dirty="0" smtClean="0">
-                <a:solidFill>
-                  <a:srgbClr val="CC99FF"/>
-                </a:solidFill>
-              </a:rPr>
-              <a:t> Ming Nip </a:t>
-            </a:r>
-            <a:r>
-              <a:rPr lang="en-US" sz="6000" b="1" dirty="0" smtClean="0">
-                <a:solidFill>
-                  <a:srgbClr val="0070C0"/>
-                </a:solidFill>
                 <a:sym typeface="Wingdings 2" panose="05020102010507070707" pitchFamily="18" charset="2"/>
               </a:rPr>
               <a:t></a:t>
             </a:r>
             <a:r>
-              <a:rPr lang="en-US" sz="6000" b="1" dirty="0" smtClean="0">
+              <a:rPr lang="en-US" sz="6000" dirty="0" smtClean="0">
                 <a:solidFill>
                   <a:schemeClr val="bg1"/>
                 </a:solidFill>
@@ -5020,57 +4739,98 @@
               <a:t> </a:t>
             </a:r>
             <a:r>
-              <a:rPr lang="en-US" sz="6000" b="1" dirty="0" err="1" smtClean="0">
-                <a:solidFill>
-                  <a:srgbClr val="99CCFF"/>
-                </a:solidFill>
-              </a:rPr>
-              <a:t>Rashedul</a:t>
-            </a:r>
-            <a:r>
-              <a:rPr lang="en-US" sz="6000" b="1" dirty="0" smtClean="0">
-                <a:solidFill>
-                  <a:srgbClr val="99CCFF"/>
-                </a:solidFill>
-              </a:rPr>
-              <a:t> Islam </a:t>
-            </a:r>
-            <a:r>
-              <a:rPr lang="en-US" sz="6000" b="1" dirty="0" smtClean="0">
-                <a:solidFill>
-                  <a:srgbClr val="FFFF00"/>
-                </a:solidFill>
-                <a:sym typeface="Wingdings 2" panose="05020102010507070707" pitchFamily="18" charset="2"/>
-              </a:rPr>
-              <a:t></a:t>
-            </a:r>
-            <a:r>
-              <a:rPr lang="en-US" sz="6000" b="1" dirty="0" smtClean="0">
+              <a:rPr lang="en-US" sz="6000" dirty="0" err="1" smtClean="0">
                 <a:solidFill>
                   <a:schemeClr val="bg1"/>
                 </a:solidFill>
               </a:rPr>
+              <a:t>Ka</a:t>
+            </a:r>
+            <a:r>
+              <a:rPr lang="en-US" sz="6000" dirty="0" smtClean="0">
+                <a:solidFill>
+                  <a:schemeClr val="bg1"/>
+                </a:solidFill>
+              </a:rPr>
+              <a:t> Ming Nip </a:t>
+            </a:r>
+            <a:r>
+              <a:rPr lang="en-US" sz="6000" dirty="0" smtClean="0">
+                <a:solidFill>
+                  <a:schemeClr val="bg1"/>
+                </a:solidFill>
+                <a:sym typeface="Wingdings 2" panose="05020102010507070707" pitchFamily="18" charset="2"/>
+              </a:rPr>
+              <a:t></a:t>
+            </a:r>
+            <a:r>
+              <a:rPr lang="en-US" sz="6000" dirty="0" smtClean="0">
+                <a:solidFill>
+                  <a:schemeClr val="bg1"/>
+                </a:solidFill>
+              </a:rPr>
               <a:t> </a:t>
             </a:r>
             <a:r>
-              <a:rPr lang="en-US" sz="6000" b="1" dirty="0" err="1" smtClean="0">
+              <a:rPr lang="en-US" sz="6000" dirty="0" err="1" smtClean="0">
                 <a:solidFill>
-                  <a:srgbClr val="FFFFCC"/>
+                  <a:schemeClr val="bg1"/>
                 </a:solidFill>
               </a:rPr>
+              <a:t>Rashedul</a:t>
+            </a:r>
+            <a:r>
+              <a:rPr lang="en-US" sz="6000" dirty="0" smtClean="0">
+                <a:solidFill>
+                  <a:schemeClr val="bg1"/>
+                </a:solidFill>
+              </a:rPr>
+              <a:t> Islam </a:t>
+            </a:r>
+            <a:r>
+              <a:rPr lang="en-US" sz="6000" dirty="0" smtClean="0">
+                <a:solidFill>
+                  <a:schemeClr val="bg1"/>
+                </a:solidFill>
+                <a:sym typeface="Wingdings 2" panose="05020102010507070707" pitchFamily="18" charset="2"/>
+              </a:rPr>
+              <a:t></a:t>
+            </a:r>
+            <a:r>
+              <a:rPr lang="en-US" sz="6000" dirty="0" smtClean="0">
+                <a:solidFill>
+                  <a:schemeClr val="bg1"/>
+                </a:solidFill>
+              </a:rPr>
+              <a:t> </a:t>
+            </a:r>
+            <a:r>
+              <a:rPr lang="en-US" sz="6000" dirty="0" err="1" smtClean="0">
+                <a:solidFill>
+                  <a:schemeClr val="bg1"/>
+                </a:solidFill>
+              </a:rPr>
               <a:t>Santina</a:t>
             </a:r>
             <a:r>
-              <a:rPr lang="en-US" sz="6000" b="1" dirty="0" smtClean="0">
+              <a:rPr lang="en-US" sz="6000" dirty="0" smtClean="0">
                 <a:solidFill>
-                  <a:srgbClr val="FFFFCC"/>
+                  <a:schemeClr val="bg1"/>
                 </a:solidFill>
               </a:rPr>
-              <a:t> Lin</a:t>
-            </a:r>
-            <a:endParaRPr lang="en-US" sz="6000" b="1" baseline="30000" dirty="0">
+              <a:t> </a:t>
+            </a:r>
+            <a:r>
+              <a:rPr lang="en-US" sz="6000" dirty="0" smtClean="0">
+                <a:solidFill>
+                  <a:schemeClr val="bg1"/>
+                </a:solidFill>
+              </a:rPr>
+              <a:t>Lin</a:t>
+            </a:r>
+            <a:endParaRPr lang="en-US" sz="6000" baseline="30000" dirty="0">
               <a:solidFill>
-                <a:srgbClr val="FFFFCC"/>
+                <a:schemeClr val="bg1"/>
               </a:solidFill>
             </a:endParaRPr>
           </a:p>
@@ -5085,12 +4845,12 @@
           <p:nvPr/>
         </p:nvPicPr>
         <p:blipFill>
-          <a:blip r:embed="rId4">
+          <a:blip r:embed="rId3">
             <a:lum bright="70000" contrast="-70000"/>
             <a:extLst>
               <a:ext uri="{BEBA8EAE-BF5A-486C-A8C5-ECC9F3942E4B}">
                 <a14:imgProps xmlns:a14="http://schemas.microsoft.com/office/drawing/2010/main">
-                  <a14:imgLayer r:embed="rId5">
+                  <a14:imgLayer r:embed="rId4">
                     <a14:imgEffect>
                       <a14:colorTemperature colorTemp="4700"/>
                     </a14:imgEffect>
@@ -5126,7 +4886,7 @@
         </p:nvSpPr>
         <p:spPr bwMode="auto">
           <a:xfrm>
-            <a:off x="596892" y="11291092"/>
+            <a:off x="406392" y="13662817"/>
             <a:ext cx="13822492" cy="1019160"/>
           </a:xfrm>
           <a:prstGeom prst="roundRect">
@@ -5220,7 +4980,7 @@
         </p:nvSpPr>
         <p:spPr bwMode="auto">
           <a:xfrm>
-            <a:off x="658805" y="4281835"/>
+            <a:off x="468305" y="4281835"/>
             <a:ext cx="13760579" cy="998188"/>
           </a:xfrm>
           <a:prstGeom prst="roundRect">
@@ -5253,7 +5013,7 @@
               <a:t></a:t>
             </a:r>
             <a:r>
-              <a:rPr lang="en-US" sz="4500" b="1" dirty="0">
+              <a:rPr lang="en-US" sz="4500" b="1" dirty="0" smtClean="0">
                 <a:solidFill>
                   <a:schemeClr val="bg1"/>
                 </a:solidFill>
@@ -5267,7 +5027,15 @@
                   <a:schemeClr val="bg1"/>
                 </a:solidFill>
               </a:rPr>
-              <a:t>Research Question</a:t>
+              <a:t>Research </a:t>
+            </a:r>
+            <a:r>
+              <a:rPr lang="en-US" sz="4500" b="1" dirty="0" smtClean="0">
+                <a:solidFill>
+                  <a:schemeClr val="bg1"/>
+                </a:solidFill>
+              </a:rPr>
+              <a:t>Question</a:t>
             </a:r>
             <a:r>
               <a:rPr lang="en-US" sz="4500" dirty="0" smtClean="0">
@@ -5302,8 +5070,8 @@
         </p:nvSpPr>
         <p:spPr>
           <a:xfrm>
-            <a:off x="660798" y="12429053"/>
-            <a:ext cx="13758584" cy="5770811"/>
+            <a:off x="470298" y="14800778"/>
+            <a:ext cx="13721451" cy="1061829"/>
           </a:xfrm>
           <a:prstGeom prst="rect">
             <a:avLst/>
@@ -5312,11 +5080,7 @@
             <a:schemeClr val="bg1"/>
           </a:solidFill>
           <a:ln>
-            <a:solidFill>
-              <a:schemeClr val="bg1">
-                <a:lumMod val="65000"/>
-              </a:schemeClr>
-            </a:solidFill>
+            <a:noFill/>
           </a:ln>
         </p:spPr>
         <p:txBody>
@@ -5329,110 +5093,70 @@
               <a:defRPr/>
             </a:pPr>
             <a:r>
-              <a:rPr lang="en-US" sz="3200" dirty="0" smtClean="0">
-                <a:latin typeface="Arial" charset="0"/>
-              </a:rPr>
-              <a:t>Our </a:t>
-            </a:r>
-            <a:r>
-              <a:rPr lang="en-US" sz="3200" dirty="0" err="1" smtClean="0">
-                <a:latin typeface="Arial" charset="0"/>
-              </a:rPr>
-              <a:t>Illumina</a:t>
-            </a:r>
-            <a:r>
-              <a:rPr lang="en-US" sz="3200" dirty="0" smtClean="0">
-                <a:latin typeface="Arial" charset="0"/>
-              </a:rPr>
-              <a:t> HumanMethylation450 array </a:t>
-            </a:r>
-            <a:r>
-              <a:rPr lang="en-CA" sz="3200" dirty="0" smtClean="0">
-                <a:latin typeface="Arial" charset="0"/>
-              </a:rPr>
-              <a:t>dataset </a:t>
-            </a:r>
-            <a:r>
-              <a:rPr lang="en-US" sz="3200" dirty="0" smtClean="0">
-                <a:latin typeface="Arial" charset="0"/>
-              </a:rPr>
-              <a:t>from the Gene </a:t>
-            </a:r>
-            <a:r>
-              <a:rPr lang="en-US" sz="3200" dirty="0">
-                <a:latin typeface="Arial" charset="0"/>
-              </a:rPr>
-              <a:t>Expression Omnibus </a:t>
-            </a:r>
-            <a:r>
-              <a:rPr lang="en-US" sz="3200" dirty="0" smtClean="0">
-                <a:latin typeface="Arial" charset="0"/>
-              </a:rPr>
-              <a:t>(GSE48684) </a:t>
-            </a:r>
-            <a:r>
-              <a:rPr lang="en-CA" sz="3200" dirty="0" smtClean="0">
-                <a:latin typeface="Arial" charset="0"/>
-              </a:rPr>
-              <a:t>consists </a:t>
-            </a:r>
-            <a:r>
-              <a:rPr lang="en-CA" sz="3200" dirty="0">
-                <a:latin typeface="Arial" charset="0"/>
-              </a:rPr>
-              <a:t>of </a:t>
-            </a:r>
-            <a:r>
-              <a:rPr lang="en-CA" sz="3200" dirty="0" smtClean="0">
-                <a:latin typeface="Arial" charset="0"/>
-              </a:rPr>
-              <a:t>147 colon samples, each with recorded beta values of 485,577 probes</a:t>
-            </a:r>
-            <a:r>
-              <a:rPr lang="en-US" sz="3200" dirty="0">
-                <a:latin typeface="Arial" charset="0"/>
-              </a:rPr>
-              <a:t> [2]</a:t>
-            </a:r>
-            <a:r>
-              <a:rPr lang="en-CA" sz="3200" dirty="0" smtClean="0">
-                <a:latin typeface="Arial" charset="0"/>
-              </a:rPr>
-              <a:t>. </a:t>
-            </a:r>
-            <a:endParaRPr lang="en-US" sz="3000" dirty="0" smtClean="0">
-              <a:latin typeface="Arial" charset="0"/>
-            </a:endParaRPr>
-          </a:p>
-          <a:p>
-            <a:pPr algn="just">
-              <a:defRPr/>
-            </a:pPr>
-            <a:endParaRPr lang="en-US" sz="3000" dirty="0">
-              <a:latin typeface="Arial" charset="0"/>
-            </a:endParaRPr>
-          </a:p>
-          <a:p>
-            <a:pPr algn="just">
-              <a:defRPr/>
-            </a:pPr>
-            <a:r>
               <a:rPr lang="en-US" sz="3000" b="1" dirty="0" smtClean="0">
                 <a:latin typeface="Arial" charset="0"/>
               </a:rPr>
-              <a:t>Table 1.</a:t>
+              <a:t>Table </a:t>
+            </a:r>
+            <a:r>
+              <a:rPr lang="en-US" sz="3000" b="1" dirty="0" smtClean="0">
+                <a:latin typeface="Arial" charset="0"/>
+              </a:rPr>
+              <a:t>1.</a:t>
             </a:r>
             <a:r>
               <a:rPr lang="en-US" sz="3000" dirty="0" smtClean="0">
                 <a:latin typeface="Arial" charset="0"/>
               </a:rPr>
-              <a:t> Description of 1</a:t>
+              <a:t> </a:t>
+            </a:r>
+            <a:r>
+              <a:rPr lang="en-US" sz="2800" dirty="0" err="1">
+                <a:latin typeface="Arial" charset="0"/>
+              </a:rPr>
+              <a:t>Illumina</a:t>
+            </a:r>
+            <a:r>
+              <a:rPr lang="en-US" sz="2800" dirty="0">
+                <a:latin typeface="Arial" charset="0"/>
+              </a:rPr>
+              <a:t> HumanMethylation450 array </a:t>
+            </a:r>
+            <a:r>
+              <a:rPr lang="en-CA" sz="2800" dirty="0">
+                <a:latin typeface="Arial" charset="0"/>
+              </a:rPr>
+              <a:t>dataset </a:t>
+            </a:r>
+            <a:r>
+              <a:rPr lang="en-US" sz="3000" dirty="0" smtClean="0">
+                <a:latin typeface="Arial" charset="0"/>
+              </a:rPr>
+              <a:t>of </a:t>
+            </a:r>
+            <a:r>
+              <a:rPr lang="en-US" sz="3000" dirty="0" smtClean="0">
+                <a:latin typeface="Arial" charset="0"/>
+              </a:rPr>
+              <a:t>1</a:t>
             </a:r>
             <a:r>
               <a:rPr lang="en-CA" sz="3000" dirty="0" smtClean="0">
                 <a:latin typeface="Arial" charset="0"/>
               </a:rPr>
-              <a:t>47 colon samples</a:t>
+              <a:t>47 colon </a:t>
+            </a:r>
+            <a:r>
+              <a:rPr lang="en-CA" sz="3000" dirty="0" smtClean="0">
+                <a:latin typeface="Arial" charset="0"/>
+              </a:rPr>
+              <a:t>samples from the Gene Expression Omnibus </a:t>
+            </a:r>
+            <a:r>
+              <a:rPr lang="en-US" sz="2800" dirty="0" smtClean="0">
+                <a:latin typeface="Arial" charset="0"/>
+              </a:rPr>
+              <a:t>GSE48684</a:t>
             </a:r>
             <a:r>
               <a:rPr lang="en-US" sz="3000" dirty="0" smtClean="0">
@@ -5440,59 +5164,6 @@
               </a:rPr>
               <a:t>.</a:t>
             </a:r>
-          </a:p>
-          <a:p>
-            <a:pPr algn="just">
-              <a:defRPr/>
-            </a:pPr>
-            <a:endParaRPr lang="en-US" sz="3000" dirty="0" smtClean="0">
-              <a:latin typeface="Arial" charset="0"/>
-            </a:endParaRPr>
-          </a:p>
-          <a:p>
-            <a:pPr algn="just">
-              <a:defRPr/>
-            </a:pPr>
-            <a:endParaRPr lang="en-US" sz="3000" dirty="0">
-              <a:latin typeface="Arial" charset="0"/>
-            </a:endParaRPr>
-          </a:p>
-          <a:p>
-            <a:pPr algn="just">
-              <a:defRPr/>
-            </a:pPr>
-            <a:endParaRPr lang="en-US" sz="3000" dirty="0" smtClean="0">
-              <a:latin typeface="Arial" charset="0"/>
-            </a:endParaRPr>
-          </a:p>
-          <a:p>
-            <a:pPr algn="just">
-              <a:defRPr/>
-            </a:pPr>
-            <a:endParaRPr lang="en-US" sz="3000" dirty="0">
-              <a:latin typeface="Arial" charset="0"/>
-            </a:endParaRPr>
-          </a:p>
-          <a:p>
-            <a:pPr algn="just">
-              <a:defRPr/>
-            </a:pPr>
-            <a:endParaRPr lang="en-US" sz="3000" dirty="0" smtClean="0">
-              <a:latin typeface="Arial" charset="0"/>
-            </a:endParaRPr>
-          </a:p>
-          <a:p>
-            <a:pPr algn="just">
-              <a:defRPr/>
-            </a:pPr>
-            <a:endParaRPr lang="en-US" sz="3000" dirty="0">
-              <a:latin typeface="Arial" charset="0"/>
-            </a:endParaRPr>
-          </a:p>
-          <a:p>
-            <a:pPr algn="just">
-              <a:defRPr/>
-            </a:pPr>
             <a:endParaRPr lang="en-US" sz="3000" dirty="0" smtClean="0">
               <a:latin typeface="Arial" charset="0"/>
             </a:endParaRPr>
@@ -5509,8 +5180,8 @@
         </p:nvSpPr>
         <p:spPr bwMode="auto">
           <a:xfrm>
-            <a:off x="15031412" y="4281834"/>
-            <a:ext cx="14171496" cy="998189"/>
+            <a:off x="14840912" y="4281834"/>
+            <a:ext cx="13759200" cy="998189"/>
           </a:xfrm>
           <a:prstGeom prst="roundRect">
             <a:avLst>
@@ -5551,12 +5222,12 @@
               <a:t> </a:t>
             </a:r>
             <a:r>
-              <a:rPr lang="en-US" sz="4500" b="1" dirty="0" smtClean="0">
+              <a:rPr lang="en-US" sz="4500" b="1" dirty="0">
                 <a:solidFill>
                   <a:schemeClr val="bg1"/>
                 </a:solidFill>
               </a:rPr>
-              <a:t>Data Normalization</a:t>
+              <a:t>Exploratory Analysis</a:t>
             </a:r>
             <a:r>
               <a:rPr lang="en-US" sz="4500" dirty="0">
@@ -5567,21 +5238,13 @@
               <a:t> </a:t>
             </a:r>
             <a:r>
-              <a:rPr lang="en-US" sz="4500" dirty="0">
+              <a:rPr lang="en-US" sz="4500" dirty="0" smtClean="0">
                 <a:solidFill>
                   <a:schemeClr val="bg1"/>
                 </a:solidFill>
                 <a:sym typeface="Wingdings 2" panose="05020102010507070707" pitchFamily="18" charset="2"/>
               </a:rPr>
               <a:t></a:t>
-            </a:r>
-            <a:r>
-              <a:rPr lang="en-US" sz="4500" b="1" dirty="0" smtClean="0">
-                <a:solidFill>
-                  <a:schemeClr val="bg1"/>
-                </a:solidFill>
-              </a:rPr>
-              <a:t> </a:t>
             </a:r>
             <a:endParaRPr lang="en-US" sz="4500" b="1" dirty="0">
               <a:solidFill>
@@ -5601,8 +5264,8 @@
         </p:nvSpPr>
         <p:spPr bwMode="auto">
           <a:xfrm>
-            <a:off x="29814936" y="4281050"/>
-            <a:ext cx="13466664" cy="998973"/>
+            <a:off x="29212140" y="4281050"/>
+            <a:ext cx="14069460" cy="998973"/>
           </a:xfrm>
           <a:prstGeom prst="roundRect">
             <a:avLst>
@@ -5685,7 +5348,7 @@
         </p:nvSpPr>
         <p:spPr bwMode="auto">
           <a:xfrm>
-            <a:off x="596889" y="18377886"/>
+            <a:off x="406389" y="19201834"/>
             <a:ext cx="13822493" cy="1030605"/>
           </a:xfrm>
           <a:prstGeom prst="roundRect">
@@ -5729,12 +5392,12 @@
               <a:t> </a:t>
             </a:r>
             <a:r>
-              <a:rPr lang="en-US" sz="4500" b="1" dirty="0" smtClean="0">
+              <a:rPr lang="en-US" sz="4500" b="1" dirty="0">
                 <a:solidFill>
                   <a:schemeClr val="bg1"/>
                 </a:solidFill>
               </a:rPr>
-              <a:t>Exploratory Analysis</a:t>
+              <a:t>Data Normalization</a:t>
             </a:r>
             <a:r>
               <a:rPr lang="en-US" sz="4500" dirty="0">
@@ -5745,7 +5408,7 @@
               <a:t> </a:t>
             </a:r>
             <a:r>
-              <a:rPr lang="en-US" sz="4500" dirty="0">
+              <a:rPr lang="en-US" sz="4500" dirty="0" smtClean="0">
                 <a:solidFill>
                   <a:schemeClr val="bg1"/>
                 </a:solidFill>
@@ -5769,8 +5432,8 @@
         </p:nvSpPr>
         <p:spPr>
           <a:xfrm>
-            <a:off x="15031412" y="5516880"/>
-            <a:ext cx="14171496" cy="19066758"/>
+            <a:off x="14876293" y="19801868"/>
+            <a:ext cx="13662010" cy="1523494"/>
           </a:xfrm>
           <a:prstGeom prst="rect">
             <a:avLst/>
@@ -5779,11 +5442,7 @@
             <a:schemeClr val="bg1"/>
           </a:solidFill>
           <a:ln>
-            <a:solidFill>
-              <a:schemeClr val="bg1">
-                <a:lumMod val="65000"/>
-              </a:schemeClr>
-            </a:solidFill>
+            <a:noFill/>
           </a:ln>
         </p:spPr>
         <p:txBody>
@@ -5795,455 +5454,111 @@
             <a:pPr algn="just">
               <a:defRPr/>
             </a:pPr>
+            <a:r>
+              <a:rPr lang="en-US" sz="3000" b="1" dirty="0" smtClean="0">
+                <a:latin typeface="Arial" charset="0"/>
+              </a:rPr>
+              <a:t>Figure 2.</a:t>
+            </a:r>
+            <a:r>
+              <a:rPr lang="en-US" sz="3000" dirty="0" smtClean="0">
+                <a:latin typeface="Arial" charset="0"/>
+              </a:rPr>
+              <a:t> Unsupervised hierarchical </a:t>
+            </a:r>
+            <a:r>
+              <a:rPr lang="en-US" sz="3000" dirty="0">
+                <a:latin typeface="Arial" charset="0"/>
+              </a:rPr>
+              <a:t>clustering </a:t>
+            </a:r>
+            <a:r>
+              <a:rPr lang="en-US" sz="3000" dirty="0" smtClean="0">
+                <a:latin typeface="Arial" charset="0"/>
+              </a:rPr>
+              <a:t>using </a:t>
+            </a:r>
+            <a:r>
+              <a:rPr lang="en-US" sz="3000" dirty="0">
+                <a:latin typeface="Arial" charset="0"/>
+              </a:rPr>
+              <a:t>Ward’s method </a:t>
+            </a:r>
+            <a:r>
+              <a:rPr lang="en-US" sz="3000" dirty="0" smtClean="0">
+                <a:latin typeface="Arial" charset="0"/>
+              </a:rPr>
+              <a:t>on </a:t>
+            </a:r>
+            <a:r>
+              <a:rPr lang="en-US" sz="3000" b="1" dirty="0" smtClean="0">
+                <a:latin typeface="Arial" charset="0"/>
+              </a:rPr>
+              <a:t>(a)</a:t>
+            </a:r>
+            <a:r>
+              <a:rPr lang="en-US" sz="3000" dirty="0" smtClean="0">
+                <a:latin typeface="Arial" charset="0"/>
+              </a:rPr>
+              <a:t> raw </a:t>
+            </a:r>
+            <a:r>
+              <a:rPr lang="en-US" sz="3000" dirty="0">
+                <a:latin typeface="Arial" charset="0"/>
+              </a:rPr>
+              <a:t>beta values after removing probes in </a:t>
+            </a:r>
+            <a:r>
+              <a:rPr lang="en-US" sz="3000" dirty="0" err="1">
+                <a:latin typeface="Arial" charset="0"/>
+              </a:rPr>
+              <a:t>chrX</a:t>
+            </a:r>
+            <a:r>
+              <a:rPr lang="en-US" sz="3000" dirty="0">
+                <a:latin typeface="Arial" charset="0"/>
+              </a:rPr>
+              <a:t> and those not in </a:t>
+            </a:r>
+            <a:r>
+              <a:rPr lang="en-US" sz="3000" dirty="0" smtClean="0">
+                <a:latin typeface="Arial" charset="0"/>
+              </a:rPr>
+              <a:t>CGIs and </a:t>
+            </a:r>
+            <a:r>
+              <a:rPr lang="en-US" sz="3000" b="1" dirty="0" smtClean="0">
+                <a:latin typeface="Arial" charset="0"/>
+              </a:rPr>
+              <a:t>(b)</a:t>
+            </a:r>
+            <a:r>
+              <a:rPr lang="en-US" sz="3000" dirty="0" smtClean="0">
+                <a:latin typeface="Arial" charset="0"/>
+              </a:rPr>
+              <a:t> normalized </a:t>
+            </a:r>
+            <a:r>
+              <a:rPr lang="en-US" sz="3000" dirty="0" smtClean="0">
+                <a:latin typeface="Arial" charset="0"/>
+              </a:rPr>
+              <a:t>beta </a:t>
+            </a:r>
+            <a:r>
+              <a:rPr lang="en-US" sz="3000" dirty="0" smtClean="0">
+                <a:latin typeface="Arial" charset="0"/>
+              </a:rPr>
+              <a:t>values </a:t>
+            </a:r>
+            <a:r>
+              <a:rPr lang="en-US" sz="3000" dirty="0" smtClean="0">
+                <a:latin typeface="Arial" charset="0"/>
+              </a:rPr>
+              <a:t>averaged across each CGI.</a:t>
+            </a:r>
             <a:endParaRPr lang="en-US" sz="3000" dirty="0" smtClean="0">
               <a:latin typeface="Arial" charset="0"/>
             </a:endParaRPr>
-          </a:p>
-          <a:p>
-            <a:pPr algn="just">
-              <a:defRPr/>
-            </a:pPr>
-            <a:endParaRPr lang="en-US" sz="3000" dirty="0" smtClean="0">
-              <a:latin typeface="Arial" charset="0"/>
-            </a:endParaRPr>
-          </a:p>
-          <a:p>
-            <a:pPr algn="just">
-              <a:defRPr/>
-            </a:pPr>
-            <a:endParaRPr lang="en-US" sz="3000" dirty="0">
-              <a:latin typeface="Arial" charset="0"/>
-            </a:endParaRPr>
-          </a:p>
-          <a:p>
-            <a:pPr algn="just">
-              <a:defRPr/>
-            </a:pPr>
-            <a:endParaRPr lang="en-US" sz="3000" dirty="0">
-              <a:latin typeface="Arial" charset="0"/>
-            </a:endParaRPr>
-          </a:p>
-          <a:p>
-            <a:pPr algn="just">
-              <a:defRPr/>
-            </a:pPr>
-            <a:endParaRPr lang="en-US" sz="3000" dirty="0" smtClean="0">
-              <a:latin typeface="Arial" charset="0"/>
-            </a:endParaRPr>
-          </a:p>
-          <a:p>
-            <a:pPr algn="just">
-              <a:defRPr/>
-            </a:pPr>
-            <a:endParaRPr lang="en-US" sz="3000" dirty="0" smtClean="0">
-              <a:latin typeface="Arial" charset="0"/>
-            </a:endParaRPr>
-          </a:p>
-          <a:p>
-            <a:pPr algn="just">
-              <a:defRPr/>
-            </a:pPr>
-            <a:endParaRPr lang="en-US" sz="3000" dirty="0" smtClean="0">
-              <a:latin typeface="Arial" charset="0"/>
-            </a:endParaRPr>
-          </a:p>
-          <a:p>
-            <a:pPr algn="just">
-              <a:defRPr/>
-            </a:pPr>
-            <a:endParaRPr lang="en-US" sz="3000" dirty="0" smtClean="0">
-              <a:latin typeface="Arial" charset="0"/>
-            </a:endParaRPr>
-          </a:p>
-          <a:p>
-            <a:pPr algn="just">
-              <a:defRPr/>
-            </a:pPr>
-            <a:endParaRPr lang="en-US" sz="3000" dirty="0">
-              <a:latin typeface="Arial" charset="0"/>
-            </a:endParaRPr>
-          </a:p>
-          <a:p>
-            <a:pPr algn="just">
-              <a:defRPr/>
-            </a:pPr>
-            <a:endParaRPr lang="en-US" sz="3000" dirty="0" smtClean="0">
-              <a:latin typeface="Arial" charset="0"/>
-            </a:endParaRPr>
-          </a:p>
-          <a:p>
-            <a:pPr algn="just">
-              <a:defRPr/>
-            </a:pPr>
-            <a:endParaRPr lang="en-US" sz="3000" dirty="0">
-              <a:latin typeface="Arial" charset="0"/>
-            </a:endParaRPr>
-          </a:p>
-          <a:p>
-            <a:pPr algn="just">
-              <a:defRPr/>
-            </a:pPr>
-            <a:endParaRPr lang="en-US" sz="3000" dirty="0" smtClean="0">
-              <a:latin typeface="Arial" charset="0"/>
-            </a:endParaRPr>
-          </a:p>
-          <a:p>
-            <a:pPr algn="just">
-              <a:defRPr/>
-            </a:pPr>
-            <a:endParaRPr lang="en-US" sz="3000" dirty="0">
-              <a:latin typeface="Arial" charset="0"/>
-            </a:endParaRPr>
-          </a:p>
-          <a:p>
-            <a:pPr algn="just">
-              <a:defRPr/>
-            </a:pPr>
-            <a:endParaRPr lang="en-US" sz="3000" dirty="0" smtClean="0">
-              <a:latin typeface="Arial" charset="0"/>
-            </a:endParaRPr>
-          </a:p>
-          <a:p>
-            <a:pPr algn="just">
-              <a:defRPr/>
-            </a:pPr>
-            <a:endParaRPr lang="en-US" sz="3000" b="1" dirty="0" smtClean="0">
-              <a:latin typeface="Arial" charset="0"/>
-            </a:endParaRPr>
-          </a:p>
-          <a:p>
-            <a:pPr algn="just">
-              <a:defRPr/>
-            </a:pPr>
-            <a:r>
-              <a:rPr lang="en-US" sz="3000" b="1" dirty="0" smtClean="0">
-                <a:latin typeface="Arial" charset="0"/>
-              </a:rPr>
-              <a:t>Figure 2.</a:t>
-            </a:r>
-            <a:r>
-              <a:rPr lang="en-US" sz="3000" dirty="0" smtClean="0">
-                <a:latin typeface="Arial" charset="0"/>
-              </a:rPr>
-              <a:t> </a:t>
-            </a:r>
-            <a:r>
-              <a:rPr lang="en-US" sz="3000" dirty="0">
-                <a:latin typeface="Arial" charset="0"/>
-              </a:rPr>
-              <a:t>D</a:t>
-            </a:r>
-            <a:r>
-              <a:rPr lang="en-US" sz="3000" dirty="0" smtClean="0">
-                <a:latin typeface="Arial" charset="0"/>
-              </a:rPr>
-              <a:t>ensity plot </a:t>
-            </a:r>
-            <a:r>
-              <a:rPr lang="en-US" sz="3000" dirty="0" smtClean="0">
-                <a:latin typeface="Arial" charset="0"/>
-              </a:rPr>
-              <a:t>of average </a:t>
-            </a:r>
-            <a:r>
-              <a:rPr lang="en-US" sz="3000" dirty="0">
-                <a:latin typeface="Arial" charset="0"/>
-              </a:rPr>
-              <a:t>beta </a:t>
-            </a:r>
-            <a:r>
-              <a:rPr lang="en-US" sz="3000" dirty="0" smtClean="0">
-                <a:latin typeface="Arial" charset="0"/>
-              </a:rPr>
-              <a:t>values </a:t>
-            </a:r>
-            <a:r>
-              <a:rPr lang="en-US" sz="3000" dirty="0">
-                <a:latin typeface="Arial" charset="0"/>
-              </a:rPr>
-              <a:t>before </a:t>
-            </a:r>
-            <a:r>
-              <a:rPr lang="en-US" sz="3000" dirty="0">
-                <a:latin typeface="Arial" charset="0"/>
-              </a:rPr>
-              <a:t>and after </a:t>
-            </a:r>
-            <a:r>
-              <a:rPr lang="en-US" sz="3000" dirty="0" err="1" smtClean="0">
-                <a:latin typeface="Arial" charset="0"/>
-              </a:rPr>
-              <a:t>quantile</a:t>
-            </a:r>
-            <a:r>
-              <a:rPr lang="en-US" sz="3000" dirty="0" smtClean="0">
-                <a:latin typeface="Arial" charset="0"/>
-              </a:rPr>
-              <a:t> normalization</a:t>
-            </a:r>
-            <a:r>
-              <a:rPr lang="en-US" sz="3000" dirty="0" smtClean="0">
-                <a:latin typeface="Arial" charset="0"/>
-              </a:rPr>
-              <a:t>.</a:t>
-            </a:r>
-          </a:p>
-          <a:p>
-            <a:pPr algn="just">
-              <a:defRPr/>
-            </a:pPr>
-            <a:endParaRPr lang="en-US" sz="3000" dirty="0">
-              <a:latin typeface="Arial" charset="0"/>
-            </a:endParaRPr>
-          </a:p>
-          <a:p>
-            <a:pPr algn="just">
-              <a:defRPr/>
-            </a:pPr>
-            <a:endParaRPr lang="en-US" sz="3000" dirty="0" smtClean="0">
-              <a:latin typeface="Arial" charset="0"/>
-            </a:endParaRPr>
-          </a:p>
-          <a:p>
-            <a:pPr algn="just">
-              <a:defRPr/>
-            </a:pPr>
-            <a:endParaRPr lang="en-US" sz="3000" dirty="0">
-              <a:latin typeface="Arial" charset="0"/>
-            </a:endParaRPr>
-          </a:p>
-          <a:p>
-            <a:pPr algn="just">
-              <a:defRPr/>
-            </a:pPr>
-            <a:endParaRPr lang="en-US" sz="3000" dirty="0" smtClean="0">
-              <a:latin typeface="Arial" charset="0"/>
-            </a:endParaRPr>
-          </a:p>
-          <a:p>
-            <a:pPr algn="just">
-              <a:defRPr/>
-            </a:pPr>
-            <a:endParaRPr lang="en-US" sz="3000" dirty="0" smtClean="0">
-              <a:latin typeface="Arial" charset="0"/>
-            </a:endParaRPr>
-          </a:p>
-          <a:p>
-            <a:pPr algn="just">
-              <a:defRPr/>
-            </a:pPr>
-            <a:endParaRPr lang="en-CA" sz="3000" dirty="0"/>
-          </a:p>
-          <a:p>
-            <a:pPr algn="just">
-              <a:defRPr/>
-            </a:pPr>
-            <a:endParaRPr lang="en-US" sz="3000" dirty="0">
-              <a:latin typeface="Arial" charset="0"/>
-            </a:endParaRPr>
-          </a:p>
-          <a:p>
-            <a:pPr algn="just">
-              <a:defRPr/>
-            </a:pPr>
-            <a:endParaRPr lang="en-US" sz="3000" dirty="0" smtClean="0">
-              <a:latin typeface="Arial" charset="0"/>
-            </a:endParaRPr>
-          </a:p>
-          <a:p>
-            <a:pPr algn="just">
-              <a:defRPr/>
-            </a:pPr>
-            <a:endParaRPr lang="en-US" sz="3000" dirty="0">
-              <a:latin typeface="Arial" charset="0"/>
-            </a:endParaRPr>
-          </a:p>
-          <a:p>
-            <a:pPr algn="just">
-              <a:defRPr/>
-            </a:pPr>
-            <a:endParaRPr lang="en-US" sz="3000" dirty="0" smtClean="0">
-              <a:latin typeface="Arial" charset="0"/>
-            </a:endParaRPr>
-          </a:p>
-          <a:p>
-            <a:pPr algn="just">
-              <a:defRPr/>
-            </a:pPr>
-            <a:endParaRPr lang="en-US" sz="3000" dirty="0">
-              <a:latin typeface="Arial" charset="0"/>
-            </a:endParaRPr>
-          </a:p>
-          <a:p>
-            <a:pPr algn="just">
-              <a:defRPr/>
-            </a:pPr>
-            <a:endParaRPr lang="en-US" sz="3000" dirty="0" smtClean="0">
-              <a:latin typeface="Arial" charset="0"/>
-            </a:endParaRPr>
-          </a:p>
-          <a:p>
-            <a:pPr algn="just">
-              <a:defRPr/>
-            </a:pPr>
-            <a:endParaRPr lang="en-US" sz="3000" dirty="0">
-              <a:latin typeface="Arial" charset="0"/>
-            </a:endParaRPr>
-          </a:p>
-          <a:p>
-            <a:pPr algn="just">
-              <a:defRPr/>
-            </a:pPr>
-            <a:endParaRPr lang="en-US" sz="3000" dirty="0" smtClean="0">
-              <a:latin typeface="Arial" charset="0"/>
-            </a:endParaRPr>
-          </a:p>
-          <a:p>
-            <a:pPr algn="just">
-              <a:defRPr/>
-            </a:pPr>
-            <a:endParaRPr lang="en-US" sz="3000" dirty="0" smtClean="0">
-              <a:latin typeface="Arial" charset="0"/>
-            </a:endParaRPr>
-          </a:p>
-          <a:p>
-            <a:pPr algn="just">
-              <a:defRPr/>
-            </a:pPr>
-            <a:endParaRPr lang="en-US" sz="3000" dirty="0">
-              <a:latin typeface="Arial" charset="0"/>
-            </a:endParaRPr>
-          </a:p>
-          <a:p>
-            <a:pPr algn="just">
-              <a:defRPr/>
-            </a:pPr>
-            <a:endParaRPr lang="en-US" sz="3000" dirty="0">
-              <a:latin typeface="Arial" charset="0"/>
-            </a:endParaRPr>
-          </a:p>
-          <a:p>
-            <a:pPr algn="just">
-              <a:defRPr/>
-            </a:pPr>
-            <a:endParaRPr lang="en-US" sz="3000" dirty="0" smtClean="0">
-              <a:latin typeface="Arial" charset="0"/>
-            </a:endParaRPr>
-          </a:p>
-          <a:p>
-            <a:pPr algn="just">
-              <a:defRPr/>
-            </a:pPr>
-            <a:endParaRPr lang="en-US" sz="3000" dirty="0">
-              <a:latin typeface="Arial" charset="0"/>
-            </a:endParaRPr>
-          </a:p>
-          <a:p>
-            <a:pPr algn="just">
-              <a:defRPr/>
-            </a:pPr>
-            <a:endParaRPr lang="en-US" sz="3000" dirty="0" smtClean="0">
-              <a:latin typeface="Arial" charset="0"/>
-            </a:endParaRPr>
-          </a:p>
-          <a:p>
-            <a:pPr algn="just">
-              <a:defRPr/>
-            </a:pPr>
-            <a:endParaRPr lang="en-US" sz="3000" dirty="0" smtClean="0">
-              <a:latin typeface="Arial" charset="0"/>
-            </a:endParaRPr>
-          </a:p>
-          <a:p>
-            <a:pPr algn="just">
-              <a:defRPr/>
-            </a:pPr>
-            <a:endParaRPr lang="en-US" sz="3000" dirty="0" smtClean="0">
-              <a:latin typeface="Arial" charset="0"/>
-            </a:endParaRPr>
-          </a:p>
-          <a:p>
-            <a:pPr algn="just">
-              <a:defRPr/>
-            </a:pPr>
-            <a:r>
-              <a:rPr lang="en-US" sz="3000" b="1" dirty="0" smtClean="0">
-                <a:latin typeface="Arial" charset="0"/>
-              </a:rPr>
-              <a:t>Figure 3.</a:t>
-            </a:r>
-            <a:r>
-              <a:rPr lang="en-US" sz="3000" dirty="0" smtClean="0">
-                <a:latin typeface="Arial" charset="0"/>
-              </a:rPr>
-              <a:t> </a:t>
-            </a:r>
-            <a:r>
-              <a:rPr lang="en-US" sz="3000" dirty="0">
-                <a:latin typeface="Arial" charset="0"/>
-              </a:rPr>
-              <a:t>Ward’s method </a:t>
-            </a:r>
-            <a:r>
-              <a:rPr lang="en-US" sz="3000" dirty="0" smtClean="0">
-                <a:latin typeface="Arial" charset="0"/>
-              </a:rPr>
-              <a:t>of hierarchical </a:t>
-            </a:r>
-            <a:r>
-              <a:rPr lang="en-US" sz="3000" dirty="0">
-                <a:latin typeface="Arial" charset="0"/>
-              </a:rPr>
-              <a:t>clustering </a:t>
-            </a:r>
-            <a:r>
-              <a:rPr lang="en-US" sz="3000" dirty="0" smtClean="0">
-                <a:latin typeface="Arial" charset="0"/>
-              </a:rPr>
-              <a:t>using the Euclidean distance </a:t>
-            </a:r>
-            <a:r>
-              <a:rPr lang="en-US" sz="3000" dirty="0">
-                <a:latin typeface="Arial" charset="0"/>
-              </a:rPr>
-              <a:t>function on normalized </a:t>
-            </a:r>
-            <a:r>
-              <a:rPr lang="en-US" sz="3000" dirty="0" smtClean="0">
-                <a:latin typeface="Arial" charset="0"/>
-              </a:rPr>
-              <a:t>average </a:t>
-            </a:r>
-            <a:r>
-              <a:rPr lang="en-US" sz="3000" dirty="0">
-                <a:latin typeface="Arial" charset="0"/>
-              </a:rPr>
-              <a:t>beta </a:t>
-            </a:r>
-            <a:r>
-              <a:rPr lang="en-US" sz="3000" dirty="0" smtClean="0">
-                <a:latin typeface="Arial" charset="0"/>
-              </a:rPr>
-              <a:t>values for </a:t>
-            </a:r>
-            <a:r>
-              <a:rPr lang="en-US" sz="3000" dirty="0" err="1">
-                <a:latin typeface="Arial" charset="0"/>
-              </a:rPr>
-              <a:t>CpG</a:t>
-            </a:r>
-            <a:r>
-              <a:rPr lang="en-US" sz="3000" dirty="0">
-                <a:latin typeface="Arial" charset="0"/>
-              </a:rPr>
-              <a:t> </a:t>
-            </a:r>
-            <a:r>
-              <a:rPr lang="en-US" sz="3000" dirty="0" smtClean="0">
-                <a:latin typeface="Arial" charset="0"/>
-              </a:rPr>
-              <a:t>islands.</a:t>
-            </a:r>
           </a:p>
         </p:txBody>
       </p:sp>
@@ -6257,8 +5572,8 @@
         </p:nvSpPr>
         <p:spPr bwMode="auto">
           <a:xfrm>
-            <a:off x="29792684" y="23803728"/>
-            <a:ext cx="13465173" cy="1050131"/>
+            <a:off x="14837111" y="21788700"/>
+            <a:ext cx="13711201" cy="1050131"/>
           </a:xfrm>
           <a:prstGeom prst="roundRect">
             <a:avLst>
@@ -6333,108 +5648,14 @@
       </p:sp>
       <p:sp>
         <p:nvSpPr>
-          <p:cNvPr id="82" name="Rounded Rectangle 113"/>
-          <p:cNvSpPr>
-            <a:spLocks noChangeArrowheads="1"/>
-          </p:cNvSpPr>
-          <p:nvPr/>
-        </p:nvSpPr>
-        <p:spPr bwMode="auto">
-          <a:xfrm>
-            <a:off x="15031412" y="28629225"/>
-            <a:ext cx="14171496" cy="1152222"/>
-          </a:xfrm>
-          <a:prstGeom prst="roundRect">
-            <a:avLst>
-              <a:gd name="adj" fmla="val 16667"/>
-            </a:avLst>
-          </a:prstGeom>
-          <a:solidFill>
-            <a:srgbClr val="000066"/>
-          </a:solidFill>
-          <a:ln w="127000" algn="ctr">
-            <a:solidFill>
-              <a:schemeClr val="bg1"/>
-            </a:solidFill>
-            <a:round/>
-            <a:headEnd/>
-            <a:tailEnd/>
-          </a:ln>
-        </p:spPr>
-        <p:txBody>
-          <a:bodyPr anchor="ctr" anchorCtr="0"/>
-          <a:lstStyle/>
-          <a:p>
-            <a:pPr algn="ctr" defTabSz="1881188"/>
-            <a:r>
-              <a:rPr lang="en-US" sz="4500" dirty="0">
-                <a:solidFill>
-                  <a:schemeClr val="bg1"/>
-                </a:solidFill>
-                <a:sym typeface="Wingdings 2" panose="05020102010507070707" pitchFamily="18" charset="2"/>
-              </a:rPr>
-              <a:t></a:t>
-            </a:r>
-            <a:r>
-              <a:rPr lang="en-US" sz="4500" b="1" dirty="0">
-                <a:solidFill>
-                  <a:schemeClr val="bg1"/>
-                </a:solidFill>
-                <a:sym typeface="Wingdings 2" panose="05020102010507070707" pitchFamily="18" charset="2"/>
-              </a:rPr>
-              <a:t> </a:t>
-            </a:r>
-            <a:r>
-              <a:rPr lang="en-US" sz="4500" b="1" dirty="0" smtClean="0">
-                <a:solidFill>
-                  <a:schemeClr val="bg1"/>
-                </a:solidFill>
-              </a:rPr>
-              <a:t>References</a:t>
-            </a:r>
-            <a:r>
-              <a:rPr lang="en-US" sz="4500" dirty="0">
-                <a:solidFill>
-                  <a:schemeClr val="bg1"/>
-                </a:solidFill>
-              </a:rPr>
-              <a:t> </a:t>
-            </a:r>
-            <a:r>
-              <a:rPr lang="en-US" sz="4500" dirty="0">
-                <a:solidFill>
-                  <a:schemeClr val="bg1"/>
-                </a:solidFill>
-                <a:sym typeface="Wingdings 2" panose="05020102010507070707" pitchFamily="18" charset="2"/>
-              </a:rPr>
-              <a:t></a:t>
-            </a:r>
-            <a:r>
-              <a:rPr lang="en-US" sz="4500" b="1" dirty="0" smtClean="0">
-                <a:solidFill>
-                  <a:schemeClr val="bg1"/>
-                </a:solidFill>
-              </a:rPr>
-              <a:t> </a:t>
-            </a:r>
-            <a:endParaRPr lang="en-US" sz="4500" b="1" i="1" dirty="0">
-              <a:solidFill>
-                <a:schemeClr val="bg1"/>
-              </a:solidFill>
-            </a:endParaRPr>
-          </a:p>
-        </p:txBody>
-      </p:sp>
-      <p:sp>
-        <p:nvSpPr>
           <p:cNvPr id="83" name="TextBox 82"/>
           <p:cNvSpPr txBox="1"/>
           <p:nvPr/>
         </p:nvSpPr>
         <p:spPr>
           <a:xfrm>
-            <a:off x="15031412" y="29913499"/>
-            <a:ext cx="14171496" cy="2600712"/>
+            <a:off x="468305" y="29932314"/>
+            <a:ext cx="13701192" cy="2508379"/>
           </a:xfrm>
           <a:prstGeom prst="rect">
             <a:avLst/>
@@ -6456,43 +5677,90 @@
           </a:bodyPr>
           <a:lstStyle/>
           <a:p>
+            <a:pPr algn="just">
+              <a:defRPr/>
+            </a:pPr>
+            <a:r>
+              <a:rPr lang="en-US" sz="2000" b="1" dirty="0" smtClean="0">
+                <a:latin typeface="Arial" charset="0"/>
+              </a:rPr>
+              <a:t>Acknowledgements</a:t>
+            </a:r>
+          </a:p>
+          <a:p>
+            <a:pPr algn="just">
+              <a:defRPr/>
+            </a:pPr>
+            <a:r>
+              <a:rPr lang="en-US" sz="1400" dirty="0">
+                <a:latin typeface="Arial" charset="0"/>
+              </a:rPr>
+              <a:t>UBC 2015 W2 STAT 540 instructors and teaching assistants.</a:t>
+            </a:r>
+          </a:p>
+          <a:p>
+            <a:pPr algn="just">
+              <a:defRPr/>
+            </a:pPr>
+            <a:endParaRPr lang="en-US" sz="1600" dirty="0" smtClean="0">
+              <a:latin typeface="Arial" charset="0"/>
+            </a:endParaRPr>
+          </a:p>
+          <a:p>
+            <a:pPr algn="just">
+              <a:defRPr/>
+            </a:pPr>
+            <a:r>
+              <a:rPr lang="en-US" sz="2000" b="1" dirty="0" smtClean="0">
+                <a:latin typeface="Arial" charset="0"/>
+              </a:rPr>
+              <a:t>References</a:t>
+            </a:r>
+          </a:p>
+          <a:p>
             <a:pPr marL="457200" indent="-457200" algn="just">
               <a:buAutoNum type="arabicPeriod"/>
               <a:defRPr/>
             </a:pPr>
             <a:r>
-              <a:rPr lang="en-US" sz="2000" dirty="0">
+              <a:rPr lang="en-US" sz="1400" dirty="0" smtClean="0">
                 <a:latin typeface="Arial" charset="0"/>
               </a:rPr>
-              <a:t>Li, </a:t>
-            </a:r>
-            <a:r>
-              <a:rPr lang="en-US" sz="2000" dirty="0" smtClean="0">
+              <a:t>Li</a:t>
+            </a:r>
+            <a:r>
+              <a:rPr lang="en-US" sz="1400" dirty="0">
                 <a:latin typeface="Arial" charset="0"/>
               </a:rPr>
+              <a:t>, </a:t>
+            </a:r>
+            <a:r>
+              <a:rPr lang="en-US" sz="1400" dirty="0" smtClean="0">
+                <a:latin typeface="Arial" charset="0"/>
+              </a:rPr>
               <a:t>J. et al. </a:t>
             </a:r>
             <a:r>
-              <a:rPr lang="en-US" sz="2000" dirty="0">
+              <a:rPr lang="en-US" sz="1400" dirty="0">
                 <a:latin typeface="Arial" charset="0"/>
               </a:rPr>
               <a:t>"Epigenetic Biomarkers: Potential Applications in Gastrointestinal Cancers." ISRN </a:t>
             </a:r>
             <a:r>
-              <a:rPr lang="en-US" sz="2000" dirty="0" smtClean="0">
+              <a:rPr lang="en-US" sz="1400" dirty="0" smtClean="0">
                 <a:latin typeface="Arial" charset="0"/>
               </a:rPr>
               <a:t>gastroenterology. </a:t>
             </a:r>
             <a:r>
-              <a:rPr lang="en-CA" sz="2000" dirty="0"/>
+              <a:rPr lang="en-CA" sz="1400" dirty="0"/>
               <a:t>Mar 6;2014:464015</a:t>
             </a:r>
             <a:r>
-              <a:rPr lang="en-CA" sz="2000" dirty="0" smtClean="0"/>
+              <a:rPr lang="en-CA" sz="1400" dirty="0" smtClean="0"/>
               <a:t>.</a:t>
             </a:r>
-            <a:endParaRPr lang="en-US" sz="2000" dirty="0" smtClean="0">
+            <a:endParaRPr lang="en-US" sz="1400" dirty="0" smtClean="0">
               <a:latin typeface="Arial" charset="0"/>
             </a:endParaRPr>
           </a:p>
@@ -6502,42 +5770,42 @@
               <a:defRPr/>
             </a:pPr>
             <a:r>
-              <a:rPr lang="en-US" sz="2000" dirty="0" smtClean="0">
+              <a:rPr lang="en-US" sz="1400" dirty="0" smtClean="0">
                 <a:latin typeface="Arial" charset="0"/>
               </a:rPr>
               <a:t>Luo</a:t>
             </a:r>
             <a:r>
-              <a:rPr lang="en-US" sz="2000" dirty="0">
+              <a:rPr lang="en-US" sz="1400" dirty="0">
                 <a:latin typeface="Arial" charset="0"/>
               </a:rPr>
               <a:t>, </a:t>
             </a:r>
             <a:r>
-              <a:rPr lang="en-US" sz="2000" dirty="0" smtClean="0">
+              <a:rPr lang="en-US" sz="1400" dirty="0" smtClean="0">
                 <a:latin typeface="Arial" charset="0"/>
               </a:rPr>
               <a:t>Y. et </a:t>
             </a:r>
             <a:r>
-              <a:rPr lang="en-US" sz="2000" dirty="0">
+              <a:rPr lang="en-US" sz="1400" dirty="0">
                 <a:latin typeface="Arial" charset="0"/>
               </a:rPr>
               <a:t>al. "Differences in DNA methylation signatures reveal multiple pathways of progression from adenoma to colorectal cancer." </a:t>
             </a:r>
             <a:r>
-              <a:rPr lang="en-US" sz="2000" dirty="0" smtClean="0">
+              <a:rPr lang="en-US" sz="1400" dirty="0" smtClean="0">
                 <a:latin typeface="Arial" charset="0"/>
               </a:rPr>
               <a:t>Gastroenterology</a:t>
             </a:r>
             <a:r>
-              <a:rPr lang="en-US" sz="2000" dirty="0">
+              <a:rPr lang="en-US" sz="1400" dirty="0">
                 <a:latin typeface="Arial" charset="0"/>
               </a:rPr>
               <a:t>. 2014 Aug;147(2):418-29.e8.</a:t>
             </a:r>
-            <a:endParaRPr lang="en-CA" sz="2000" dirty="0">
+            <a:endParaRPr lang="en-CA" sz="1400" dirty="0">
               <a:latin typeface="Arial" charset="0"/>
             </a:endParaRPr>
           </a:p>
@@ -6547,94 +5815,13 @@
               <a:defRPr/>
             </a:pPr>
             <a:r>
-              <a:rPr lang="en-CA" sz="2000" dirty="0" err="1" smtClean="0">
-                <a:latin typeface="Arial" charset="0"/>
-              </a:rPr>
-              <a:t>Maksimovic</a:t>
-            </a:r>
-            <a:r>
-              <a:rPr lang="en-CA" sz="2000" dirty="0">
-                <a:latin typeface="Arial" charset="0"/>
-              </a:rPr>
-              <a:t>, </a:t>
-            </a:r>
-            <a:r>
-              <a:rPr lang="en-CA" sz="2000" dirty="0" smtClean="0">
-                <a:latin typeface="Arial" charset="0"/>
-              </a:rPr>
-              <a:t>J. et al. </a:t>
-            </a:r>
-            <a:r>
-              <a:rPr lang="en-CA" sz="2000" dirty="0">
-                <a:latin typeface="Arial" charset="0"/>
-              </a:rPr>
-              <a:t>"SWAN: Subset-</a:t>
-            </a:r>
-            <a:r>
-              <a:rPr lang="en-CA" sz="2000" dirty="0" err="1">
-                <a:latin typeface="Arial" charset="0"/>
-              </a:rPr>
-              <a:t>quantile</a:t>
-            </a:r>
-            <a:r>
-              <a:rPr lang="en-CA" sz="2000" dirty="0">
-                <a:latin typeface="Arial" charset="0"/>
-              </a:rPr>
-              <a:t> within array normalization for </a:t>
-            </a:r>
-            <a:r>
-              <a:rPr lang="en-CA" sz="2000" dirty="0" err="1">
-                <a:latin typeface="Arial" charset="0"/>
-              </a:rPr>
-              <a:t>illumina</a:t>
-            </a:r>
-            <a:r>
-              <a:rPr lang="en-CA" sz="2000" dirty="0">
-                <a:latin typeface="Arial" charset="0"/>
-              </a:rPr>
-              <a:t> </a:t>
-            </a:r>
-            <a:r>
-              <a:rPr lang="en-CA" sz="2000" dirty="0" err="1">
-                <a:latin typeface="Arial" charset="0"/>
-              </a:rPr>
-              <a:t>infinium</a:t>
-            </a:r>
-            <a:r>
-              <a:rPr lang="en-CA" sz="2000" dirty="0">
-                <a:latin typeface="Arial" charset="0"/>
-              </a:rPr>
-              <a:t> HumanMethylation450 </a:t>
-            </a:r>
-            <a:r>
-              <a:rPr lang="en-CA" sz="2000" dirty="0" err="1">
-                <a:latin typeface="Arial" charset="0"/>
-              </a:rPr>
-              <a:t>BeadChips</a:t>
-            </a:r>
-            <a:r>
-              <a:rPr lang="en-CA" sz="2000" dirty="0">
-                <a:latin typeface="Arial" charset="0"/>
-              </a:rPr>
-              <a:t>." Genome </a:t>
-            </a:r>
-            <a:r>
-              <a:rPr lang="en-CA" sz="2000" dirty="0" smtClean="0">
-                <a:latin typeface="Arial" charset="0"/>
-              </a:rPr>
-              <a:t>Biol. </a:t>
-            </a:r>
-            <a:r>
-              <a:rPr lang="en-CA" sz="2000" dirty="0"/>
-              <a:t>2012 Jun 15;13(6):</a:t>
-            </a:r>
-            <a:r>
-              <a:rPr lang="en-CA" sz="2000" dirty="0" smtClean="0"/>
-              <a:t>R44.</a:t>
-            </a:r>
-            <a:endParaRPr lang="en-CA" sz="2000" dirty="0" smtClean="0">
-              <a:latin typeface="Arial" charset="0"/>
-            </a:endParaRPr>
+              <a:rPr lang="en-US" sz="1400" dirty="0"/>
+              <a:t>Canadian Cancer Society’s Advisory Committee on Cancer Statistics. Canadian Cancer Statistics 2014. Toronto, ON: Canadian Cancer Society; </a:t>
+            </a:r>
+            <a:r>
+              <a:rPr lang="en-US" sz="1400" dirty="0" smtClean="0"/>
+              <a:t>2014</a:t>
+            </a:r>
           </a:p>
           <a:p>
             <a:pPr marL="457200" indent="-457200" algn="just">
@@ -6642,36 +5829,36 @@
               <a:defRPr/>
             </a:pPr>
             <a:r>
-              <a:rPr lang="en-CA" sz="2000" dirty="0" err="1" smtClean="0">
+              <a:rPr lang="en-CA" sz="1400" dirty="0" err="1" smtClean="0">
                 <a:latin typeface="Arial" charset="0"/>
               </a:rPr>
               <a:t>Yasukochi</a:t>
             </a:r>
             <a:r>
-              <a:rPr lang="en-CA" sz="2000" dirty="0">
+              <a:rPr lang="en-CA" sz="1400" dirty="0">
                 <a:latin typeface="Arial" charset="0"/>
               </a:rPr>
               <a:t>, </a:t>
             </a:r>
             <a:r>
-              <a:rPr lang="en-CA" sz="2000" dirty="0" smtClean="0">
+              <a:rPr lang="en-CA" sz="1400" dirty="0" smtClean="0">
                 <a:latin typeface="Arial" charset="0"/>
               </a:rPr>
               <a:t>Y. </a:t>
             </a:r>
             <a:r>
-              <a:rPr lang="en-CA" sz="2000" dirty="0">
+              <a:rPr lang="en-CA" sz="1400" dirty="0">
                 <a:latin typeface="Arial" charset="0"/>
               </a:rPr>
               <a:t>et al. "X chromosome-wide analyses of genomic DNA methylation states and gene expression in male and female neutrophils." </a:t>
             </a:r>
             <a:r>
-              <a:rPr lang="pl-PL" sz="2000" dirty="0">
+              <a:rPr lang="pl-PL" sz="1400" dirty="0">
                 <a:latin typeface="Arial" charset="0"/>
               </a:rPr>
               <a:t>Proc Natl Acad Sci U S A. 2010 Feb 23;107(8):3704-9</a:t>
             </a:r>
-            <a:endParaRPr lang="en-US" sz="2000" dirty="0">
+            <a:endParaRPr lang="en-US" sz="1400" dirty="0">
               <a:latin typeface="Arial" charset="0"/>
             </a:endParaRPr>
           </a:p>
@@ -6686,7 +5873,7 @@
           <p:nvPr/>
         </p:nvPicPr>
         <p:blipFill rotWithShape="1">
-          <a:blip r:embed="rId6" cstate="print">
+          <a:blip r:embed="rId5" cstate="print">
             <a:extLst>
               <a:ext uri="{28A0092B-C50C-407E-A947-70E740481C1C}">
                 <a14:useLocalDpi xmlns:a14="http://schemas.microsoft.com/office/drawing/2010/main" val="0"/>
@@ -6698,37 +5885,8 @@
         </p:blipFill>
         <p:spPr>
           <a:xfrm>
-            <a:off x="16712790" y="5616630"/>
-            <a:ext cx="10776491" cy="6702701"/>
-          </a:xfrm>
-          <a:prstGeom prst="rect">
-            <a:avLst/>
-          </a:prstGeom>
-        </p:spPr>
-      </p:pic>
-      <p:pic>
-        <p:nvPicPr>
-          <p:cNvPr id="10" name="Picture 9"/>
-          <p:cNvPicPr>
-            <a:picLocks noChangeAspect="1"/>
-          </p:cNvPicPr>
-          <p:nvPr/>
-        </p:nvPicPr>
-        <p:blipFill rotWithShape="1">
-          <a:blip r:embed="rId7">
-            <a:extLst>
-              <a:ext uri="{28A0092B-C50C-407E-A947-70E740481C1C}">
-                <a14:useLocalDpi xmlns:a14="http://schemas.microsoft.com/office/drawing/2010/main" val="0"/>
-              </a:ext>
-            </a:extLst>
-          </a:blip>
-          <a:srcRect t="4496"/>
-          <a:stretch/>
-        </p:blipFill>
-        <p:spPr>
-          <a:xfrm>
-            <a:off x="15209095" y="13582067"/>
-            <a:ext cx="13716000" cy="9824496"/>
+            <a:off x="928103" y="20419797"/>
+            <a:ext cx="13137724" cy="8171328"/>
           </a:xfrm>
           <a:prstGeom prst="rect">
             <a:avLst/>
@@ -6744,13 +5902,13 @@
           <p:nvPr>
             <p:extLst>
               <p:ext uri="{D42A27DB-BD31-4B8C-83A1-F6EECF244321}">
-                <p14:modId xmlns:p14="http://schemas.microsoft.com/office/powerpoint/2010/main" val="1729344150"/>
+                <p14:modId xmlns:p14="http://schemas.microsoft.com/office/powerpoint/2010/main" val="4192973001"/>
               </p:ext>
             </p:extLst>
           </p:nvPr>
         </p:nvGraphicFramePr>
         <p:xfrm>
-          <a:off x="997529" y="15112371"/>
+          <a:off x="807029" y="16055346"/>
           <a:ext cx="13106397" cy="2743200"/>
         </p:xfrm>
         <a:graphic>
@@ -7154,8 +6312,8 @@
         </p:nvSpPr>
         <p:spPr bwMode="auto">
           <a:xfrm>
-            <a:off x="29814936" y="28619943"/>
-            <a:ext cx="13466664" cy="1152000"/>
+            <a:off x="29215926" y="28619943"/>
+            <a:ext cx="14065674" cy="1152000"/>
           </a:xfrm>
           <a:prstGeom prst="roundRect">
             <a:avLst>
@@ -7238,8 +6396,8 @@
         </p:nvSpPr>
         <p:spPr>
           <a:xfrm>
-            <a:off x="29814936" y="29992530"/>
-            <a:ext cx="13466664" cy="754053"/>
+            <a:off x="29215926" y="29992530"/>
+            <a:ext cx="14065674" cy="630942"/>
           </a:xfrm>
           <a:prstGeom prst="rect">
             <a:avLst/>
@@ -7265,18 +6423,12 @@
               <a:defRPr/>
             </a:pPr>
             <a:r>
-              <a:rPr lang="en-US" sz="4000" dirty="0" smtClean="0">
+              <a:rPr lang="en-US" sz="3200" dirty="0" smtClean="0">
                 <a:latin typeface="Arial" charset="0"/>
               </a:rPr>
-              <a:t>TODO: Conclusion</a:t>
-            </a:r>
-            <a:r>
-              <a:rPr lang="en-US" sz="4000" dirty="0" smtClean="0">
-                <a:latin typeface="Arial" charset="0"/>
-              </a:rPr>
-              <a:t>…</a:t>
-            </a:r>
-            <a:endParaRPr lang="en-US" sz="4000" dirty="0">
+              <a:t>TODO: Conclusion…</a:t>
+            </a:r>
+            <a:endParaRPr lang="en-US" sz="3200" dirty="0">
               <a:latin typeface="Arial" charset="0"/>
             </a:endParaRPr>
           </a:p>
@@ -7290,8 +6442,8 @@
         </p:nvSpPr>
         <p:spPr>
           <a:xfrm>
-            <a:off x="29792684" y="24979195"/>
-            <a:ext cx="13455344" cy="3585597"/>
+            <a:off x="14837111" y="22964167"/>
+            <a:ext cx="13701192" cy="630942"/>
           </a:xfrm>
           <a:prstGeom prst="rect">
             <a:avLst/>
@@ -7316,558 +6468,13 @@
             <a:pPr algn="just">
               <a:defRPr/>
             </a:pPr>
-            <a:endParaRPr lang="en-US" sz="3200" dirty="0">
-              <a:latin typeface="Arial" charset="0"/>
-            </a:endParaRPr>
-          </a:p>
-          <a:p>
-            <a:pPr algn="just">
-              <a:defRPr/>
-            </a:pPr>
-            <a:endParaRPr lang="en-US" sz="3200" dirty="0" smtClean="0">
-              <a:latin typeface="Arial" charset="0"/>
-            </a:endParaRPr>
-          </a:p>
-          <a:p>
-            <a:pPr algn="just">
-              <a:defRPr/>
-            </a:pPr>
-            <a:endParaRPr lang="en-US" sz="3200" dirty="0" smtClean="0">
-              <a:latin typeface="Arial" charset="0"/>
-            </a:endParaRPr>
-          </a:p>
-          <a:p>
-            <a:pPr algn="just">
-              <a:defRPr/>
-            </a:pPr>
-            <a:endParaRPr lang="en-US" sz="3200" dirty="0">
-              <a:latin typeface="Arial" charset="0"/>
-            </a:endParaRPr>
-          </a:p>
-          <a:p>
-            <a:pPr algn="just">
-              <a:defRPr/>
-            </a:pPr>
-            <a:endParaRPr lang="en-US" sz="3200" dirty="0" smtClean="0">
-              <a:latin typeface="Arial" charset="0"/>
-            </a:endParaRPr>
-          </a:p>
-          <a:p>
-            <a:pPr algn="just">
-              <a:defRPr/>
-            </a:pPr>
-            <a:endParaRPr lang="en-US" sz="3200" dirty="0">
-              <a:latin typeface="Arial" charset="0"/>
-            </a:endParaRPr>
-          </a:p>
-          <a:p>
-            <a:pPr algn="just">
-              <a:defRPr/>
-            </a:pPr>
-            <a:endParaRPr lang="en-US" sz="3200" dirty="0" smtClean="0">
-              <a:latin typeface="Arial" charset="0"/>
-            </a:endParaRPr>
-          </a:p>
-        </p:txBody>
-      </p:sp>
-      <p:sp>
-        <p:nvSpPr>
-          <p:cNvPr id="39" name="TextBox 38"/>
-          <p:cNvSpPr txBox="1"/>
-          <p:nvPr/>
-        </p:nvSpPr>
-        <p:spPr>
-          <a:xfrm>
-            <a:off x="29814936" y="5551132"/>
-            <a:ext cx="13442921" cy="18358872"/>
-          </a:xfrm>
-          <a:prstGeom prst="rect">
-            <a:avLst/>
-          </a:prstGeom>
-          <a:solidFill>
-            <a:schemeClr val="bg1"/>
-          </a:solidFill>
-          <a:ln>
-            <a:solidFill>
-              <a:schemeClr val="bg1">
-                <a:lumMod val="65000"/>
-              </a:schemeClr>
-            </a:solidFill>
-          </a:ln>
-        </p:spPr>
-        <p:txBody>
-          <a:bodyPr wrap="square" lIns="137160" tIns="68580" rIns="137160" bIns="68580">
-            <a:spAutoFit/>
-          </a:bodyPr>
-          <a:lstStyle/>
-          <a:p>
-            <a:pPr algn="just">
-              <a:defRPr/>
-            </a:pPr>
-            <a:endParaRPr lang="en-US" sz="3200" dirty="0" smtClean="0">
-              <a:latin typeface="Arial" charset="0"/>
-            </a:endParaRPr>
-          </a:p>
-          <a:p>
-            <a:pPr algn="just">
-              <a:defRPr/>
-            </a:pPr>
-            <a:endParaRPr lang="en-US" sz="3200" dirty="0">
-              <a:latin typeface="Arial" charset="0"/>
-            </a:endParaRPr>
-          </a:p>
-          <a:p>
-            <a:pPr algn="just">
-              <a:defRPr/>
-            </a:pPr>
-            <a:endParaRPr lang="en-US" sz="3200" dirty="0" smtClean="0">
-              <a:latin typeface="Arial" charset="0"/>
-            </a:endParaRPr>
-          </a:p>
-          <a:p>
-            <a:pPr algn="just">
-              <a:defRPr/>
-            </a:pPr>
-            <a:endParaRPr lang="en-US" sz="3200" dirty="0">
-              <a:latin typeface="Arial" charset="0"/>
-            </a:endParaRPr>
-          </a:p>
-          <a:p>
-            <a:pPr algn="just">
-              <a:defRPr/>
-            </a:pPr>
-            <a:endParaRPr lang="en-US" sz="3200" dirty="0" smtClean="0">
-              <a:latin typeface="Arial" charset="0"/>
-            </a:endParaRPr>
-          </a:p>
-          <a:p>
-            <a:pPr algn="just">
-              <a:defRPr/>
-            </a:pPr>
-            <a:endParaRPr lang="en-US" sz="3200" dirty="0">
-              <a:latin typeface="Arial" charset="0"/>
-            </a:endParaRPr>
-          </a:p>
-          <a:p>
-            <a:pPr algn="just">
-              <a:defRPr/>
-            </a:pPr>
-            <a:endParaRPr lang="en-US" sz="3200" dirty="0" smtClean="0">
-              <a:latin typeface="Arial" charset="0"/>
-            </a:endParaRPr>
-          </a:p>
-          <a:p>
-            <a:pPr algn="just">
-              <a:defRPr/>
-            </a:pPr>
-            <a:endParaRPr lang="en-US" sz="3200" dirty="0">
-              <a:latin typeface="Arial" charset="0"/>
-            </a:endParaRPr>
-          </a:p>
-          <a:p>
-            <a:pPr algn="just">
-              <a:defRPr/>
-            </a:pPr>
-            <a:endParaRPr lang="en-US" sz="3200" dirty="0" smtClean="0">
-              <a:latin typeface="Arial" charset="0"/>
-            </a:endParaRPr>
-          </a:p>
-          <a:p>
-            <a:pPr algn="just">
-              <a:defRPr/>
-            </a:pPr>
-            <a:endParaRPr lang="en-US" sz="3200" dirty="0">
-              <a:latin typeface="Arial" charset="0"/>
-            </a:endParaRPr>
-          </a:p>
-          <a:p>
-            <a:pPr algn="just">
-              <a:defRPr/>
-            </a:pPr>
-            <a:endParaRPr lang="en-US" sz="3200" dirty="0" smtClean="0">
-              <a:latin typeface="Arial" charset="0"/>
-            </a:endParaRPr>
-          </a:p>
-          <a:p>
-            <a:pPr algn="just">
-              <a:defRPr/>
-            </a:pPr>
-            <a:endParaRPr lang="en-US" sz="3200" dirty="0">
-              <a:latin typeface="Arial" charset="0"/>
-            </a:endParaRPr>
-          </a:p>
-          <a:p>
-            <a:pPr algn="just">
-              <a:defRPr/>
-            </a:pPr>
-            <a:endParaRPr lang="en-US" sz="3200" dirty="0" smtClean="0">
-              <a:latin typeface="Arial" charset="0"/>
-            </a:endParaRPr>
-          </a:p>
-          <a:p>
-            <a:pPr algn="just">
-              <a:defRPr/>
-            </a:pPr>
-            <a:endParaRPr lang="en-US" sz="3200" dirty="0">
-              <a:latin typeface="Arial" charset="0"/>
-            </a:endParaRPr>
-          </a:p>
-          <a:p>
-            <a:pPr algn="just">
-              <a:defRPr/>
-            </a:pPr>
-            <a:endParaRPr lang="en-US" sz="3200" dirty="0" smtClean="0">
-              <a:latin typeface="Arial" charset="0"/>
-            </a:endParaRPr>
-          </a:p>
-          <a:p>
-            <a:pPr algn="just">
-              <a:defRPr/>
-            </a:pPr>
-            <a:r>
-              <a:rPr lang="en-US" sz="3200" b="1" dirty="0" smtClean="0">
-                <a:latin typeface="Arial" charset="0"/>
-              </a:rPr>
-              <a:t>Figure 4. </a:t>
-            </a:r>
-            <a:r>
-              <a:rPr lang="en-US" sz="3200" dirty="0" err="1" smtClean="0">
-                <a:latin typeface="Arial" charset="0"/>
-              </a:rPr>
-              <a:t>Heatmaps</a:t>
-            </a:r>
             <a:r>
               <a:rPr lang="en-US" sz="3200" dirty="0" smtClean="0">
                 <a:latin typeface="Arial" charset="0"/>
               </a:rPr>
-              <a:t> of M values top hits from </a:t>
-            </a:r>
-            <a:r>
-              <a:rPr lang="en-US" sz="3200" dirty="0" err="1" smtClean="0">
-                <a:latin typeface="Arial" charset="0"/>
-              </a:rPr>
-              <a:t>limma</a:t>
-            </a:r>
-            <a:r>
-              <a:rPr lang="en-US" sz="3200" dirty="0" smtClean="0">
-                <a:latin typeface="Arial" charset="0"/>
-              </a:rPr>
-              <a:t> at FDR of 1e-7.</a:t>
-            </a:r>
-            <a:endParaRPr lang="en-US" sz="3200" dirty="0">
-              <a:latin typeface="Arial" charset="0"/>
-            </a:endParaRPr>
-          </a:p>
-          <a:p>
-            <a:pPr algn="just">
-              <a:defRPr/>
-            </a:pPr>
+              <a:t>TODO: FEA table and 3 important point…</a:t>
+            </a:r>
             <a:endParaRPr lang="en-US" sz="3200" dirty="0" smtClean="0">
-              <a:latin typeface="Arial" charset="0"/>
-            </a:endParaRPr>
-          </a:p>
-          <a:p>
-            <a:pPr algn="just">
-              <a:defRPr/>
-            </a:pPr>
-            <a:endParaRPr lang="en-US" sz="3200" dirty="0">
-              <a:latin typeface="Arial" charset="0"/>
-            </a:endParaRPr>
-          </a:p>
-          <a:p>
-            <a:pPr algn="just">
-              <a:defRPr/>
-            </a:pPr>
-            <a:endParaRPr lang="en-US" sz="3200" dirty="0" smtClean="0">
-              <a:latin typeface="Arial" charset="0"/>
-            </a:endParaRPr>
-          </a:p>
-          <a:p>
-            <a:pPr algn="just">
-              <a:defRPr/>
-            </a:pPr>
-            <a:endParaRPr lang="en-US" sz="3200" dirty="0">
-              <a:latin typeface="Arial" charset="0"/>
-            </a:endParaRPr>
-          </a:p>
-          <a:p>
-            <a:pPr algn="just">
-              <a:defRPr/>
-            </a:pPr>
-            <a:endParaRPr lang="en-US" sz="3200" dirty="0" smtClean="0">
-              <a:latin typeface="Arial" charset="0"/>
-            </a:endParaRPr>
-          </a:p>
-          <a:p>
-            <a:pPr algn="just">
-              <a:defRPr/>
-            </a:pPr>
-            <a:endParaRPr lang="en-US" sz="3200" dirty="0">
-              <a:latin typeface="Arial" charset="0"/>
-            </a:endParaRPr>
-          </a:p>
-          <a:p>
-            <a:pPr algn="just">
-              <a:defRPr/>
-            </a:pPr>
-            <a:endParaRPr lang="en-US" sz="3200" dirty="0" smtClean="0">
-              <a:latin typeface="Arial" charset="0"/>
-            </a:endParaRPr>
-          </a:p>
-          <a:p>
-            <a:pPr algn="just">
-              <a:defRPr/>
-            </a:pPr>
-            <a:endParaRPr lang="en-US" sz="3200" dirty="0">
-              <a:latin typeface="Arial" charset="0"/>
-            </a:endParaRPr>
-          </a:p>
-          <a:p>
-            <a:pPr algn="just">
-              <a:defRPr/>
-            </a:pPr>
-            <a:endParaRPr lang="en-US" sz="3200" dirty="0" smtClean="0">
-              <a:latin typeface="Arial" charset="0"/>
-            </a:endParaRPr>
-          </a:p>
-          <a:p>
-            <a:pPr algn="just">
-              <a:defRPr/>
-            </a:pPr>
-            <a:endParaRPr lang="en-US" sz="3200" dirty="0">
-              <a:latin typeface="Arial" charset="0"/>
-            </a:endParaRPr>
-          </a:p>
-          <a:p>
-            <a:pPr algn="just">
-              <a:defRPr/>
-            </a:pPr>
-            <a:r>
-              <a:rPr lang="en-US" sz="3200" b="1" dirty="0" smtClean="0">
-                <a:latin typeface="Arial" charset="0"/>
-              </a:rPr>
-              <a:t>Figure 5.</a:t>
-            </a:r>
-            <a:r>
-              <a:rPr lang="en-US" sz="3200" dirty="0" smtClean="0">
-                <a:latin typeface="Arial" charset="0"/>
-              </a:rPr>
-              <a:t> Top 3 differentially methylated and 3 non-differentially methylated </a:t>
-            </a:r>
-            <a:r>
-              <a:rPr lang="en-US" sz="3200" dirty="0" err="1" smtClean="0">
-                <a:latin typeface="Arial" charset="0"/>
-              </a:rPr>
-              <a:t>CpG</a:t>
-            </a:r>
-            <a:r>
-              <a:rPr lang="en-US" sz="3200" dirty="0" smtClean="0">
-                <a:latin typeface="Arial" charset="0"/>
-              </a:rPr>
-              <a:t> islands for each comparison.</a:t>
-            </a:r>
-          </a:p>
-          <a:p>
-            <a:pPr algn="just">
-              <a:defRPr/>
-            </a:pPr>
-            <a:endParaRPr lang="en-US" sz="3200" dirty="0">
-              <a:latin typeface="Arial" charset="0"/>
-            </a:endParaRPr>
-          </a:p>
-          <a:p>
-            <a:pPr algn="just">
-              <a:defRPr/>
-            </a:pPr>
-            <a:endParaRPr lang="en-US" sz="3200" dirty="0" smtClean="0">
-              <a:latin typeface="Arial" charset="0"/>
-            </a:endParaRPr>
-          </a:p>
-          <a:p>
-            <a:pPr algn="just">
-              <a:defRPr/>
-            </a:pPr>
-            <a:endParaRPr lang="en-US" sz="3200" dirty="0">
-              <a:latin typeface="Arial" charset="0"/>
-            </a:endParaRPr>
-          </a:p>
-          <a:p>
-            <a:pPr algn="just">
-              <a:defRPr/>
-            </a:pPr>
-            <a:endParaRPr lang="en-US" sz="3200" dirty="0" smtClean="0">
-              <a:latin typeface="Arial" charset="0"/>
-            </a:endParaRPr>
-          </a:p>
-          <a:p>
-            <a:pPr algn="just">
-              <a:defRPr/>
-            </a:pPr>
-            <a:endParaRPr lang="en-US" sz="3200" dirty="0" smtClean="0">
-              <a:latin typeface="Arial" charset="0"/>
-            </a:endParaRPr>
-          </a:p>
-          <a:p>
-            <a:pPr algn="just">
-              <a:defRPr/>
-            </a:pPr>
-            <a:endParaRPr lang="en-US" sz="3200" dirty="0" smtClean="0">
-              <a:latin typeface="Arial" charset="0"/>
-            </a:endParaRPr>
-          </a:p>
-          <a:p>
-            <a:pPr algn="just">
-              <a:defRPr/>
-            </a:pPr>
-            <a:endParaRPr lang="en-US" sz="3200" dirty="0">
-              <a:latin typeface="Arial" charset="0"/>
-            </a:endParaRPr>
-          </a:p>
-          <a:p>
-            <a:pPr algn="just">
-              <a:defRPr/>
-            </a:pPr>
-            <a:endParaRPr lang="en-US" sz="3200" dirty="0">
-              <a:latin typeface="Arial" charset="0"/>
-            </a:endParaRPr>
-          </a:p>
-          <a:p>
-            <a:pPr algn="just">
-              <a:defRPr/>
-            </a:pPr>
-            <a:endParaRPr lang="en-US" sz="3200" dirty="0">
-              <a:latin typeface="Arial" charset="0"/>
-            </a:endParaRPr>
-          </a:p>
-        </p:txBody>
-      </p:sp>
-      <p:sp>
-        <p:nvSpPr>
-          <p:cNvPr id="40" name="Rounded Rectangle 113"/>
-          <p:cNvSpPr>
-            <a:spLocks noChangeArrowheads="1"/>
-          </p:cNvSpPr>
-          <p:nvPr/>
-        </p:nvSpPr>
-        <p:spPr bwMode="auto">
-          <a:xfrm>
-            <a:off x="596889" y="30607793"/>
-            <a:ext cx="13822493" cy="1152000"/>
-          </a:xfrm>
-          <a:prstGeom prst="roundRect">
-            <a:avLst>
-              <a:gd name="adj" fmla="val 16667"/>
-            </a:avLst>
-          </a:prstGeom>
-          <a:solidFill>
-            <a:srgbClr val="000066"/>
-          </a:solidFill>
-          <a:ln w="127000" algn="ctr">
-            <a:solidFill>
-              <a:schemeClr val="bg1"/>
-            </a:solidFill>
-            <a:round/>
-            <a:headEnd/>
-            <a:tailEnd/>
-          </a:ln>
-        </p:spPr>
-        <p:txBody>
-          <a:bodyPr anchor="ctr" anchorCtr="0"/>
-          <a:lstStyle/>
-          <a:p>
-            <a:pPr algn="ctr" defTabSz="1881188"/>
-            <a:r>
-              <a:rPr lang="en-US" sz="4500" dirty="0">
-                <a:solidFill>
-                  <a:schemeClr val="bg1"/>
-                </a:solidFill>
-                <a:sym typeface="Wingdings 2" panose="05020102010507070707" pitchFamily="18" charset="2"/>
-              </a:rPr>
-              <a:t></a:t>
-            </a:r>
-            <a:r>
-              <a:rPr lang="en-US" sz="4500" b="1" dirty="0">
-                <a:solidFill>
-                  <a:schemeClr val="bg1"/>
-                </a:solidFill>
-                <a:sym typeface="Wingdings 2" panose="05020102010507070707" pitchFamily="18" charset="2"/>
-              </a:rPr>
-              <a:t> </a:t>
-            </a:r>
-            <a:r>
-              <a:rPr lang="en-US" sz="4500" b="1" dirty="0" smtClean="0">
-                <a:solidFill>
-                  <a:schemeClr val="bg1"/>
-                </a:solidFill>
-              </a:rPr>
-              <a:t>Acknowledgements</a:t>
-            </a:r>
-            <a:r>
-              <a:rPr lang="en-US" sz="4500" dirty="0">
-                <a:solidFill>
-                  <a:schemeClr val="bg1"/>
-                </a:solidFill>
-              </a:rPr>
-              <a:t> </a:t>
-            </a:r>
-            <a:r>
-              <a:rPr lang="en-US" sz="4500" dirty="0">
-                <a:solidFill>
-                  <a:schemeClr val="bg1"/>
-                </a:solidFill>
-                <a:sym typeface="Wingdings 2" panose="05020102010507070707" pitchFamily="18" charset="2"/>
-              </a:rPr>
-              <a:t></a:t>
-            </a:r>
-            <a:endParaRPr lang="en-US" sz="4500" b="1" dirty="0">
-              <a:solidFill>
-                <a:schemeClr val="bg1"/>
-              </a:solidFill>
-            </a:endParaRPr>
-          </a:p>
-        </p:txBody>
-      </p:sp>
-      <p:sp>
-        <p:nvSpPr>
-          <p:cNvPr id="41" name="TextBox 40"/>
-          <p:cNvSpPr txBox="1"/>
-          <p:nvPr/>
-        </p:nvSpPr>
-        <p:spPr>
-          <a:xfrm>
-            <a:off x="646633" y="31870651"/>
-            <a:ext cx="13772393" cy="600164"/>
-          </a:xfrm>
-          <a:prstGeom prst="rect">
-            <a:avLst/>
-          </a:prstGeom>
-          <a:solidFill>
-            <a:schemeClr val="bg1"/>
-          </a:solidFill>
-          <a:ln>
-            <a:solidFill>
-              <a:schemeClr val="bg1">
-                <a:lumMod val="65000"/>
-              </a:schemeClr>
-            </a:solidFill>
-          </a:ln>
-        </p:spPr>
-        <p:txBody>
-          <a:bodyPr wrap="square" lIns="137160" tIns="68580" rIns="137160" bIns="68580">
-            <a:spAutoFit/>
-          </a:bodyPr>
-          <a:lstStyle/>
-          <a:p>
-            <a:pPr algn="just">
-              <a:defRPr/>
-            </a:pPr>
-            <a:r>
-              <a:rPr lang="en-US" sz="3000" dirty="0" smtClean="0">
-                <a:latin typeface="Arial" charset="0"/>
-              </a:rPr>
-              <a:t>UBC 2015 W2 STAT 540 instructors and teaching assistants.</a:t>
-            </a:r>
-            <a:endParaRPr lang="en-US" sz="3000" dirty="0">
               <a:latin typeface="Arial" charset="0"/>
             </a:endParaRPr>
           </a:p>
@@ -7881,7 +6488,7 @@
         </p:nvGrpSpPr>
         <p:grpSpPr>
           <a:xfrm>
-            <a:off x="9432121" y="5598475"/>
+            <a:off x="9241621" y="6016215"/>
             <a:ext cx="4927876" cy="3167515"/>
             <a:chOff x="29410898" y="7675418"/>
             <a:chExt cx="4927876" cy="3167515"/>
@@ -7966,16 +6573,6 @@
                 </a:rPr>
                 <a:t>ormal</a:t>
               </a:r>
-              <a:endParaRPr kumimoji="0" lang="en-CA" sz="3000" b="0" i="0" u="none" strike="noStrike" cap="none" normalizeH="0" baseline="0" dirty="0" smtClean="0">
-                <a:ln>
-                  <a:noFill/>
-                </a:ln>
-                <a:solidFill>
-                  <a:schemeClr val="tx1"/>
-                </a:solidFill>
-                <a:effectLst/>
-                <a:latin typeface="Arial" charset="0"/>
-              </a:endParaRPr>
             </a:p>
           </p:txBody>
         </p:sp>
@@ -8499,8 +7096,8 @@
         </p:nvSpPr>
         <p:spPr>
           <a:xfrm>
-            <a:off x="684348" y="5449952"/>
-            <a:ext cx="8507279" cy="3539430"/>
+            <a:off x="489560" y="5397868"/>
+            <a:ext cx="8723486" cy="4524315"/>
           </a:xfrm>
           <a:prstGeom prst="rect">
             <a:avLst/>
@@ -8513,148 +7110,116 @@
           </a:bodyPr>
           <a:lstStyle/>
           <a:p>
-            <a:pPr algn="just">
-              <a:defRPr/>
-            </a:pPr>
-            <a:r>
-              <a:rPr lang="en-CA" sz="3200" dirty="0">
-                <a:latin typeface="Arial" charset="0"/>
-              </a:rPr>
-              <a:t>Colorectal cancer (CRC) is associated </a:t>
-            </a:r>
-            <a:r>
-              <a:rPr lang="en-CA" sz="3200" dirty="0" smtClean="0">
-                <a:latin typeface="Arial" charset="0"/>
-              </a:rPr>
-              <a:t>with the </a:t>
-            </a:r>
-            <a:r>
-              <a:rPr lang="en-CA" sz="3200" dirty="0">
-                <a:latin typeface="Arial" charset="0"/>
-              </a:rPr>
-              <a:t>accumulation of aberrant </a:t>
-            </a:r>
-            <a:r>
-              <a:rPr lang="en-CA" sz="3200" dirty="0" smtClean="0">
-                <a:latin typeface="Arial" charset="0"/>
-              </a:rPr>
-              <a:t>DNA methylation </a:t>
-            </a:r>
-            <a:r>
-              <a:rPr lang="en-CA" sz="3200" dirty="0">
-                <a:latin typeface="Arial" charset="0"/>
-              </a:rPr>
-              <a:t>[1]. This includes </a:t>
-            </a:r>
-            <a:r>
-              <a:rPr lang="en-CA" sz="3200" dirty="0" smtClean="0">
-                <a:latin typeface="Arial" charset="0"/>
-              </a:rPr>
-              <a:t>hyper-methylation of </a:t>
-            </a:r>
-            <a:r>
-              <a:rPr lang="en-CA" sz="3200" dirty="0" err="1">
-                <a:latin typeface="Arial" charset="0"/>
-              </a:rPr>
+            <a:pPr algn="just"/>
+            <a:r>
+              <a:rPr lang="en-US" sz="3200" dirty="0"/>
+              <a:t>Aberrant DNA methylation can lead to malignancy by </a:t>
+            </a:r>
+            <a:r>
+              <a:rPr lang="en-US" sz="3200" dirty="0" smtClean="0"/>
+              <a:t>hyper-methylation </a:t>
+            </a:r>
+            <a:r>
+              <a:rPr lang="en-US" sz="3200" dirty="0"/>
+              <a:t>of </a:t>
+            </a:r>
+            <a:r>
+              <a:rPr lang="en-US" sz="3200" dirty="0" err="1"/>
               <a:t>CpG</a:t>
             </a:r>
             <a:r>
-              <a:rPr lang="en-CA" sz="3200" dirty="0">
-                <a:latin typeface="Arial" charset="0"/>
-              </a:rPr>
-              <a:t> islands (CGI) which are </a:t>
-            </a:r>
-            <a:r>
-              <a:rPr lang="en-CA" sz="3200" dirty="0" smtClean="0">
-                <a:latin typeface="Arial" charset="0"/>
-              </a:rPr>
-              <a:t>sequences with </a:t>
-            </a:r>
-            <a:r>
-              <a:rPr lang="en-CA" sz="3200" dirty="0">
-                <a:latin typeface="Arial" charset="0"/>
-              </a:rPr>
-              <a:t>high </a:t>
-            </a:r>
-            <a:r>
-              <a:rPr lang="en-CA" sz="3200" dirty="0" err="1">
-                <a:latin typeface="Arial" charset="0"/>
-              </a:rPr>
+              <a:rPr lang="en-US" sz="3200" dirty="0"/>
+              <a:t> </a:t>
+            </a:r>
+            <a:r>
+              <a:rPr lang="en-US" sz="3200" dirty="0" smtClean="0"/>
+              <a:t>islands </a:t>
+            </a:r>
+            <a:r>
+              <a:rPr lang="en-US" sz="3200" dirty="0"/>
+              <a:t>(CGIs)</a:t>
+            </a:r>
+            <a:r>
+              <a:rPr lang="en-US" sz="3200" dirty="0" smtClean="0"/>
+              <a:t> </a:t>
+            </a:r>
+            <a:r>
+              <a:rPr lang="en-US" sz="3200" dirty="0"/>
+              <a:t>resulting in transcriptional silencing of </a:t>
+            </a:r>
+            <a:r>
+              <a:rPr lang="en-US" sz="3200" dirty="0" smtClean="0"/>
+              <a:t>tumor </a:t>
+            </a:r>
+            <a:r>
+              <a:rPr lang="en-US" sz="3200" dirty="0"/>
+              <a:t>suppressor genes. </a:t>
+            </a:r>
+            <a:r>
+              <a:rPr lang="en-US" sz="3200" dirty="0" smtClean="0"/>
+              <a:t>CGIs are </a:t>
+            </a:r>
+            <a:r>
+              <a:rPr lang="en-US" sz="3200" dirty="0"/>
+              <a:t>sequences with high </a:t>
+            </a:r>
+            <a:r>
+              <a:rPr lang="en-US" sz="3200" dirty="0" err="1"/>
               <a:t>CpG</a:t>
             </a:r>
             <a:r>
-              <a:rPr lang="en-CA" sz="3200" dirty="0">
-                <a:latin typeface="Arial" charset="0"/>
-              </a:rPr>
-              <a:t> fraction (&gt;50%) located </a:t>
-            </a:r>
-            <a:r>
-              <a:rPr lang="en-CA" sz="3200" dirty="0" smtClean="0">
-                <a:latin typeface="Arial" charset="0"/>
-              </a:rPr>
-              <a:t>within gene </a:t>
-            </a:r>
-            <a:r>
-              <a:rPr lang="en-CA" sz="3200" dirty="0">
-                <a:latin typeface="Arial" charset="0"/>
-              </a:rPr>
-              <a:t>promoters resulting in </a:t>
-            </a:r>
-            <a:r>
-              <a:rPr lang="en-CA" sz="3200" dirty="0" smtClean="0">
-                <a:latin typeface="Arial" charset="0"/>
-              </a:rPr>
-              <a:t>transcriptional silencing </a:t>
-            </a:r>
-            <a:r>
-              <a:rPr lang="en-CA" sz="3200" dirty="0">
-                <a:latin typeface="Arial" charset="0"/>
-              </a:rPr>
-              <a:t>of tumour suppressor genes [1]. </a:t>
-            </a:r>
-            <a:endParaRPr lang="en-CA" sz="3200" dirty="0">
-              <a:latin typeface="Arial" charset="0"/>
-            </a:endParaRPr>
+              <a:rPr lang="en-US" sz="3200" dirty="0"/>
+              <a:t> fractions (&gt;50%) located within gene promoters and methylation at these sites promotes association of methyl-binding proteins and subsequent recruitment of transcriptional repressors</a:t>
+            </a:r>
+            <a:r>
+              <a:rPr lang="en-US" sz="3200" baseline="30000" dirty="0"/>
+              <a:t>1,2</a:t>
+            </a:r>
+            <a:r>
+              <a:rPr lang="en-US" sz="3200" dirty="0"/>
+              <a:t>. </a:t>
+            </a:r>
+            <a:endParaRPr lang="en-CA" sz="3200" dirty="0"/>
           </a:p>
         </p:txBody>
       </p:sp>
       <p:grpSp>
         <p:nvGrpSpPr>
-          <p:cNvPr id="2065" name="Group 2064"/>
+          <p:cNvPr id="20" name="Group 19"/>
           <p:cNvGrpSpPr/>
           <p:nvPr/>
         </p:nvGrpSpPr>
         <p:grpSpPr>
           <a:xfrm>
-            <a:off x="30032941" y="5777360"/>
-            <a:ext cx="13043637" cy="6932528"/>
-            <a:chOff x="30204391" y="5758310"/>
-            <a:chExt cx="12664009" cy="6730761"/>
+            <a:off x="29778959" y="14507536"/>
+            <a:ext cx="13266664" cy="3961930"/>
+            <a:chOff x="29778959" y="14393236"/>
+            <a:chExt cx="13266664" cy="3961930"/>
           </a:xfrm>
         </p:grpSpPr>
         <p:pic>
           <p:nvPicPr>
-            <p:cNvPr id="2053" name="Picture 2052"/>
+            <p:cNvPr id="2068" name="Picture 2067"/>
             <p:cNvPicPr>
               <a:picLocks noChangeAspect="1"/>
             </p:cNvPicPr>
             <p:nvPr/>
           </p:nvPicPr>
           <p:blipFill rotWithShape="1">
-            <a:blip r:embed="rId8">
+            <a:blip r:embed="rId6" cstate="print">
               <a:extLst>
                 <a:ext uri="{28A0092B-C50C-407E-A947-70E740481C1C}">
                   <a14:useLocalDpi xmlns:a14="http://schemas.microsoft.com/office/drawing/2010/main" val="0"/>
                 </a:ext>
               </a:extLst>
             </a:blip>
-            <a:srcRect l="27282" t="3480" r="17605" b="7066"/>
+            <a:srcRect l="1038" t="2514" r="16145" b="3398"/>
             <a:stretch/>
           </p:blipFill>
           <p:spPr>
             <a:xfrm>
-              <a:off x="34469537" y="5788384"/>
-              <a:ext cx="4126716" cy="6698181"/>
+              <a:off x="29778959" y="14408006"/>
+              <a:ext cx="4320118" cy="3931744"/>
             </a:xfrm>
             <a:prstGeom prst="rect">
               <a:avLst/>
@@ -8663,27 +7228,27 @@
         </p:pic>
         <p:pic>
           <p:nvPicPr>
-            <p:cNvPr id="2052" name="Picture 2051"/>
+            <p:cNvPr id="2069" name="Picture 2068"/>
             <p:cNvPicPr>
               <a:picLocks noChangeAspect="1"/>
             </p:cNvPicPr>
             <p:nvPr/>
           </p:nvPicPr>
           <p:blipFill rotWithShape="1">
-            <a:blip r:embed="rId9">
+            <a:blip r:embed="rId7" cstate="print">
               <a:extLst>
                 <a:ext uri="{28A0092B-C50C-407E-A947-70E740481C1C}">
                   <a14:useLocalDpi xmlns:a14="http://schemas.microsoft.com/office/drawing/2010/main" val="0"/>
                 </a:ext>
               </a:extLst>
             </a:blip>
-            <a:srcRect l="27307" t="3444" r="17618" b="6993"/>
+            <a:srcRect l="1319" t="2452" r="16253" b="3246"/>
             <a:stretch/>
           </p:blipFill>
           <p:spPr>
             <a:xfrm>
-              <a:off x="30204391" y="5780228"/>
-              <a:ext cx="4123871" cy="6706337"/>
+              <a:off x="34247075" y="14393236"/>
+              <a:ext cx="4323099" cy="3961929"/>
             </a:xfrm>
             <a:prstGeom prst="rect">
               <a:avLst/>
@@ -8692,27 +7257,332 @@
         </p:pic>
         <p:pic>
           <p:nvPicPr>
-            <p:cNvPr id="2057" name="Picture 2056"/>
+            <p:cNvPr id="2070" name="Picture 2069"/>
             <p:cNvPicPr>
               <a:picLocks noChangeAspect="1"/>
             </p:cNvPicPr>
             <p:nvPr/>
           </p:nvPicPr>
           <p:blipFill rotWithShape="1">
-            <a:blip r:embed="rId10">
+            <a:blip r:embed="rId8" cstate="print">
               <a:extLst>
                 <a:ext uri="{28A0092B-C50C-407E-A947-70E740481C1C}">
                   <a14:useLocalDpi xmlns:a14="http://schemas.microsoft.com/office/drawing/2010/main" val="0"/>
                 </a:ext>
               </a:extLst>
             </a:blip>
-            <a:srcRect l="27219" t="3371" r="17611" b="7032"/>
+            <a:srcRect l="1212" t="3033" r="16666" b="3313"/>
             <a:stretch/>
           </p:blipFill>
           <p:spPr>
             <a:xfrm>
-              <a:off x="38737527" y="5780228"/>
-              <a:ext cx="4130873" cy="6708843"/>
+              <a:off x="38718170" y="14401801"/>
+              <a:ext cx="4327453" cy="3953365"/>
+            </a:xfrm>
+            <a:prstGeom prst="rect">
+              <a:avLst/>
+            </a:prstGeom>
+          </p:spPr>
+        </p:pic>
+      </p:grpSp>
+      <p:sp>
+        <p:nvSpPr>
+          <p:cNvPr id="5" name="Rectangle 4"/>
+          <p:cNvSpPr/>
+          <p:nvPr/>
+        </p:nvSpPr>
+        <p:spPr bwMode="auto">
+          <a:xfrm>
+            <a:off x="468306" y="20264972"/>
+            <a:ext cx="13701192" cy="9464182"/>
+          </a:xfrm>
+          <a:prstGeom prst="rect">
+            <a:avLst/>
+          </a:prstGeom>
+          <a:noFill/>
+          <a:ln w="9525" cap="flat" cmpd="sng" algn="ctr">
+            <a:solidFill>
+              <a:schemeClr val="bg1">
+                <a:lumMod val="50000"/>
+              </a:schemeClr>
+            </a:solidFill>
+            <a:prstDash val="solid"/>
+            <a:round/>
+            <a:headEnd type="none" w="med" len="med"/>
+            <a:tailEnd type="none" w="med" len="med"/>
+          </a:ln>
+          <a:effectLst/>
+        </p:spPr>
+        <p:txBody>
+          <a:bodyPr vert="horz" wrap="square" lIns="91440" tIns="45720" rIns="91440" bIns="45720" numCol="1" rtlCol="0" anchor="t" anchorCtr="0" compatLnSpc="1">
+            <a:prstTxWarp prst="textNoShape">
+              <a:avLst/>
+            </a:prstTxWarp>
+          </a:bodyPr>
+          <a:lstStyle/>
+          <a:p>
+            <a:pPr marL="0" marR="0" indent="0" algn="l" defTabSz="2508250" rtl="0" eaLnBrk="1" fontAlgn="base" latinLnBrk="0" hangingPunct="1">
+              <a:lnSpc>
+                <a:spcPct val="100000"/>
+              </a:lnSpc>
+              <a:spcBef>
+                <a:spcPct val="0"/>
+              </a:spcBef>
+              <a:spcAft>
+                <a:spcPct val="0"/>
+              </a:spcAft>
+              <a:buClrTx/>
+              <a:buSzTx/>
+              <a:buFontTx/>
+              <a:buNone/>
+              <a:tabLst/>
+            </a:pPr>
+            <a:endParaRPr kumimoji="0" lang="en-CA" sz="4900" b="0" i="0" u="none" strike="noStrike" cap="none" normalizeH="0" baseline="0" smtClean="0">
+              <a:ln>
+                <a:noFill/>
+              </a:ln>
+              <a:solidFill>
+                <a:schemeClr val="tx1"/>
+              </a:solidFill>
+              <a:effectLst/>
+              <a:latin typeface="Arial" charset="0"/>
+            </a:endParaRPr>
+          </a:p>
+        </p:txBody>
+      </p:sp>
+      <p:sp>
+        <p:nvSpPr>
+          <p:cNvPr id="57" name="Rectangle 56"/>
+          <p:cNvSpPr/>
+          <p:nvPr/>
+        </p:nvSpPr>
+        <p:spPr bwMode="auto">
+          <a:xfrm>
+            <a:off x="495276" y="14717833"/>
+            <a:ext cx="13674221" cy="4341125"/>
+          </a:xfrm>
+          <a:prstGeom prst="rect">
+            <a:avLst/>
+          </a:prstGeom>
+          <a:noFill/>
+          <a:ln w="9525" cap="flat" cmpd="sng" algn="ctr">
+            <a:solidFill>
+              <a:schemeClr val="bg1">
+                <a:lumMod val="50000"/>
+              </a:schemeClr>
+            </a:solidFill>
+            <a:prstDash val="solid"/>
+            <a:round/>
+            <a:headEnd type="none" w="med" len="med"/>
+            <a:tailEnd type="none" w="med" len="med"/>
+          </a:ln>
+          <a:effectLst/>
+        </p:spPr>
+        <p:txBody>
+          <a:bodyPr vert="horz" wrap="square" lIns="91440" tIns="45720" rIns="91440" bIns="45720" numCol="1" rtlCol="0" anchor="t" anchorCtr="0" compatLnSpc="1">
+            <a:prstTxWarp prst="textNoShape">
+              <a:avLst/>
+            </a:prstTxWarp>
+          </a:bodyPr>
+          <a:lstStyle/>
+          <a:p>
+            <a:pPr marL="0" marR="0" indent="0" algn="l" defTabSz="2508250" rtl="0" eaLnBrk="1" fontAlgn="base" latinLnBrk="0" hangingPunct="1">
+              <a:lnSpc>
+                <a:spcPct val="100000"/>
+              </a:lnSpc>
+              <a:spcBef>
+                <a:spcPct val="0"/>
+              </a:spcBef>
+              <a:spcAft>
+                <a:spcPct val="0"/>
+              </a:spcAft>
+              <a:buClrTx/>
+              <a:buSzTx/>
+              <a:buFontTx/>
+              <a:buNone/>
+              <a:tabLst/>
+            </a:pPr>
+            <a:endParaRPr kumimoji="0" lang="en-CA" sz="4900" b="0" i="0" u="none" strike="noStrike" cap="none" normalizeH="0" baseline="0" smtClean="0">
+              <a:ln>
+                <a:noFill/>
+              </a:ln>
+              <a:solidFill>
+                <a:schemeClr val="tx1"/>
+              </a:solidFill>
+              <a:effectLst/>
+              <a:latin typeface="Arial" charset="0"/>
+            </a:endParaRPr>
+          </a:p>
+        </p:txBody>
+      </p:sp>
+      <p:sp>
+        <p:nvSpPr>
+          <p:cNvPr id="58" name="Rectangle 57"/>
+          <p:cNvSpPr/>
+          <p:nvPr/>
+        </p:nvSpPr>
+        <p:spPr bwMode="auto">
+          <a:xfrm>
+            <a:off x="14837111" y="5379420"/>
+            <a:ext cx="13701192" cy="16070880"/>
+          </a:xfrm>
+          <a:prstGeom prst="rect">
+            <a:avLst/>
+          </a:prstGeom>
+          <a:noFill/>
+          <a:ln w="9525" cap="flat" cmpd="sng" algn="ctr">
+            <a:solidFill>
+              <a:schemeClr val="bg1">
+                <a:lumMod val="50000"/>
+              </a:schemeClr>
+            </a:solidFill>
+            <a:prstDash val="solid"/>
+            <a:round/>
+            <a:headEnd type="none" w="med" len="med"/>
+            <a:tailEnd type="none" w="med" len="med"/>
+          </a:ln>
+          <a:effectLst/>
+        </p:spPr>
+        <p:txBody>
+          <a:bodyPr vert="horz" wrap="square" lIns="91440" tIns="45720" rIns="91440" bIns="45720" numCol="1" rtlCol="0" anchor="t" anchorCtr="0" compatLnSpc="1">
+            <a:prstTxWarp prst="textNoShape">
+              <a:avLst/>
+            </a:prstTxWarp>
+          </a:bodyPr>
+          <a:lstStyle/>
+          <a:p>
+            <a:pPr marL="0" marR="0" indent="0" algn="l" defTabSz="2508250" rtl="0" eaLnBrk="1" fontAlgn="base" latinLnBrk="0" hangingPunct="1">
+              <a:lnSpc>
+                <a:spcPct val="100000"/>
+              </a:lnSpc>
+              <a:spcBef>
+                <a:spcPct val="0"/>
+              </a:spcBef>
+              <a:spcAft>
+                <a:spcPct val="0"/>
+              </a:spcAft>
+              <a:buClrTx/>
+              <a:buSzTx/>
+              <a:buFontTx/>
+              <a:buNone/>
+              <a:tabLst/>
+            </a:pPr>
+            <a:endParaRPr kumimoji="0" lang="en-CA" sz="4900" b="0" i="0" u="none" strike="noStrike" cap="none" normalizeH="0" baseline="0" dirty="0" smtClean="0">
+              <a:ln>
+                <a:noFill/>
+              </a:ln>
+              <a:solidFill>
+                <a:schemeClr val="tx1"/>
+              </a:solidFill>
+              <a:effectLst/>
+              <a:latin typeface="Arial" charset="0"/>
+            </a:endParaRPr>
+          </a:p>
+        </p:txBody>
+      </p:sp>
+      <p:sp>
+        <p:nvSpPr>
+          <p:cNvPr id="65" name="Rectangle 64"/>
+          <p:cNvSpPr/>
+          <p:nvPr/>
+        </p:nvSpPr>
+        <p:spPr bwMode="auto">
+          <a:xfrm>
+            <a:off x="491346" y="5373905"/>
+            <a:ext cx="13701192" cy="8146035"/>
+          </a:xfrm>
+          <a:prstGeom prst="rect">
+            <a:avLst/>
+          </a:prstGeom>
+          <a:noFill/>
+          <a:ln w="9525" cap="flat" cmpd="sng" algn="ctr">
+            <a:solidFill>
+              <a:schemeClr val="bg1">
+                <a:lumMod val="50000"/>
+              </a:schemeClr>
+            </a:solidFill>
+            <a:prstDash val="solid"/>
+            <a:round/>
+            <a:headEnd type="none" w="med" len="med"/>
+            <a:tailEnd type="none" w="med" len="med"/>
+          </a:ln>
+          <a:effectLst/>
+        </p:spPr>
+        <p:txBody>
+          <a:bodyPr vert="horz" wrap="square" lIns="91440" tIns="45720" rIns="91440" bIns="45720" numCol="1" rtlCol="0" anchor="t" anchorCtr="0" compatLnSpc="1">
+            <a:prstTxWarp prst="textNoShape">
+              <a:avLst/>
+            </a:prstTxWarp>
+          </a:bodyPr>
+          <a:lstStyle/>
+          <a:p>
+            <a:pPr marL="0" marR="0" indent="0" algn="l" defTabSz="2508250" rtl="0" eaLnBrk="1" fontAlgn="base" latinLnBrk="0" hangingPunct="1">
+              <a:lnSpc>
+                <a:spcPct val="100000"/>
+              </a:lnSpc>
+              <a:spcBef>
+                <a:spcPct val="0"/>
+              </a:spcBef>
+              <a:spcAft>
+                <a:spcPct val="0"/>
+              </a:spcAft>
+              <a:buClrTx/>
+              <a:buSzTx/>
+              <a:buFontTx/>
+              <a:buNone/>
+              <a:tabLst/>
+            </a:pPr>
+            <a:endParaRPr kumimoji="0" lang="en-CA" sz="4900" b="0" i="0" u="none" strike="noStrike" cap="none" normalizeH="0" baseline="0" smtClean="0">
+              <a:ln>
+                <a:noFill/>
+              </a:ln>
+              <a:solidFill>
+                <a:schemeClr val="tx1"/>
+              </a:solidFill>
+              <a:effectLst/>
+              <a:latin typeface="Arial" charset="0"/>
+            </a:endParaRPr>
+          </a:p>
+        </p:txBody>
+      </p:sp>
+      <p:grpSp>
+        <p:nvGrpSpPr>
+          <p:cNvPr id="16" name="Group 15"/>
+          <p:cNvGrpSpPr/>
+          <p:nvPr/>
+        </p:nvGrpSpPr>
+        <p:grpSpPr>
+          <a:xfrm>
+            <a:off x="14849763" y="5388171"/>
+            <a:ext cx="13502681" cy="14216108"/>
+            <a:chOff x="15040263" y="5388171"/>
+            <a:chExt cx="13502681" cy="14216108"/>
+          </a:xfrm>
+        </p:grpSpPr>
+        <p:pic>
+          <p:nvPicPr>
+            <p:cNvPr id="11" name="Picture 10"/>
+            <p:cNvPicPr>
+              <a:picLocks noChangeAspect="1"/>
+            </p:cNvPicPr>
+            <p:nvPr/>
+          </p:nvPicPr>
+          <p:blipFill>
+            <a:blip r:embed="rId9">
+              <a:extLst>
+                <a:ext uri="{28A0092B-C50C-407E-A947-70E740481C1C}">
+                  <a14:useLocalDpi xmlns:a14="http://schemas.microsoft.com/office/drawing/2010/main" val="0"/>
+                </a:ext>
+              </a:extLst>
+            </a:blip>
+            <a:stretch>
+              <a:fillRect/>
+            </a:stretch>
+          </p:blipFill>
+          <p:spPr>
+            <a:xfrm>
+              <a:off x="15213470" y="6092036"/>
+              <a:ext cx="13329474" cy="7339420"/>
             </a:xfrm>
             <a:prstGeom prst="rect">
               <a:avLst/>
@@ -8721,7 +7591,37 @@
         </p:pic>
         <p:pic>
           <p:nvPicPr>
-            <p:cNvPr id="2063" name="Picture 2062"/>
+            <p:cNvPr id="13" name="Picture 12"/>
+            <p:cNvPicPr>
+              <a:picLocks noChangeAspect="1"/>
+            </p:cNvPicPr>
+            <p:nvPr/>
+          </p:nvPicPr>
+          <p:blipFill>
+            <a:blip r:embed="rId10">
+              <a:extLst>
+                <a:ext uri="{28A0092B-C50C-407E-A947-70E740481C1C}">
+                  <a14:useLocalDpi xmlns:a14="http://schemas.microsoft.com/office/drawing/2010/main" val="0"/>
+                </a:ext>
+              </a:extLst>
+            </a:blip>
+            <a:stretch>
+              <a:fillRect/>
+            </a:stretch>
+          </p:blipFill>
+          <p:spPr>
+            <a:xfrm>
+              <a:off x="15213470" y="13664203"/>
+              <a:ext cx="13329474" cy="5940076"/>
+            </a:xfrm>
+            <a:prstGeom prst="rect">
+              <a:avLst/>
+            </a:prstGeom>
+          </p:spPr>
+        </p:pic>
+        <p:pic>
+          <p:nvPicPr>
+            <p:cNvPr id="14" name="Picture 13"/>
             <p:cNvPicPr>
               <a:picLocks noChangeAspect="1"/>
             </p:cNvPicPr>
@@ -8741,82 +7641,314 @@
           </p:blipFill>
           <p:spPr>
             <a:xfrm>
-              <a:off x="37895471" y="5758310"/>
-              <a:ext cx="1590335" cy="1039834"/>
+              <a:off x="26183643" y="5726592"/>
+              <a:ext cx="2172003" cy="1790950"/>
             </a:xfrm>
             <a:prstGeom prst="rect">
               <a:avLst/>
             </a:prstGeom>
           </p:spPr>
         </p:pic>
+        <p:sp>
+          <p:nvSpPr>
+            <p:cNvPr id="15" name="TextBox 14"/>
+            <p:cNvSpPr txBox="1"/>
+            <p:nvPr/>
+          </p:nvSpPr>
+          <p:spPr>
+            <a:xfrm>
+              <a:off x="15040263" y="5388171"/>
+              <a:ext cx="684803" cy="584775"/>
+            </a:xfrm>
+            <a:prstGeom prst="rect">
+              <a:avLst/>
+            </a:prstGeom>
+            <a:noFill/>
+          </p:spPr>
+          <p:txBody>
+            <a:bodyPr wrap="none" rtlCol="0">
+              <a:spAutoFit/>
+            </a:bodyPr>
+            <a:lstStyle/>
+            <a:p>
+              <a:r>
+                <a:rPr lang="en-CA" sz="3200" b="1" dirty="0" smtClean="0"/>
+                <a:t>(a)</a:t>
+              </a:r>
+              <a:endParaRPr lang="en-CA" sz="3200" b="1" dirty="0"/>
+            </a:p>
+          </p:txBody>
+        </p:sp>
+        <p:sp>
+          <p:nvSpPr>
+            <p:cNvPr id="67" name="TextBox 66"/>
+            <p:cNvSpPr txBox="1"/>
+            <p:nvPr/>
+          </p:nvSpPr>
+          <p:spPr>
+            <a:xfrm>
+              <a:off x="15063957" y="13540657"/>
+              <a:ext cx="707245" cy="584775"/>
+            </a:xfrm>
+            <a:prstGeom prst="rect">
+              <a:avLst/>
+            </a:prstGeom>
+            <a:noFill/>
+          </p:spPr>
+          <p:txBody>
+            <a:bodyPr wrap="none" rtlCol="0">
+              <a:spAutoFit/>
+            </a:bodyPr>
+            <a:lstStyle/>
+            <a:p>
+              <a:r>
+                <a:rPr lang="en-CA" sz="3200" b="1" dirty="0" smtClean="0"/>
+                <a:t>(b)</a:t>
+              </a:r>
+              <a:endParaRPr lang="en-CA" sz="3200" b="1" dirty="0"/>
+            </a:p>
+          </p:txBody>
+        </p:sp>
       </p:grpSp>
-      <p:pic>
-        <p:nvPicPr>
-          <p:cNvPr id="2066" name="Picture 2065"/>
-          <p:cNvPicPr>
-            <a:picLocks noChangeAspect="1"/>
-          </p:cNvPicPr>
+      <p:sp>
+        <p:nvSpPr>
+          <p:cNvPr id="17" name="TextBox 16"/>
+          <p:cNvSpPr txBox="1"/>
           <p:nvPr/>
-        </p:nvPicPr>
-        <p:blipFill>
-          <a:blip r:embed="rId12" cstate="print">
-            <a:extLst>
-              <a:ext uri="{28A0092B-C50C-407E-A947-70E740481C1C}">
-                <a14:useLocalDpi xmlns:a14="http://schemas.microsoft.com/office/drawing/2010/main" val="0"/>
-              </a:ext>
-            </a:extLst>
-          </a:blip>
-          <a:stretch>
-            <a:fillRect/>
-          </a:stretch>
-        </p:blipFill>
+        </p:nvSpPr>
         <p:spPr>
           <a:xfrm>
-            <a:off x="30359513" y="19969697"/>
-            <a:ext cx="3303915" cy="3303915"/>
+            <a:off x="29233510" y="18795494"/>
+            <a:ext cx="14024347" cy="1077218"/>
           </a:xfrm>
           <a:prstGeom prst="rect">
             <a:avLst/>
           </a:prstGeom>
-        </p:spPr>
-      </p:pic>
+          <a:noFill/>
+        </p:spPr>
+        <p:txBody>
+          <a:bodyPr wrap="square" rtlCol="0">
+            <a:spAutoFit/>
+          </a:bodyPr>
+          <a:lstStyle/>
+          <a:p>
+            <a:r>
+              <a:rPr lang="en-US" sz="3200" b="1" dirty="0">
+                <a:latin typeface="Arial" charset="0"/>
+              </a:rPr>
+              <a:t>Figure 5.</a:t>
+            </a:r>
+            <a:r>
+              <a:rPr lang="en-US" sz="3200" dirty="0">
+                <a:latin typeface="Arial" charset="0"/>
+              </a:rPr>
+              <a:t> Top 3 differentially methylated and 3 non-differentially methylated CGIs for each pair-wise group comparison</a:t>
+            </a:r>
+            <a:r>
+              <a:rPr lang="en-US" sz="3200" dirty="0" smtClean="0">
+                <a:latin typeface="Arial" charset="0"/>
+              </a:rPr>
+              <a:t>.</a:t>
+            </a:r>
+            <a:endParaRPr lang="en-US" sz="3200" dirty="0">
+              <a:latin typeface="Arial" charset="0"/>
+            </a:endParaRPr>
+          </a:p>
+        </p:txBody>
+      </p:sp>
+      <p:sp>
+        <p:nvSpPr>
+          <p:cNvPr id="72" name="TextBox 71"/>
+          <p:cNvSpPr txBox="1"/>
+          <p:nvPr/>
+        </p:nvSpPr>
+        <p:spPr>
+          <a:xfrm>
+            <a:off x="29233510" y="13014295"/>
+            <a:ext cx="14024347" cy="1077218"/>
+          </a:xfrm>
+          <a:prstGeom prst="rect">
+            <a:avLst/>
+          </a:prstGeom>
+          <a:noFill/>
+        </p:spPr>
+        <p:txBody>
+          <a:bodyPr wrap="square" rtlCol="0">
+            <a:spAutoFit/>
+          </a:bodyPr>
+          <a:lstStyle/>
+          <a:p>
+            <a:pPr algn="just">
+              <a:defRPr/>
+            </a:pPr>
+            <a:r>
+              <a:rPr lang="en-US" sz="3200" b="1" dirty="0">
+                <a:latin typeface="Arial" charset="0"/>
+              </a:rPr>
+              <a:t>Figure 4. </a:t>
+            </a:r>
+            <a:r>
+              <a:rPr lang="en-US" sz="3200" dirty="0" err="1">
+                <a:latin typeface="Arial" charset="0"/>
+              </a:rPr>
+              <a:t>Heatmaps</a:t>
+            </a:r>
+            <a:r>
+              <a:rPr lang="en-US" sz="3200" dirty="0">
+                <a:latin typeface="Arial" charset="0"/>
+              </a:rPr>
+              <a:t> of M </a:t>
+            </a:r>
+            <a:r>
+              <a:rPr lang="en-US" sz="3200" dirty="0" smtClean="0">
+                <a:latin typeface="Arial" charset="0"/>
+              </a:rPr>
+              <a:t>values of </a:t>
+            </a:r>
+            <a:r>
+              <a:rPr lang="en-US" sz="3200" dirty="0">
+                <a:latin typeface="Arial" charset="0"/>
+              </a:rPr>
+              <a:t>top 450 hits from </a:t>
+            </a:r>
+            <a:r>
+              <a:rPr lang="en-US" sz="3200" dirty="0" err="1" smtClean="0">
+                <a:latin typeface="Arial" charset="0"/>
+              </a:rPr>
+              <a:t>Bioconductor</a:t>
+            </a:r>
+            <a:r>
+              <a:rPr lang="en-US" sz="3200" dirty="0" smtClean="0">
+                <a:latin typeface="Arial" charset="0"/>
+              </a:rPr>
+              <a:t> Linear Models for Microarray Data (</a:t>
+            </a:r>
+            <a:r>
+              <a:rPr lang="en-US" sz="3200" dirty="0" err="1" smtClean="0">
+                <a:latin typeface="Arial" charset="0"/>
+              </a:rPr>
+              <a:t>limma</a:t>
+            </a:r>
+            <a:r>
+              <a:rPr lang="en-US" sz="3200" dirty="0" smtClean="0">
+                <a:latin typeface="Arial" charset="0"/>
+              </a:rPr>
+              <a:t>) </a:t>
+            </a:r>
+            <a:r>
+              <a:rPr lang="en-US" sz="3200" dirty="0">
+                <a:latin typeface="Arial" charset="0"/>
+              </a:rPr>
+              <a:t>at FDR of 1e-7.</a:t>
+            </a:r>
+            <a:endParaRPr lang="en-US" sz="3200" dirty="0">
+              <a:latin typeface="Arial" charset="0"/>
+            </a:endParaRPr>
+          </a:p>
+        </p:txBody>
+      </p:sp>
+      <p:sp>
+        <p:nvSpPr>
+          <p:cNvPr id="73" name="Rectangle 72"/>
+          <p:cNvSpPr/>
+          <p:nvPr/>
+        </p:nvSpPr>
+        <p:spPr bwMode="auto">
+          <a:xfrm>
+            <a:off x="29222216" y="5362529"/>
+            <a:ext cx="14035641" cy="16070880"/>
+          </a:xfrm>
+          <a:prstGeom prst="rect">
+            <a:avLst/>
+          </a:prstGeom>
+          <a:noFill/>
+          <a:ln w="9525" cap="flat" cmpd="sng" algn="ctr">
+            <a:solidFill>
+              <a:schemeClr val="bg1">
+                <a:lumMod val="50000"/>
+              </a:schemeClr>
+            </a:solidFill>
+            <a:prstDash val="solid"/>
+            <a:round/>
+            <a:headEnd type="none" w="med" len="med"/>
+            <a:tailEnd type="none" w="med" len="med"/>
+          </a:ln>
+          <a:effectLst/>
+        </p:spPr>
+        <p:txBody>
+          <a:bodyPr vert="horz" wrap="square" lIns="91440" tIns="45720" rIns="91440" bIns="45720" numCol="1" rtlCol="0" anchor="t" anchorCtr="0" compatLnSpc="1">
+            <a:prstTxWarp prst="textNoShape">
+              <a:avLst/>
+            </a:prstTxWarp>
+          </a:bodyPr>
+          <a:lstStyle/>
+          <a:p>
+            <a:pPr marL="0" marR="0" indent="0" algn="l" defTabSz="2508250" rtl="0" eaLnBrk="1" fontAlgn="base" latinLnBrk="0" hangingPunct="1">
+              <a:lnSpc>
+                <a:spcPct val="100000"/>
+              </a:lnSpc>
+              <a:spcBef>
+                <a:spcPct val="0"/>
+              </a:spcBef>
+              <a:spcAft>
+                <a:spcPct val="0"/>
+              </a:spcAft>
+              <a:buClrTx/>
+              <a:buSzTx/>
+              <a:buFontTx/>
+              <a:buNone/>
+              <a:tabLst/>
+            </a:pPr>
+            <a:endParaRPr kumimoji="0" lang="en-CA" sz="4900" b="0" i="0" u="none" strike="noStrike" cap="none" normalizeH="0" baseline="0" dirty="0" smtClean="0">
+              <a:ln>
+                <a:noFill/>
+              </a:ln>
+              <a:solidFill>
+                <a:schemeClr val="tx1"/>
+              </a:solidFill>
+              <a:effectLst/>
+              <a:latin typeface="Arial" charset="0"/>
+            </a:endParaRPr>
+          </a:p>
+        </p:txBody>
+      </p:sp>
       <p:grpSp>
         <p:nvGrpSpPr>
-          <p:cNvPr id="2071" name="Group 2070"/>
+          <p:cNvPr id="19" name="Group 18"/>
           <p:cNvGrpSpPr/>
           <p:nvPr/>
         </p:nvGrpSpPr>
         <p:grpSpPr>
           <a:xfrm>
-            <a:off x="30000082" y="13542803"/>
-            <a:ext cx="13076495" cy="4312768"/>
-            <a:chOff x="30000082" y="13542803"/>
-            <a:chExt cx="13076495" cy="4312768"/>
+            <a:off x="29275963" y="5670673"/>
+            <a:ext cx="13769661" cy="7157744"/>
+            <a:chOff x="29275963" y="5670673"/>
+            <a:chExt cx="13769661" cy="7157744"/>
           </a:xfrm>
         </p:grpSpPr>
         <p:pic>
           <p:nvPicPr>
-            <p:cNvPr id="2068" name="Picture 2067"/>
+            <p:cNvPr id="2053" name="Picture 2052"/>
             <p:cNvPicPr>
               <a:picLocks noChangeAspect="1"/>
             </p:cNvPicPr>
             <p:nvPr/>
           </p:nvPicPr>
           <p:blipFill rotWithShape="1">
-            <a:blip r:embed="rId13" cstate="print">
+            <a:blip r:embed="rId12">
               <a:extLst>
                 <a:ext uri="{28A0092B-C50C-407E-A947-70E740481C1C}">
                   <a14:useLocalDpi xmlns:a14="http://schemas.microsoft.com/office/drawing/2010/main" val="0"/>
                 </a:ext>
               </a:extLst>
             </a:blip>
-            <a:srcRect l="1038" t="2514" r="16145" b="3398"/>
+            <a:srcRect l="27282" t="3480" r="17605" b="7066"/>
             <a:stretch/>
           </p:blipFill>
           <p:spPr>
             <a:xfrm>
-              <a:off x="30000082" y="13542803"/>
-              <a:ext cx="4280351" cy="4312768"/>
+              <a:off x="34247075" y="5808860"/>
+              <a:ext cx="4323099" cy="7016931"/>
             </a:xfrm>
             <a:prstGeom prst="rect">
               <a:avLst/>
@@ -8825,27 +7957,27 @@
         </p:pic>
         <p:pic>
           <p:nvPicPr>
-            <p:cNvPr id="2069" name="Picture 2068"/>
+            <p:cNvPr id="2052" name="Picture 2051"/>
             <p:cNvPicPr>
               <a:picLocks noChangeAspect="1"/>
             </p:cNvPicPr>
             <p:nvPr/>
           </p:nvPicPr>
           <p:blipFill rotWithShape="1">
-            <a:blip r:embed="rId14" cstate="print">
+            <a:blip r:embed="rId13">
               <a:extLst>
                 <a:ext uri="{28A0092B-C50C-407E-A947-70E740481C1C}">
                   <a14:useLocalDpi xmlns:a14="http://schemas.microsoft.com/office/drawing/2010/main" val="0"/>
                 </a:ext>
               </a:extLst>
             </a:blip>
-            <a:srcRect l="1319" t="2452" r="16253" b="3246"/>
+            <a:srcRect l="27307" t="3444" r="17618" b="6993"/>
             <a:stretch/>
           </p:blipFill>
           <p:spPr>
             <a:xfrm>
-              <a:off x="34425943" y="13542803"/>
-              <a:ext cx="4250423" cy="4312515"/>
+              <a:off x="29778959" y="5800316"/>
+              <a:ext cx="4320118" cy="7025476"/>
             </a:xfrm>
             <a:prstGeom prst="rect">
               <a:avLst/>
@@ -8854,33 +7986,98 @@
         </p:pic>
         <p:pic>
           <p:nvPicPr>
-            <p:cNvPr id="2070" name="Picture 2069"/>
+            <p:cNvPr id="2057" name="Picture 2056"/>
             <p:cNvPicPr>
               <a:picLocks noChangeAspect="1"/>
             </p:cNvPicPr>
             <p:nvPr/>
           </p:nvPicPr>
           <p:blipFill rotWithShape="1">
-            <a:blip r:embed="rId15" cstate="print">
+            <a:blip r:embed="rId14">
               <a:extLst>
                 <a:ext uri="{28A0092B-C50C-407E-A947-70E740481C1C}">
                   <a14:useLocalDpi xmlns:a14="http://schemas.microsoft.com/office/drawing/2010/main" val="0"/>
                 </a:ext>
               </a:extLst>
             </a:blip>
-            <a:srcRect l="1212" t="3033" r="16666" b="3313"/>
+            <a:srcRect l="27219" t="3371" r="17611" b="7032"/>
             <a:stretch/>
           </p:blipFill>
           <p:spPr>
             <a:xfrm>
-              <a:off x="38821874" y="13552125"/>
-              <a:ext cx="4254703" cy="4303194"/>
+              <a:off x="38718171" y="5800316"/>
+              <a:ext cx="4327453" cy="7028101"/>
             </a:xfrm>
             <a:prstGeom prst="rect">
               <a:avLst/>
             </a:prstGeom>
           </p:spPr>
         </p:pic>
+        <p:pic>
+          <p:nvPicPr>
+            <p:cNvPr id="2063" name="Picture 2062"/>
+            <p:cNvPicPr>
+              <a:picLocks noChangeAspect="1"/>
+            </p:cNvPicPr>
+            <p:nvPr/>
+          </p:nvPicPr>
+          <p:blipFill>
+            <a:blip r:embed="rId15">
+              <a:extLst>
+                <a:ext uri="{28A0092B-C50C-407E-A947-70E740481C1C}">
+                  <a14:useLocalDpi xmlns:a14="http://schemas.microsoft.com/office/drawing/2010/main" val="0"/>
+                </a:ext>
+              </a:extLst>
+            </a:blip>
+            <a:stretch>
+              <a:fillRect/>
+            </a:stretch>
+          </p:blipFill>
+          <p:spPr>
+            <a:xfrm>
+              <a:off x="37836043" y="5670673"/>
+              <a:ext cx="1666016" cy="1089317"/>
+            </a:xfrm>
+            <a:prstGeom prst="rect">
+              <a:avLst/>
+            </a:prstGeom>
+          </p:spPr>
+        </p:pic>
+        <p:sp>
+          <p:nvSpPr>
+            <p:cNvPr id="18" name="TextBox 17"/>
+            <p:cNvSpPr txBox="1"/>
+            <p:nvPr/>
+          </p:nvSpPr>
+          <p:spPr>
+            <a:xfrm>
+              <a:off x="29275963" y="7903377"/>
+              <a:ext cx="461665" cy="4922422"/>
+            </a:xfrm>
+            <a:prstGeom prst="rect">
+              <a:avLst/>
+            </a:prstGeom>
+            <a:noFill/>
+          </p:spPr>
+          <p:txBody>
+            <a:bodyPr vert="vert270" wrap="square" rtlCol="0">
+              <a:spAutoFit/>
+            </a:bodyPr>
+            <a:lstStyle/>
+            <a:p>
+              <a:pPr algn="ctr"/>
+              <a:r>
+                <a:rPr lang="en-CA" sz="1800" b="1" dirty="0" err="1" smtClean="0"/>
+                <a:t>CpG</a:t>
+              </a:r>
+              <a:r>
+                <a:rPr lang="en-CA" sz="1800" b="1" dirty="0" smtClean="0"/>
+                <a:t> islands</a:t>
+              </a:r>
+              <a:endParaRPr lang="en-CA" sz="1800" b="1" dirty="0"/>
+            </a:p>
+          </p:txBody>
+        </p:sp>
       </p:grpSp>
     </p:spTree>
   </p:cSld>

</xml_diff>

<commit_message>
updated; still need conclusion and FEA descriptions
</commit_message>
<xml_diff>
--- a/poster/poster.pptx
+++ b/poster/poster.pptx
@@ -4250,6 +4250,173 @@
           <a:chExt cx="0" cy="0"/>
         </a:xfrm>
       </p:grpSpPr>
+      <p:grpSp>
+        <p:nvGrpSpPr>
+          <p:cNvPr id="19" name="Group 18"/>
+          <p:cNvGrpSpPr/>
+          <p:nvPr/>
+        </p:nvGrpSpPr>
+        <p:grpSpPr>
+          <a:xfrm>
+            <a:off x="29275963" y="5416673"/>
+            <a:ext cx="13769661" cy="7157744"/>
+            <a:chOff x="29275963" y="5670673"/>
+            <a:chExt cx="13769661" cy="7157744"/>
+          </a:xfrm>
+        </p:grpSpPr>
+        <p:pic>
+          <p:nvPicPr>
+            <p:cNvPr id="2053" name="Picture 2052"/>
+            <p:cNvPicPr>
+              <a:picLocks noChangeAspect="1"/>
+            </p:cNvPicPr>
+            <p:nvPr/>
+          </p:nvPicPr>
+          <p:blipFill rotWithShape="1">
+            <a:blip r:embed="rId4">
+              <a:extLst>
+                <a:ext uri="{28A0092B-C50C-407E-A947-70E740481C1C}">
+                  <a14:useLocalDpi xmlns:a14="http://schemas.microsoft.com/office/drawing/2010/main" val="0"/>
+                </a:ext>
+              </a:extLst>
+            </a:blip>
+            <a:srcRect l="27282" t="3480" r="17605" b="7066"/>
+            <a:stretch/>
+          </p:blipFill>
+          <p:spPr>
+            <a:xfrm>
+              <a:off x="34247075" y="5808860"/>
+              <a:ext cx="4323099" cy="7016931"/>
+            </a:xfrm>
+            <a:prstGeom prst="rect">
+              <a:avLst/>
+            </a:prstGeom>
+          </p:spPr>
+        </p:pic>
+        <p:pic>
+          <p:nvPicPr>
+            <p:cNvPr id="2052" name="Picture 2051"/>
+            <p:cNvPicPr>
+              <a:picLocks noChangeAspect="1"/>
+            </p:cNvPicPr>
+            <p:nvPr/>
+          </p:nvPicPr>
+          <p:blipFill rotWithShape="1">
+            <a:blip r:embed="rId5">
+              <a:extLst>
+                <a:ext uri="{28A0092B-C50C-407E-A947-70E740481C1C}">
+                  <a14:useLocalDpi xmlns:a14="http://schemas.microsoft.com/office/drawing/2010/main" val="0"/>
+                </a:ext>
+              </a:extLst>
+            </a:blip>
+            <a:srcRect l="27307" t="3444" r="17618" b="6993"/>
+            <a:stretch/>
+          </p:blipFill>
+          <p:spPr>
+            <a:xfrm>
+              <a:off x="29778959" y="5800316"/>
+              <a:ext cx="4320118" cy="7025476"/>
+            </a:xfrm>
+            <a:prstGeom prst="rect">
+              <a:avLst/>
+            </a:prstGeom>
+          </p:spPr>
+        </p:pic>
+        <p:pic>
+          <p:nvPicPr>
+            <p:cNvPr id="2057" name="Picture 2056"/>
+            <p:cNvPicPr>
+              <a:picLocks noChangeAspect="1"/>
+            </p:cNvPicPr>
+            <p:nvPr/>
+          </p:nvPicPr>
+          <p:blipFill rotWithShape="1">
+            <a:blip r:embed="rId6">
+              <a:extLst>
+                <a:ext uri="{28A0092B-C50C-407E-A947-70E740481C1C}">
+                  <a14:useLocalDpi xmlns:a14="http://schemas.microsoft.com/office/drawing/2010/main" val="0"/>
+                </a:ext>
+              </a:extLst>
+            </a:blip>
+            <a:srcRect l="27219" t="3371" r="17611" b="7032"/>
+            <a:stretch/>
+          </p:blipFill>
+          <p:spPr>
+            <a:xfrm>
+              <a:off x="38718171" y="5800316"/>
+              <a:ext cx="4327453" cy="7028101"/>
+            </a:xfrm>
+            <a:prstGeom prst="rect">
+              <a:avLst/>
+            </a:prstGeom>
+          </p:spPr>
+        </p:pic>
+        <p:pic>
+          <p:nvPicPr>
+            <p:cNvPr id="2063" name="Picture 2062"/>
+            <p:cNvPicPr>
+              <a:picLocks noChangeAspect="1"/>
+            </p:cNvPicPr>
+            <p:nvPr/>
+          </p:nvPicPr>
+          <p:blipFill>
+            <a:blip r:embed="rId7">
+              <a:extLst>
+                <a:ext uri="{28A0092B-C50C-407E-A947-70E740481C1C}">
+                  <a14:useLocalDpi xmlns:a14="http://schemas.microsoft.com/office/drawing/2010/main" val="0"/>
+                </a:ext>
+              </a:extLst>
+            </a:blip>
+            <a:stretch>
+              <a:fillRect/>
+            </a:stretch>
+          </p:blipFill>
+          <p:spPr>
+            <a:xfrm>
+              <a:off x="37836043" y="5670673"/>
+              <a:ext cx="1666016" cy="1089317"/>
+            </a:xfrm>
+            <a:prstGeom prst="rect">
+              <a:avLst/>
+            </a:prstGeom>
+          </p:spPr>
+        </p:pic>
+        <p:sp>
+          <p:nvSpPr>
+            <p:cNvPr id="18" name="TextBox 17"/>
+            <p:cNvSpPr txBox="1"/>
+            <p:nvPr/>
+          </p:nvSpPr>
+          <p:spPr>
+            <a:xfrm>
+              <a:off x="29275963" y="7903377"/>
+              <a:ext cx="461665" cy="4922422"/>
+            </a:xfrm>
+            <a:prstGeom prst="rect">
+              <a:avLst/>
+            </a:prstGeom>
+            <a:noFill/>
+          </p:spPr>
+          <p:txBody>
+            <a:bodyPr vert="vert270" wrap="square" rtlCol="0">
+              <a:spAutoFit/>
+            </a:bodyPr>
+            <a:lstStyle/>
+            <a:p>
+              <a:pPr algn="ctr"/>
+              <a:r>
+                <a:rPr lang="en-CA" sz="1800" b="1" dirty="0" err="1" smtClean="0"/>
+                <a:t>CpG</a:t>
+              </a:r>
+              <a:r>
+                <a:rPr lang="en-CA" sz="1800" b="1" dirty="0" smtClean="0"/>
+                <a:t> islands</a:t>
+              </a:r>
+              <a:endParaRPr lang="en-CA" sz="1800" b="1" dirty="0"/>
+            </a:p>
+          </p:txBody>
+        </p:sp>
+      </p:grpSp>
       <p:sp>
         <p:nvSpPr>
           <p:cNvPr id="3" name="Rectangle 2"/>
@@ -4324,7 +4491,7 @@
         <p:spPr>
           <a:xfrm>
             <a:off x="472296" y="28629225"/>
-            <a:ext cx="13697201" cy="1061829"/>
+            <a:ext cx="13697201" cy="1123384"/>
           </a:xfrm>
           <a:prstGeom prst="rect">
             <a:avLst/>
@@ -4344,55 +4511,43 @@
               <a:defRPr/>
             </a:pPr>
             <a:r>
-              <a:rPr lang="en-US" sz="3000" b="1" dirty="0" smtClean="0">
+              <a:rPr lang="en-US" sz="3200" b="1" dirty="0" smtClean="0">
                 <a:latin typeface="Arial" charset="0"/>
               </a:rPr>
-              <a:t>Figure </a:t>
-            </a:r>
-            <a:r>
-              <a:rPr lang="en-US" sz="3000" b="1" dirty="0" smtClean="0">
+              <a:t>Figure 1.</a:t>
+            </a:r>
+            <a:r>
+              <a:rPr lang="en-US" sz="3200" dirty="0" smtClean="0">
                 <a:latin typeface="Arial" charset="0"/>
               </a:rPr>
-              <a:t>1.</a:t>
-            </a:r>
-            <a:r>
-              <a:rPr lang="en-US" sz="3000" dirty="0" smtClean="0">
+              <a:t> Density </a:t>
+            </a:r>
+            <a:r>
+              <a:rPr lang="en-US" sz="3200" dirty="0">
                 <a:latin typeface="Arial" charset="0"/>
               </a:rPr>
-              <a:t> </a:t>
-            </a:r>
-            <a:r>
-              <a:rPr lang="en-US" sz="3000" dirty="0" smtClean="0">
+              <a:t>plot of </a:t>
+            </a:r>
+            <a:r>
+              <a:rPr lang="en-US" sz="3200" dirty="0" smtClean="0">
                 <a:latin typeface="Arial" charset="0"/>
               </a:rPr>
-              <a:t>Density </a:t>
-            </a:r>
-            <a:r>
-              <a:rPr lang="en-US" sz="3000" dirty="0">
+              <a:t>beta values average across corresponding CGIs </a:t>
+            </a:r>
+            <a:r>
+              <a:rPr lang="en-US" sz="3200" dirty="0">
                 <a:latin typeface="Arial" charset="0"/>
               </a:rPr>
-              <a:t>plot of </a:t>
-            </a:r>
-            <a:r>
-              <a:rPr lang="en-US" sz="3000" dirty="0" smtClean="0">
+              <a:t>before and after </a:t>
+            </a:r>
+            <a:r>
+              <a:rPr lang="en-US" sz="3200" dirty="0" err="1">
                 <a:latin typeface="Arial" charset="0"/>
               </a:rPr>
-              <a:t>beta values average across corresponding CGIs </a:t>
-            </a:r>
-            <a:r>
-              <a:rPr lang="en-US" sz="3000" dirty="0">
-                <a:latin typeface="Arial" charset="0"/>
-              </a:rPr>
-              <a:t>before and after </a:t>
-            </a:r>
-            <a:r>
-              <a:rPr lang="en-US" sz="3000" dirty="0" err="1">
-                <a:latin typeface="Arial" charset="0"/>
-              </a:rPr>
               <a:t>quantile</a:t>
             </a:r>
             <a:r>
-              <a:rPr lang="en-US" sz="3000" dirty="0">
+              <a:rPr lang="en-US" sz="3200" dirty="0">
                 <a:latin typeface="Arial" charset="0"/>
               </a:rPr>
               <a:t> normalization.</a:t>
@@ -4658,7 +4813,7 @@
         </p:nvSpPr>
         <p:spPr>
           <a:xfrm>
-            <a:off x="2916077" y="2158727"/>
+            <a:off x="2916077" y="2234927"/>
             <a:ext cx="40068588" cy="1015663"/>
           </a:xfrm>
           <a:prstGeom prst="rect">
@@ -4675,7 +4830,9 @@
             <a:r>
               <a:rPr lang="en-US" sz="6000" dirty="0" smtClean="0">
                 <a:solidFill>
-                  <a:schemeClr val="bg1"/>
+                  <a:schemeClr val="bg1">
+                    <a:lumMod val="65000"/>
+                  </a:schemeClr>
                 </a:solidFill>
               </a:rPr>
               <a:t> </a:t>
@@ -4703,7 +4860,7 @@
                 </a:solidFill>
                 <a:sym typeface="Wingdings 2" panose="05020102010507070707" pitchFamily="18" charset="2"/>
               </a:rPr>
-              <a:t></a:t>
+              <a:t></a:t>
             </a:r>
             <a:r>
               <a:rPr lang="en-US" sz="6000" dirty="0" smtClean="0">
@@ -4722,13 +4879,29 @@
               <a:t>Eva Yap </a:t>
             </a:r>
             <a:r>
+              <a:rPr lang="en-US" sz="6000" dirty="0">
+                <a:solidFill>
+                  <a:schemeClr val="bg1"/>
+                </a:solidFill>
+                <a:sym typeface="Wingdings 2" panose="05020102010507070707" pitchFamily="18" charset="2"/>
+              </a:rPr>
+              <a:t> </a:t>
+            </a:r>
+            <a:r>
+              <a:rPr lang="en-US" sz="6000" dirty="0" err="1" smtClean="0">
+                <a:solidFill>
+                  <a:schemeClr val="bg1"/>
+                </a:solidFill>
+              </a:rPr>
+              <a:t>Ka</a:t>
+            </a:r>
+            <a:r>
               <a:rPr lang="en-US" sz="6000" dirty="0" smtClean="0">
                 <a:solidFill>
                   <a:schemeClr val="bg1"/>
                 </a:solidFill>
-                <a:sym typeface="Wingdings 2" panose="05020102010507070707" pitchFamily="18" charset="2"/>
-              </a:rPr>
-              <a:t></a:t>
+              </a:rPr>
+              <a:t> </a:t>
             </a:r>
             <a:r>
               <a:rPr lang="en-US" sz="6000" dirty="0" smtClean="0">
@@ -4736,7 +4909,16 @@
                   <a:schemeClr val="bg1"/>
                 </a:solidFill>
               </a:rPr>
-              <a:t> </a:t>
+              <a:t>Ming Nip </a:t>
+            </a:r>
+            <a:r>
+              <a:rPr lang="en-US" sz="6000" dirty="0">
+                <a:solidFill>
+                  <a:schemeClr val="bg1"/>
+                </a:solidFill>
+                <a:sym typeface="Wingdings 2" panose="05020102010507070707" pitchFamily="18" charset="2"/>
+              </a:rPr>
+              <a:t> </a:t>
             </a:r>
             <a:r>
               <a:rPr lang="en-US" sz="6000" dirty="0" err="1" smtClean="0">
@@ -4744,7 +4926,7 @@
                   <a:schemeClr val="bg1"/>
                 </a:solidFill>
               </a:rPr>
-              <a:t>Ka</a:t>
+              <a:t>Rashedul</a:t>
             </a:r>
             <a:r>
               <a:rPr lang="en-US" sz="6000" dirty="0" smtClean="0">
@@ -4752,49 +4934,24 @@
                   <a:schemeClr val="bg1"/>
                 </a:solidFill>
               </a:rPr>
-              <a:t> Ming Nip </a:t>
+              <a:t> </a:t>
             </a:r>
             <a:r>
               <a:rPr lang="en-US" sz="6000" dirty="0" smtClean="0">
                 <a:solidFill>
                   <a:schemeClr val="bg1"/>
                 </a:solidFill>
-                <a:sym typeface="Wingdings 2" panose="05020102010507070707" pitchFamily="18" charset="2"/>
-              </a:rPr>
-              <a:t></a:t>
-            </a:r>
-            <a:r>
-              <a:rPr lang="en-US" sz="6000" dirty="0" smtClean="0">
-                <a:solidFill>
-                  <a:schemeClr val="bg1"/>
-                </a:solidFill>
-              </a:rPr>
-              <a:t> </a:t>
-            </a:r>
-            <a:r>
-              <a:rPr lang="en-US" sz="6000" dirty="0" err="1" smtClean="0">
-                <a:solidFill>
-                  <a:schemeClr val="bg1"/>
-                </a:solidFill>
-              </a:rPr>
-              <a:t>Rashedul</a:t>
-            </a:r>
-            <a:r>
-              <a:rPr lang="en-US" sz="6000" dirty="0" smtClean="0">
-                <a:solidFill>
-                  <a:schemeClr val="bg1"/>
-                </a:solidFill>
-              </a:rPr>
-              <a:t> Islam </a:t>
-            </a:r>
-            <a:r>
-              <a:rPr lang="en-US" sz="6000" dirty="0" smtClean="0">
+              </a:rPr>
+              <a:t>Islam </a:t>
+            </a:r>
+            <a:r>
+              <a:rPr lang="en-US" sz="6000" dirty="0">
                 <a:solidFill>
                   <a:schemeClr val="bg1"/>
                 </a:solidFill>
                 <a:sym typeface="Wingdings 2" panose="05020102010507070707" pitchFamily="18" charset="2"/>
               </a:rPr>
-              <a:t></a:t>
+              <a:t></a:t>
             </a:r>
             <a:r>
               <a:rPr lang="en-US" sz="6000" dirty="0" smtClean="0">
@@ -4845,12 +5002,12 @@
           <p:nvPr/>
         </p:nvPicPr>
         <p:blipFill>
-          <a:blip r:embed="rId3">
+          <a:blip r:embed="rId8">
             <a:lum bright="70000" contrast="-70000"/>
             <a:extLst>
               <a:ext uri="{BEBA8EAE-BF5A-486C-A8C5-ECC9F3942E4B}">
                 <a14:imgProps xmlns:a14="http://schemas.microsoft.com/office/drawing/2010/main">
-                  <a14:imgLayer r:embed="rId4">
+                  <a14:imgLayer r:embed="rId9">
                     <a14:imgEffect>
                       <a14:colorTemperature colorTemp="4700"/>
                     </a14:imgEffect>
@@ -5027,15 +5184,7 @@
                   <a:schemeClr val="bg1"/>
                 </a:solidFill>
               </a:rPr>
-              <a:t>Research </a:t>
-            </a:r>
-            <a:r>
-              <a:rPr lang="en-US" sz="4500" b="1" dirty="0" smtClean="0">
-                <a:solidFill>
-                  <a:schemeClr val="bg1"/>
-                </a:solidFill>
-              </a:rPr>
-              <a:t>Question</a:t>
+              <a:t>Research Question</a:t>
             </a:r>
             <a:r>
               <a:rPr lang="en-US" sz="4500" dirty="0" smtClean="0">
@@ -5071,7 +5220,7 @@
         <p:spPr>
           <a:xfrm>
             <a:off x="470298" y="14800778"/>
-            <a:ext cx="13721451" cy="1061829"/>
+            <a:ext cx="13721451" cy="1123384"/>
           </a:xfrm>
           <a:prstGeom prst="rect">
             <a:avLst/>
@@ -5093,80 +5242,53 @@
               <a:defRPr/>
             </a:pPr>
             <a:r>
-              <a:rPr lang="en-US" sz="3000" b="1" dirty="0" smtClean="0">
+              <a:rPr lang="en-US" sz="3200" b="1" dirty="0" smtClean="0">
                 <a:latin typeface="Arial" charset="0"/>
               </a:rPr>
-              <a:t>Table </a:t>
-            </a:r>
-            <a:r>
-              <a:rPr lang="en-US" sz="3000" b="1" dirty="0" smtClean="0">
+              <a:t>Table 1.</a:t>
+            </a:r>
+            <a:r>
+              <a:rPr lang="en-US" sz="3200" dirty="0" smtClean="0">
                 <a:latin typeface="Arial" charset="0"/>
               </a:rPr>
-              <a:t>1.</a:t>
-            </a:r>
-            <a:r>
-              <a:rPr lang="en-US" sz="3000" dirty="0" smtClean="0">
+              <a:t> </a:t>
+            </a:r>
+            <a:r>
+              <a:rPr lang="en-US" sz="3200" dirty="0" err="1">
                 <a:latin typeface="Arial" charset="0"/>
               </a:rPr>
-              <a:t> </a:t>
-            </a:r>
-            <a:r>
-              <a:rPr lang="en-US" sz="2800" dirty="0" err="1">
+              <a:t>Illumina</a:t>
+            </a:r>
+            <a:r>
+              <a:rPr lang="en-US" sz="3200" dirty="0">
                 <a:latin typeface="Arial" charset="0"/>
               </a:rPr>
-              <a:t>Illumina</a:t>
-            </a:r>
-            <a:r>
-              <a:rPr lang="en-US" sz="2800" dirty="0">
+              <a:t> HumanMethylation450 array </a:t>
+            </a:r>
+            <a:r>
+              <a:rPr lang="en-CA" sz="3200" dirty="0">
                 <a:latin typeface="Arial" charset="0"/>
               </a:rPr>
-              <a:t> HumanMethylation450 array </a:t>
-            </a:r>
-            <a:r>
-              <a:rPr lang="en-CA" sz="2800" dirty="0">
+              <a:t>dataset </a:t>
+            </a:r>
+            <a:r>
+              <a:rPr lang="en-US" sz="3200" dirty="0" smtClean="0">
                 <a:latin typeface="Arial" charset="0"/>
               </a:rPr>
-              <a:t>dataset </a:t>
-            </a:r>
-            <a:r>
-              <a:rPr lang="en-US" sz="3000" dirty="0" smtClean="0">
+              <a:t>of 1</a:t>
+            </a:r>
+            <a:r>
+              <a:rPr lang="en-CA" sz="3200" dirty="0" smtClean="0">
                 <a:latin typeface="Arial" charset="0"/>
               </a:rPr>
-              <a:t>of </a:t>
-            </a:r>
-            <a:r>
-              <a:rPr lang="en-US" sz="3000" dirty="0" smtClean="0">
+              <a:t>47 colon samples from the Gene Expression Omnibus </a:t>
+            </a:r>
+            <a:r>
+              <a:rPr lang="en-US" sz="3200" dirty="0" smtClean="0">
                 <a:latin typeface="Arial" charset="0"/>
               </a:rPr>
-              <a:t>1</a:t>
-            </a:r>
-            <a:r>
-              <a:rPr lang="en-CA" sz="3000" dirty="0" smtClean="0">
-                <a:latin typeface="Arial" charset="0"/>
-              </a:rPr>
-              <a:t>47 colon </a:t>
-            </a:r>
-            <a:r>
-              <a:rPr lang="en-CA" sz="3000" dirty="0" smtClean="0">
-                <a:latin typeface="Arial" charset="0"/>
-              </a:rPr>
-              <a:t>samples from the Gene Expression Omnibus </a:t>
-            </a:r>
-            <a:r>
-              <a:rPr lang="en-US" sz="2800" dirty="0" smtClean="0">
-                <a:latin typeface="Arial" charset="0"/>
-              </a:rPr>
-              <a:t>GSE48684</a:t>
-            </a:r>
-            <a:r>
-              <a:rPr lang="en-US" sz="3000" dirty="0" smtClean="0">
-                <a:latin typeface="Arial" charset="0"/>
-              </a:rPr>
-              <a:t>.</a:t>
-            </a:r>
-            <a:endParaRPr lang="en-US" sz="3000" dirty="0" smtClean="0">
-              <a:latin typeface="Arial" charset="0"/>
-            </a:endParaRPr>
+              <a:t>GSE48684.</a:t>
+            </a:r>
           </a:p>
         </p:txBody>
       </p:sp>
@@ -5265,7 +5387,7 @@
         <p:spPr bwMode="auto">
           <a:xfrm>
             <a:off x="29212140" y="4281050"/>
-            <a:ext cx="14069460" cy="998973"/>
+            <a:ext cx="14247260" cy="998973"/>
           </a:xfrm>
           <a:prstGeom prst="roundRect">
             <a:avLst>
@@ -5433,7 +5555,7 @@
         <p:spPr>
           <a:xfrm>
             <a:off x="14876293" y="19801868"/>
-            <a:ext cx="13662010" cy="1523494"/>
+            <a:ext cx="13662010" cy="1615827"/>
           </a:xfrm>
           <a:prstGeom prst="rect">
             <a:avLst/>
@@ -5455,110 +5577,89 @@
               <a:defRPr/>
             </a:pPr>
             <a:r>
-              <a:rPr lang="en-US" sz="3000" b="1" dirty="0" smtClean="0">
+              <a:rPr lang="en-US" sz="3200" b="1" dirty="0" smtClean="0">
                 <a:latin typeface="Arial" charset="0"/>
               </a:rPr>
               <a:t>Figure 2.</a:t>
             </a:r>
             <a:r>
-              <a:rPr lang="en-US" sz="3000" dirty="0" smtClean="0">
+              <a:rPr lang="en-US" sz="3200" dirty="0" smtClean="0">
                 <a:latin typeface="Arial" charset="0"/>
               </a:rPr>
               <a:t> Unsupervised hierarchical </a:t>
             </a:r>
             <a:r>
-              <a:rPr lang="en-US" sz="3000" dirty="0">
+              <a:rPr lang="en-US" sz="3200" dirty="0">
                 <a:latin typeface="Arial" charset="0"/>
               </a:rPr>
               <a:t>clustering </a:t>
             </a:r>
             <a:r>
-              <a:rPr lang="en-US" sz="3000" dirty="0" smtClean="0">
+              <a:rPr lang="en-US" sz="3200" dirty="0" smtClean="0">
                 <a:latin typeface="Arial" charset="0"/>
               </a:rPr>
               <a:t>using </a:t>
             </a:r>
             <a:r>
-              <a:rPr lang="en-US" sz="3000" dirty="0">
+              <a:rPr lang="en-US" sz="3200" dirty="0">
                 <a:latin typeface="Arial" charset="0"/>
               </a:rPr>
               <a:t>Ward’s method </a:t>
             </a:r>
             <a:r>
-              <a:rPr lang="en-US" sz="3000" dirty="0" smtClean="0">
+              <a:rPr lang="en-US" sz="3200" dirty="0" smtClean="0">
                 <a:latin typeface="Arial" charset="0"/>
               </a:rPr>
               <a:t>on </a:t>
             </a:r>
             <a:r>
-              <a:rPr lang="en-US" sz="3000" b="1" dirty="0" smtClean="0">
+              <a:rPr lang="en-US" sz="3200" b="1" dirty="0" smtClean="0">
                 <a:latin typeface="Arial" charset="0"/>
               </a:rPr>
               <a:t>(a)</a:t>
             </a:r>
             <a:r>
-              <a:rPr lang="en-US" sz="3000" dirty="0" smtClean="0">
+              <a:rPr lang="en-US" sz="3200" dirty="0" smtClean="0">
                 <a:latin typeface="Arial" charset="0"/>
               </a:rPr>
               <a:t> raw </a:t>
             </a:r>
             <a:r>
-              <a:rPr lang="en-US" sz="3000" dirty="0">
+              <a:rPr lang="en-US" sz="3200" dirty="0">
                 <a:latin typeface="Arial" charset="0"/>
               </a:rPr>
               <a:t>beta values after removing probes in </a:t>
             </a:r>
             <a:r>
-              <a:rPr lang="en-US" sz="3000" dirty="0" err="1">
+              <a:rPr lang="en-US" sz="3200" dirty="0" err="1">
                 <a:latin typeface="Arial" charset="0"/>
               </a:rPr>
               <a:t>chrX</a:t>
             </a:r>
             <a:r>
-              <a:rPr lang="en-US" sz="3000" dirty="0">
+              <a:rPr lang="en-US" sz="3200" dirty="0">
                 <a:latin typeface="Arial" charset="0"/>
               </a:rPr>
               <a:t> and those not in </a:t>
             </a:r>
             <a:r>
-              <a:rPr lang="en-US" sz="3000" dirty="0" smtClean="0">
+              <a:rPr lang="en-US" sz="3200" dirty="0" smtClean="0">
                 <a:latin typeface="Arial" charset="0"/>
               </a:rPr>
               <a:t>CGIs and </a:t>
             </a:r>
             <a:r>
-              <a:rPr lang="en-US" sz="3000" b="1" dirty="0" smtClean="0">
+              <a:rPr lang="en-US" sz="3200" b="1" dirty="0" smtClean="0">
                 <a:latin typeface="Arial" charset="0"/>
               </a:rPr>
               <a:t>(b)</a:t>
             </a:r>
             <a:r>
-              <a:rPr lang="en-US" sz="3000" dirty="0" smtClean="0">
+              <a:rPr lang="en-US" sz="3200" dirty="0" smtClean="0">
                 <a:latin typeface="Arial" charset="0"/>
               </a:rPr>
-              <a:t> normalized </a:t>
-            </a:r>
-            <a:r>
-              <a:rPr lang="en-US" sz="3000" dirty="0" smtClean="0">
-                <a:latin typeface="Arial" charset="0"/>
-              </a:rPr>
-              <a:t>beta </a:t>
-            </a:r>
-            <a:r>
-              <a:rPr lang="en-US" sz="3000" dirty="0" smtClean="0">
-                <a:latin typeface="Arial" charset="0"/>
-              </a:rPr>
-              <a:t>values </a:t>
-            </a:r>
-            <a:r>
-              <a:rPr lang="en-US" sz="3000" dirty="0" smtClean="0">
-                <a:latin typeface="Arial" charset="0"/>
-              </a:rPr>
-              <a:t>averaged across each CGI.</a:t>
-            </a:r>
-            <a:endParaRPr lang="en-US" sz="3000" dirty="0" smtClean="0">
-              <a:latin typeface="Arial" charset="0"/>
-            </a:endParaRPr>
+              <a:t> normalized beta values averaged across each CGI.</a:t>
+            </a:r>
           </a:p>
         </p:txBody>
       </p:sp>
@@ -5873,7 +5974,7 @@
           <p:nvPr/>
         </p:nvPicPr>
         <p:blipFill rotWithShape="1">
-          <a:blip r:embed="rId5" cstate="print">
+          <a:blip r:embed="rId10" cstate="print">
             <a:extLst>
               <a:ext uri="{28A0092B-C50C-407E-A947-70E740481C1C}">
                 <a14:useLocalDpi xmlns:a14="http://schemas.microsoft.com/office/drawing/2010/main" val="0"/>
@@ -5902,14 +6003,14 @@
           <p:nvPr>
             <p:extLst>
               <p:ext uri="{D42A27DB-BD31-4B8C-83A1-F6EECF244321}">
-                <p14:modId xmlns:p14="http://schemas.microsoft.com/office/powerpoint/2010/main" val="4192973001"/>
+                <p14:modId xmlns:p14="http://schemas.microsoft.com/office/powerpoint/2010/main" val="1184645090"/>
               </p:ext>
             </p:extLst>
           </p:nvPr>
         </p:nvGraphicFramePr>
         <p:xfrm>
-          <a:off x="807029" y="16055346"/>
-          <a:ext cx="13106397" cy="2743200"/>
+          <a:off x="680028" y="16055346"/>
+          <a:ext cx="13360399" cy="2743200"/>
         </p:xfrm>
         <a:graphic>
           <a:graphicData uri="http://schemas.openxmlformats.org/drawingml/2006/table">
@@ -5918,9 +6019,9 @@
                 <a:tableStyleId>{EB344D84-9AFB-497E-A393-DC336BA19D2E}</a:tableStyleId>
               </a:tblPr>
               <a:tblGrid>
-                <a:gridCol w="2917246"/>
-                <a:gridCol w="7539035"/>
-                <a:gridCol w="2650116"/>
+                <a:gridCol w="2973782"/>
+                <a:gridCol w="7685142"/>
+                <a:gridCol w="2701475"/>
               </a:tblGrid>
               <a:tr h="522761">
                 <a:tc>
@@ -6312,8 +6413,8 @@
         </p:nvSpPr>
         <p:spPr bwMode="auto">
           <a:xfrm>
-            <a:off x="29215926" y="28619943"/>
-            <a:ext cx="14065674" cy="1152000"/>
+            <a:off x="29212140" y="27622993"/>
+            <a:ext cx="14247260" cy="1152000"/>
           </a:xfrm>
           <a:prstGeom prst="roundRect">
             <a:avLst>
@@ -6384,98 +6485,6 @@
               <a:solidFill>
                 <a:schemeClr val="bg1"/>
               </a:solidFill>
-            </a:endParaRPr>
-          </a:p>
-        </p:txBody>
-      </p:sp>
-      <p:sp>
-        <p:nvSpPr>
-          <p:cNvPr id="37" name="TextBox 36"/>
-          <p:cNvSpPr txBox="1"/>
-          <p:nvPr/>
-        </p:nvSpPr>
-        <p:spPr>
-          <a:xfrm>
-            <a:off x="29215926" y="29992530"/>
-            <a:ext cx="14065674" cy="630942"/>
-          </a:xfrm>
-          <a:prstGeom prst="rect">
-            <a:avLst/>
-          </a:prstGeom>
-          <a:solidFill>
-            <a:schemeClr val="bg1"/>
-          </a:solidFill>
-          <a:ln>
-            <a:solidFill>
-              <a:schemeClr val="bg1">
-                <a:lumMod val="65000"/>
-              </a:schemeClr>
-            </a:solidFill>
-          </a:ln>
-        </p:spPr>
-        <p:txBody>
-          <a:bodyPr wrap="square" lIns="137160" tIns="68580" rIns="137160" bIns="68580">
-            <a:spAutoFit/>
-          </a:bodyPr>
-          <a:lstStyle/>
-          <a:p>
-            <a:pPr algn="just">
-              <a:defRPr/>
-            </a:pPr>
-            <a:r>
-              <a:rPr lang="en-US" sz="3200" dirty="0" smtClean="0">
-                <a:latin typeface="Arial" charset="0"/>
-              </a:rPr>
-              <a:t>TODO: Conclusion…</a:t>
-            </a:r>
-            <a:endParaRPr lang="en-US" sz="3200" dirty="0">
-              <a:latin typeface="Arial" charset="0"/>
-            </a:endParaRPr>
-          </a:p>
-        </p:txBody>
-      </p:sp>
-      <p:sp>
-        <p:nvSpPr>
-          <p:cNvPr id="38" name="TextBox 37"/>
-          <p:cNvSpPr txBox="1"/>
-          <p:nvPr/>
-        </p:nvSpPr>
-        <p:spPr>
-          <a:xfrm>
-            <a:off x="14837111" y="22964167"/>
-            <a:ext cx="13701192" cy="630942"/>
-          </a:xfrm>
-          <a:prstGeom prst="rect">
-            <a:avLst/>
-          </a:prstGeom>
-          <a:solidFill>
-            <a:schemeClr val="bg1"/>
-          </a:solidFill>
-          <a:ln>
-            <a:solidFill>
-              <a:schemeClr val="bg1">
-                <a:lumMod val="65000"/>
-              </a:schemeClr>
-            </a:solidFill>
-          </a:ln>
-        </p:spPr>
-        <p:txBody>
-          <a:bodyPr wrap="square" lIns="137160" tIns="68580" rIns="137160" bIns="68580">
-            <a:spAutoFit/>
-          </a:bodyPr>
-          <a:lstStyle/>
-          <a:p>
-            <a:pPr algn="just">
-              <a:defRPr/>
-            </a:pPr>
-            <a:r>
-              <a:rPr lang="en-US" sz="3200" dirty="0" smtClean="0">
-                <a:latin typeface="Arial" charset="0"/>
-              </a:rPr>
-              <a:t>TODO: FEA table and 3 important point…</a:t>
-            </a:r>
-            <a:endParaRPr lang="en-US" sz="3200" dirty="0" smtClean="0">
-              <a:latin typeface="Arial" charset="0"/>
             </a:endParaRPr>
           </a:p>
         </p:txBody>
@@ -7097,7 +7106,7 @@
         <p:spPr>
           <a:xfrm>
             <a:off x="489560" y="5397868"/>
-            <a:ext cx="8723486" cy="4524315"/>
+            <a:ext cx="8604063" cy="4524315"/>
           </a:xfrm>
           <a:prstGeom prst="rect">
             <a:avLst/>
@@ -7191,7 +7200,7 @@
         </p:nvGrpSpPr>
         <p:grpSpPr>
           <a:xfrm>
-            <a:off x="29778959" y="14507536"/>
+            <a:off x="29778959" y="14228136"/>
             <a:ext cx="13266664" cy="3961930"/>
             <a:chOff x="29778959" y="14393236"/>
             <a:chExt cx="13266664" cy="3961930"/>
@@ -7206,7 +7215,7 @@
             <p:nvPr/>
           </p:nvPicPr>
           <p:blipFill rotWithShape="1">
-            <a:blip r:embed="rId6" cstate="print">
+            <a:blip r:embed="rId11" cstate="print">
               <a:extLst>
                 <a:ext uri="{28A0092B-C50C-407E-A947-70E740481C1C}">
                   <a14:useLocalDpi xmlns:a14="http://schemas.microsoft.com/office/drawing/2010/main" val="0"/>
@@ -7235,7 +7244,7 @@
             <p:nvPr/>
           </p:nvPicPr>
           <p:blipFill rotWithShape="1">
-            <a:blip r:embed="rId7" cstate="print">
+            <a:blip r:embed="rId12" cstate="print">
               <a:extLst>
                 <a:ext uri="{28A0092B-C50C-407E-A947-70E740481C1C}">
                   <a14:useLocalDpi xmlns:a14="http://schemas.microsoft.com/office/drawing/2010/main" val="0"/>
@@ -7264,7 +7273,7 @@
             <p:nvPr/>
           </p:nvPicPr>
           <p:blipFill rotWithShape="1">
-            <a:blip r:embed="rId8" cstate="print">
+            <a:blip r:embed="rId13" cstate="print">
               <a:extLst>
                 <a:ext uri="{28A0092B-C50C-407E-A947-70E740481C1C}">
                   <a14:useLocalDpi xmlns:a14="http://schemas.microsoft.com/office/drawing/2010/main" val="0"/>
@@ -7568,7 +7577,7 @@
             <p:nvPr/>
           </p:nvPicPr>
           <p:blipFill>
-            <a:blip r:embed="rId9">
+            <a:blip r:embed="rId14">
               <a:extLst>
                 <a:ext uri="{28A0092B-C50C-407E-A947-70E740481C1C}">
                   <a14:useLocalDpi xmlns:a14="http://schemas.microsoft.com/office/drawing/2010/main" val="0"/>
@@ -7598,7 +7607,7 @@
             <p:nvPr/>
           </p:nvPicPr>
           <p:blipFill>
-            <a:blip r:embed="rId10">
+            <a:blip r:embed="rId15">
               <a:extLst>
                 <a:ext uri="{28A0092B-C50C-407E-A947-70E740481C1C}">
                   <a14:useLocalDpi xmlns:a14="http://schemas.microsoft.com/office/drawing/2010/main" val="0"/>
@@ -7628,7 +7637,7 @@
             <p:nvPr/>
           </p:nvPicPr>
           <p:blipFill>
-            <a:blip r:embed="rId11">
+            <a:blip r:embed="rId16">
               <a:extLst>
                 <a:ext uri="{28A0092B-C50C-407E-A947-70E740481C1C}">
                   <a14:useLocalDpi xmlns:a14="http://schemas.microsoft.com/office/drawing/2010/main" val="0"/>
@@ -7718,7 +7727,7 @@
         </p:nvSpPr>
         <p:spPr>
           <a:xfrm>
-            <a:off x="29233510" y="18795494"/>
+            <a:off x="29233510" y="18414494"/>
             <a:ext cx="14024347" cy="1077218"/>
           </a:xfrm>
           <a:prstGeom prst="rect">
@@ -7736,13 +7745,25 @@
               <a:rPr lang="en-US" sz="3200" b="1" dirty="0">
                 <a:latin typeface="Arial" charset="0"/>
               </a:rPr>
-              <a:t>Figure 5.</a:t>
+              <a:t>Figure </a:t>
+            </a:r>
+            <a:r>
+              <a:rPr lang="en-US" sz="3200" b="1" dirty="0" smtClean="0">
+                <a:latin typeface="Arial" charset="0"/>
+              </a:rPr>
+              <a:t>4.</a:t>
+            </a:r>
+            <a:r>
+              <a:rPr lang="en-US" sz="3200" dirty="0" smtClean="0">
+                <a:latin typeface="Arial" charset="0"/>
+              </a:rPr>
+              <a:t> </a:t>
             </a:r>
             <a:r>
               <a:rPr lang="en-US" sz="3200" dirty="0">
                 <a:latin typeface="Arial" charset="0"/>
               </a:rPr>
-              <a:t> Top 3 differentially methylated and 3 non-differentially methylated CGIs for each pair-wise group comparison</a:t>
+              <a:t>Top 3 differentially methylated and 3 non-differentially methylated CGIs for each pair-wise group comparison</a:t>
             </a:r>
             <a:r>
               <a:rPr lang="en-US" sz="3200" dirty="0" smtClean="0">
@@ -7764,7 +7785,7 @@
         </p:nvSpPr>
         <p:spPr>
           <a:xfrm>
-            <a:off x="29233510" y="13014295"/>
+            <a:off x="29233510" y="12607895"/>
             <a:ext cx="14024347" cy="1077218"/>
           </a:xfrm>
           <a:prstGeom prst="rect">
@@ -7785,7 +7806,13 @@
               <a:rPr lang="en-US" sz="3200" b="1" dirty="0">
                 <a:latin typeface="Arial" charset="0"/>
               </a:rPr>
-              <a:t>Figure 4. </a:t>
+              <a:t>Figure </a:t>
+            </a:r>
+            <a:r>
+              <a:rPr lang="en-US" sz="3200" b="1" dirty="0" smtClean="0">
+                <a:latin typeface="Arial" charset="0"/>
+              </a:rPr>
+              <a:t>3. </a:t>
             </a:r>
             <a:r>
               <a:rPr lang="en-US" sz="3200" dirty="0" err="1">
@@ -7841,9 +7868,6 @@
               </a:rPr>
               <a:t>at FDR of 1e-7.</a:t>
             </a:r>
-            <a:endParaRPr lang="en-US" sz="3200" dirty="0">
-              <a:latin typeface="Arial" charset="0"/>
-            </a:endParaRPr>
           </a:p>
         </p:txBody>
       </p:sp>
@@ -7855,8 +7879,8 @@
         </p:nvSpPr>
         <p:spPr bwMode="auto">
           <a:xfrm>
-            <a:off x="29222216" y="5362529"/>
-            <a:ext cx="14035641" cy="16070880"/>
+            <a:off x="29222216" y="5362527"/>
+            <a:ext cx="14237184" cy="21993274"/>
           </a:xfrm>
           <a:prstGeom prst="rect">
             <a:avLst/>
@@ -7912,117 +7936,2152 @@
           </a:p>
         </p:txBody>
       </p:sp>
+      <p:sp>
+        <p:nvSpPr>
+          <p:cNvPr id="69" name="TextBox 68"/>
+          <p:cNvSpPr txBox="1"/>
+          <p:nvPr/>
+        </p:nvSpPr>
+        <p:spPr>
+          <a:xfrm>
+            <a:off x="29275963" y="25385561"/>
+            <a:ext cx="7315277" cy="1077218"/>
+          </a:xfrm>
+          <a:prstGeom prst="rect">
+            <a:avLst/>
+          </a:prstGeom>
+          <a:noFill/>
+        </p:spPr>
+        <p:txBody>
+          <a:bodyPr wrap="square" rtlCol="0">
+            <a:spAutoFit/>
+          </a:bodyPr>
+          <a:lstStyle/>
+          <a:p>
+            <a:pPr algn="just"/>
+            <a:r>
+              <a:rPr lang="en-US" sz="3200" b="1" dirty="0">
+                <a:latin typeface="Arial" charset="0"/>
+              </a:rPr>
+              <a:t>Figure </a:t>
+            </a:r>
+            <a:r>
+              <a:rPr lang="en-US" sz="3200" b="1" dirty="0" smtClean="0">
+                <a:latin typeface="Arial" charset="0"/>
+              </a:rPr>
+              <a:t>5.</a:t>
+            </a:r>
+            <a:r>
+              <a:rPr lang="en-US" sz="3200" dirty="0" smtClean="0">
+                <a:latin typeface="Arial" charset="0"/>
+              </a:rPr>
+              <a:t> Venn diagram of differentially methylated CGIs at FDR &lt; 1e-4.</a:t>
+            </a:r>
+            <a:endParaRPr lang="en-US" sz="3200" dirty="0">
+              <a:latin typeface="Arial" charset="0"/>
+            </a:endParaRPr>
+          </a:p>
+        </p:txBody>
+      </p:sp>
+      <p:graphicFrame>
+        <p:nvGraphicFramePr>
+          <p:cNvPr id="8" name="Object 7"/>
+          <p:cNvGraphicFramePr>
+            <a:graphicFrameLocks noChangeAspect="1"/>
+          </p:cNvGraphicFramePr>
+          <p:nvPr>
+            <p:extLst>
+              <p:ext uri="{D42A27DB-BD31-4B8C-83A1-F6EECF244321}">
+                <p14:modId xmlns:p14="http://schemas.microsoft.com/office/powerpoint/2010/main" val="3906121449"/>
+              </p:ext>
+            </p:extLst>
+          </p:nvPr>
+        </p:nvGraphicFramePr>
+        <p:xfrm>
+          <a:off x="21331238" y="16271875"/>
+          <a:ext cx="1227137" cy="373063"/>
+        </p:xfrm>
+        <a:graphic>
+          <a:graphicData uri="http://schemas.openxmlformats.org/presentationml/2006/ole">
+            <mc:AlternateContent xmlns:mc="http://schemas.openxmlformats.org/markup-compatibility/2006">
+              <mc:Choice xmlns:v="urn:schemas-microsoft-com:vml" Requires="v">
+                <p:oleObj spid="_x0000_s1036" name="Worksheet" r:id="rId17" imgW="1226997" imgH="373530" progId="Excel.Sheet.12">
+                  <p:embed/>
+                </p:oleObj>
+              </mc:Choice>
+              <mc:Fallback>
+                <p:oleObj name="Worksheet" r:id="rId17" imgW="1226997" imgH="373530" progId="Excel.Sheet.12">
+                  <p:embed/>
+                  <p:pic>
+                    <p:nvPicPr>
+                      <p:cNvPr id="0" name=""/>
+                      <p:cNvPicPr/>
+                      <p:nvPr/>
+                    </p:nvPicPr>
+                    <p:blipFill>
+                      <a:blip r:embed="rId18"/>
+                      <a:stretch>
+                        <a:fillRect/>
+                      </a:stretch>
+                    </p:blipFill>
+                    <p:spPr>
+                      <a:xfrm>
+                        <a:off x="21331238" y="16271875"/>
+                        <a:ext cx="1227137" cy="373063"/>
+                      </a:xfrm>
+                      <a:prstGeom prst="rect">
+                        <a:avLst/>
+                      </a:prstGeom>
+                    </p:spPr>
+                  </p:pic>
+                </p:oleObj>
+              </mc:Fallback>
+            </mc:AlternateContent>
+          </a:graphicData>
+        </a:graphic>
+      </p:graphicFrame>
+      <p:graphicFrame>
+        <p:nvGraphicFramePr>
+          <p:cNvPr id="10" name="Table 9"/>
+          <p:cNvGraphicFramePr>
+            <a:graphicFrameLocks noGrp="1"/>
+          </p:cNvGraphicFramePr>
+          <p:nvPr>
+            <p:extLst>
+              <p:ext uri="{D42A27DB-BD31-4B8C-83A1-F6EECF244321}">
+                <p14:modId xmlns:p14="http://schemas.microsoft.com/office/powerpoint/2010/main" val="764975862"/>
+              </p:ext>
+            </p:extLst>
+          </p:nvPr>
+        </p:nvGraphicFramePr>
+        <p:xfrm>
+          <a:off x="15088659" y="27719321"/>
+          <a:ext cx="13329476" cy="4139046"/>
+        </p:xfrm>
+        <a:graphic>
+          <a:graphicData uri="http://schemas.openxmlformats.org/drawingml/2006/table">
+            <a:tbl>
+              <a:tblPr firstRow="1" bandRow="1">
+                <a:tableStyleId>{EB344D84-9AFB-497E-A393-DC336BA19D2E}</a:tableStyleId>
+              </a:tblPr>
+              <a:tblGrid>
+                <a:gridCol w="1778742"/>
+                <a:gridCol w="2991239"/>
+                <a:gridCol w="1543050"/>
+                <a:gridCol w="1790700"/>
+                <a:gridCol w="1390650"/>
+                <a:gridCol w="1314450"/>
+                <a:gridCol w="1279252"/>
+                <a:gridCol w="1241393"/>
+              </a:tblGrid>
+              <a:tr h="758272">
+                <a:tc>
+                  <a:txBody>
+                    <a:bodyPr/>
+                    <a:lstStyle/>
+                    <a:p>
+                      <a:pPr algn="ctr" fontAlgn="b"/>
+                      <a:r>
+                        <a:rPr lang="en-CA" sz="2200" b="1" u="none" strike="noStrike" dirty="0">
+                          <a:solidFill>
+                            <a:schemeClr val="tx1"/>
+                          </a:solidFill>
+                          <a:effectLst/>
+                          <a:latin typeface="Arial" panose="020B0604020202020204" pitchFamily="34" charset="0"/>
+                          <a:cs typeface="Arial" panose="020B0604020202020204" pitchFamily="34" charset="0"/>
+                        </a:rPr>
+                        <a:t>GO.ID</a:t>
+                      </a:r>
+                      <a:endParaRPr lang="en-CA" sz="2200" b="1" i="0" u="none" strike="noStrike" dirty="0">
+                        <a:solidFill>
+                          <a:schemeClr val="tx1"/>
+                        </a:solidFill>
+                        <a:effectLst/>
+                        <a:latin typeface="Arial" panose="020B0604020202020204" pitchFamily="34" charset="0"/>
+                        <a:cs typeface="Arial" panose="020B0604020202020204" pitchFamily="34" charset="0"/>
+                      </a:endParaRPr>
+                    </a:p>
+                  </a:txBody>
+                  <a:tcPr marL="7620" marR="7620" marT="7620" marB="0" anchor="b"/>
+                </a:tc>
+                <a:tc>
+                  <a:txBody>
+                    <a:bodyPr/>
+                    <a:lstStyle/>
+                    <a:p>
+                      <a:pPr algn="ctr" fontAlgn="b"/>
+                      <a:r>
+                        <a:rPr lang="en-CA" sz="2200" b="1" u="none" strike="noStrike" dirty="0">
+                          <a:solidFill>
+                            <a:schemeClr val="tx1"/>
+                          </a:solidFill>
+                          <a:effectLst/>
+                          <a:latin typeface="Arial" panose="020B0604020202020204" pitchFamily="34" charset="0"/>
+                          <a:cs typeface="Arial" panose="020B0604020202020204" pitchFamily="34" charset="0"/>
+                        </a:rPr>
+                        <a:t>Term</a:t>
+                      </a:r>
+                      <a:endParaRPr lang="en-CA" sz="2200" b="1" i="0" u="none" strike="noStrike" dirty="0">
+                        <a:solidFill>
+                          <a:schemeClr val="tx1"/>
+                        </a:solidFill>
+                        <a:effectLst/>
+                        <a:latin typeface="Arial" panose="020B0604020202020204" pitchFamily="34" charset="0"/>
+                        <a:cs typeface="Arial" panose="020B0604020202020204" pitchFamily="34" charset="0"/>
+                      </a:endParaRPr>
+                    </a:p>
+                  </a:txBody>
+                  <a:tcPr marL="7620" marR="7620" marT="7620" marB="0" anchor="b"/>
+                </a:tc>
+                <a:tc>
+                  <a:txBody>
+                    <a:bodyPr/>
+                    <a:lstStyle/>
+                    <a:p>
+                      <a:pPr algn="ctr" fontAlgn="b"/>
+                      <a:r>
+                        <a:rPr lang="en-CA" sz="2200" b="1" u="none" strike="noStrike" dirty="0">
+                          <a:solidFill>
+                            <a:schemeClr val="tx1"/>
+                          </a:solidFill>
+                          <a:effectLst/>
+                          <a:latin typeface="Arial" panose="020B0604020202020204" pitchFamily="34" charset="0"/>
+                          <a:cs typeface="Arial" panose="020B0604020202020204" pitchFamily="34" charset="0"/>
+                        </a:rPr>
+                        <a:t>Annotated</a:t>
+                      </a:r>
+                      <a:endParaRPr lang="en-CA" sz="2200" b="1" i="0" u="none" strike="noStrike" dirty="0">
+                        <a:solidFill>
+                          <a:schemeClr val="tx1"/>
+                        </a:solidFill>
+                        <a:effectLst/>
+                        <a:latin typeface="Arial" panose="020B0604020202020204" pitchFamily="34" charset="0"/>
+                        <a:cs typeface="Arial" panose="020B0604020202020204" pitchFamily="34" charset="0"/>
+                      </a:endParaRPr>
+                    </a:p>
+                  </a:txBody>
+                  <a:tcPr marL="7620" marR="7620" marT="7620" marB="0" anchor="b"/>
+                </a:tc>
+                <a:tc>
+                  <a:txBody>
+                    <a:bodyPr/>
+                    <a:lstStyle/>
+                    <a:p>
+                      <a:pPr algn="ctr" fontAlgn="b"/>
+                      <a:r>
+                        <a:rPr lang="en-CA" sz="2200" b="1" u="none" strike="noStrike" dirty="0">
+                          <a:solidFill>
+                            <a:schemeClr val="tx1"/>
+                          </a:solidFill>
+                          <a:effectLst/>
+                          <a:latin typeface="Arial" panose="020B0604020202020204" pitchFamily="34" charset="0"/>
+                          <a:cs typeface="Arial" panose="020B0604020202020204" pitchFamily="34" charset="0"/>
+                        </a:rPr>
+                        <a:t>Significant</a:t>
+                      </a:r>
+                      <a:endParaRPr lang="en-CA" sz="2200" b="1" i="0" u="none" strike="noStrike" dirty="0">
+                        <a:solidFill>
+                          <a:schemeClr val="tx1"/>
+                        </a:solidFill>
+                        <a:effectLst/>
+                        <a:latin typeface="Arial" panose="020B0604020202020204" pitchFamily="34" charset="0"/>
+                        <a:cs typeface="Arial" panose="020B0604020202020204" pitchFamily="34" charset="0"/>
+                      </a:endParaRPr>
+                    </a:p>
+                  </a:txBody>
+                  <a:tcPr marL="7620" marR="7620" marT="7620" marB="0" anchor="b"/>
+                </a:tc>
+                <a:tc>
+                  <a:txBody>
+                    <a:bodyPr/>
+                    <a:lstStyle/>
+                    <a:p>
+                      <a:pPr algn="ctr" fontAlgn="b"/>
+                      <a:r>
+                        <a:rPr lang="en-CA" sz="2200" b="1" u="none" strike="noStrike" dirty="0">
+                          <a:solidFill>
+                            <a:schemeClr val="tx1"/>
+                          </a:solidFill>
+                          <a:effectLst/>
+                          <a:latin typeface="Arial" panose="020B0604020202020204" pitchFamily="34" charset="0"/>
+                          <a:cs typeface="Arial" panose="020B0604020202020204" pitchFamily="34" charset="0"/>
+                        </a:rPr>
+                        <a:t>Expected</a:t>
+                      </a:r>
+                      <a:endParaRPr lang="en-CA" sz="2200" b="1" i="0" u="none" strike="noStrike" dirty="0">
+                        <a:solidFill>
+                          <a:schemeClr val="tx1"/>
+                        </a:solidFill>
+                        <a:effectLst/>
+                        <a:latin typeface="Arial" panose="020B0604020202020204" pitchFamily="34" charset="0"/>
+                        <a:cs typeface="Arial" panose="020B0604020202020204" pitchFamily="34" charset="0"/>
+                      </a:endParaRPr>
+                    </a:p>
+                  </a:txBody>
+                  <a:tcPr marL="7620" marR="7620" marT="7620" marB="0" anchor="b"/>
+                </a:tc>
+                <a:tc>
+                  <a:txBody>
+                    <a:bodyPr/>
+                    <a:lstStyle/>
+                    <a:p>
+                      <a:pPr algn="ctr" fontAlgn="b"/>
+                      <a:r>
+                        <a:rPr lang="en-CA" sz="2200" b="1" u="none" strike="noStrike" dirty="0">
+                          <a:solidFill>
+                            <a:schemeClr val="tx1"/>
+                          </a:solidFill>
+                          <a:effectLst/>
+                          <a:latin typeface="Arial" panose="020B0604020202020204" pitchFamily="34" charset="0"/>
+                          <a:cs typeface="Arial" panose="020B0604020202020204" pitchFamily="34" charset="0"/>
+                        </a:rPr>
+                        <a:t>Rank in </a:t>
+                      </a:r>
+                      <a:r>
+                        <a:rPr lang="en-CA" sz="2200" b="1" u="none" strike="noStrike" dirty="0" smtClean="0">
+                          <a:solidFill>
+                            <a:schemeClr val="tx1"/>
+                          </a:solidFill>
+                          <a:effectLst/>
+                          <a:latin typeface="Arial" panose="020B0604020202020204" pitchFamily="34" charset="0"/>
+                          <a:cs typeface="Arial" panose="020B0604020202020204" pitchFamily="34" charset="0"/>
+                        </a:rPr>
+                        <a:t>classic Fisher</a:t>
+                      </a:r>
+                      <a:endParaRPr lang="en-CA" sz="2200" b="1" i="0" u="none" strike="noStrike" dirty="0">
+                        <a:solidFill>
+                          <a:schemeClr val="tx1"/>
+                        </a:solidFill>
+                        <a:effectLst/>
+                        <a:latin typeface="Arial" panose="020B0604020202020204" pitchFamily="34" charset="0"/>
+                        <a:cs typeface="Arial" panose="020B0604020202020204" pitchFamily="34" charset="0"/>
+                      </a:endParaRPr>
+                    </a:p>
+                  </a:txBody>
+                  <a:tcPr marL="7620" marR="7620" marT="7620" marB="0" anchor="b"/>
+                </a:tc>
+                <a:tc>
+                  <a:txBody>
+                    <a:bodyPr/>
+                    <a:lstStyle/>
+                    <a:p>
+                      <a:pPr algn="ctr" fontAlgn="b"/>
+                      <a:r>
+                        <a:rPr lang="en-CA" sz="2200" b="1" u="none" strike="noStrike" dirty="0" smtClean="0">
+                          <a:solidFill>
+                            <a:schemeClr val="tx1"/>
+                          </a:solidFill>
+                          <a:effectLst/>
+                          <a:latin typeface="Arial" panose="020B0604020202020204" pitchFamily="34" charset="0"/>
+                          <a:cs typeface="Arial" panose="020B0604020202020204" pitchFamily="34" charset="0"/>
+                        </a:rPr>
+                        <a:t>Classic Fisher</a:t>
+                      </a:r>
+                      <a:endParaRPr lang="en-CA" sz="2200" b="1" i="0" u="none" strike="noStrike" dirty="0">
+                        <a:solidFill>
+                          <a:schemeClr val="tx1"/>
+                        </a:solidFill>
+                        <a:effectLst/>
+                        <a:latin typeface="Arial" panose="020B0604020202020204" pitchFamily="34" charset="0"/>
+                        <a:cs typeface="Arial" panose="020B0604020202020204" pitchFamily="34" charset="0"/>
+                      </a:endParaRPr>
+                    </a:p>
+                  </a:txBody>
+                  <a:tcPr marL="7620" marR="7620" marT="7620" marB="0" anchor="b"/>
+                </a:tc>
+                <a:tc>
+                  <a:txBody>
+                    <a:bodyPr/>
+                    <a:lstStyle/>
+                    <a:p>
+                      <a:pPr algn="ctr" fontAlgn="b"/>
+                      <a:r>
+                        <a:rPr lang="en-CA" sz="2200" b="1" u="none" strike="noStrike" dirty="0" smtClean="0">
+                          <a:solidFill>
+                            <a:schemeClr val="tx1"/>
+                          </a:solidFill>
+                          <a:effectLst/>
+                          <a:latin typeface="Arial" panose="020B0604020202020204" pitchFamily="34" charset="0"/>
+                          <a:cs typeface="Arial" panose="020B0604020202020204" pitchFamily="34" charset="0"/>
+                        </a:rPr>
+                        <a:t>Classic KS</a:t>
+                      </a:r>
+                      <a:endParaRPr lang="en-CA" sz="2200" b="1" i="0" u="none" strike="noStrike" dirty="0">
+                        <a:solidFill>
+                          <a:schemeClr val="tx1"/>
+                        </a:solidFill>
+                        <a:effectLst/>
+                        <a:latin typeface="Arial" panose="020B0604020202020204" pitchFamily="34" charset="0"/>
+                        <a:cs typeface="Arial" panose="020B0604020202020204" pitchFamily="34" charset="0"/>
+                      </a:endParaRPr>
+                    </a:p>
+                  </a:txBody>
+                  <a:tcPr marL="7620" marR="7620" marT="7620" marB="0" anchor="b"/>
+                </a:tc>
+              </a:tr>
+              <a:tr h="509287">
+                <a:tc>
+                  <a:txBody>
+                    <a:bodyPr/>
+                    <a:lstStyle/>
+                    <a:p>
+                      <a:pPr algn="ctr" fontAlgn="b"/>
+                      <a:r>
+                        <a:rPr lang="en-CA" sz="2200" u="none" strike="noStrike" dirty="0">
+                          <a:effectLst/>
+                          <a:latin typeface="Arial" panose="020B0604020202020204" pitchFamily="34" charset="0"/>
+                          <a:cs typeface="Arial" panose="020B0604020202020204" pitchFamily="34" charset="0"/>
+                        </a:rPr>
+                        <a:t>GO:0003674</a:t>
+                      </a:r>
+                      <a:endParaRPr lang="en-CA" sz="2200" b="0" i="0" u="none" strike="noStrike" dirty="0">
+                        <a:solidFill>
+                          <a:srgbClr val="000000"/>
+                        </a:solidFill>
+                        <a:effectLst/>
+                        <a:latin typeface="Arial" panose="020B0604020202020204" pitchFamily="34" charset="0"/>
+                        <a:cs typeface="Arial" panose="020B0604020202020204" pitchFamily="34" charset="0"/>
+                      </a:endParaRPr>
+                    </a:p>
+                  </a:txBody>
+                  <a:tcPr marL="7620" marR="7620" marT="7620" marB="0"/>
+                </a:tc>
+                <a:tc>
+                  <a:txBody>
+                    <a:bodyPr/>
+                    <a:lstStyle/>
+                    <a:p>
+                      <a:pPr algn="l" fontAlgn="b"/>
+                      <a:r>
+                        <a:rPr lang="en-CA" sz="2200" u="none" strike="noStrike" dirty="0" err="1">
+                          <a:effectLst/>
+                          <a:latin typeface="Arial" panose="020B0604020202020204" pitchFamily="34" charset="0"/>
+                          <a:cs typeface="Arial" panose="020B0604020202020204" pitchFamily="34" charset="0"/>
+                        </a:rPr>
+                        <a:t>molecular_function</a:t>
+                      </a:r>
+                      <a:endParaRPr lang="en-CA" sz="2200" b="0" i="0" u="none" strike="noStrike" dirty="0">
+                        <a:solidFill>
+                          <a:srgbClr val="000000"/>
+                        </a:solidFill>
+                        <a:effectLst/>
+                        <a:latin typeface="Arial" panose="020B0604020202020204" pitchFamily="34" charset="0"/>
+                        <a:cs typeface="Arial" panose="020B0604020202020204" pitchFamily="34" charset="0"/>
+                      </a:endParaRPr>
+                    </a:p>
+                  </a:txBody>
+                  <a:tcPr marL="7620" marR="7620" marT="7620" marB="0"/>
+                </a:tc>
+                <a:tc>
+                  <a:txBody>
+                    <a:bodyPr/>
+                    <a:lstStyle/>
+                    <a:p>
+                      <a:pPr algn="ctr" fontAlgn="b"/>
+                      <a:r>
+                        <a:rPr lang="en-CA" sz="2200" u="none" strike="noStrike" dirty="0">
+                          <a:effectLst/>
+                          <a:latin typeface="Arial" panose="020B0604020202020204" pitchFamily="34" charset="0"/>
+                          <a:cs typeface="Arial" panose="020B0604020202020204" pitchFamily="34" charset="0"/>
+                        </a:rPr>
+                        <a:t>15366</a:t>
+                      </a:r>
+                      <a:endParaRPr lang="en-CA" sz="2200" b="0" i="0" u="none" strike="noStrike" dirty="0">
+                        <a:solidFill>
+                          <a:srgbClr val="000000"/>
+                        </a:solidFill>
+                        <a:effectLst/>
+                        <a:latin typeface="Arial" panose="020B0604020202020204" pitchFamily="34" charset="0"/>
+                        <a:cs typeface="Arial" panose="020B0604020202020204" pitchFamily="34" charset="0"/>
+                      </a:endParaRPr>
+                    </a:p>
+                  </a:txBody>
+                  <a:tcPr marL="7620" marR="7620" marT="7620" marB="0"/>
+                </a:tc>
+                <a:tc>
+                  <a:txBody>
+                    <a:bodyPr/>
+                    <a:lstStyle/>
+                    <a:p>
+                      <a:pPr algn="ctr" fontAlgn="b"/>
+                      <a:r>
+                        <a:rPr lang="en-CA" sz="2200" u="none" strike="noStrike" dirty="0">
+                          <a:effectLst/>
+                          <a:latin typeface="Arial" panose="020B0604020202020204" pitchFamily="34" charset="0"/>
+                          <a:cs typeface="Arial" panose="020B0604020202020204" pitchFamily="34" charset="0"/>
+                        </a:rPr>
+                        <a:t>11</a:t>
+                      </a:r>
+                      <a:endParaRPr lang="en-CA" sz="2200" b="0" i="0" u="none" strike="noStrike" dirty="0">
+                        <a:solidFill>
+                          <a:srgbClr val="000000"/>
+                        </a:solidFill>
+                        <a:effectLst/>
+                        <a:latin typeface="Arial" panose="020B0604020202020204" pitchFamily="34" charset="0"/>
+                        <a:cs typeface="Arial" panose="020B0604020202020204" pitchFamily="34" charset="0"/>
+                      </a:endParaRPr>
+                    </a:p>
+                  </a:txBody>
+                  <a:tcPr marL="7620" marR="7620" marT="7620" marB="0"/>
+                </a:tc>
+                <a:tc>
+                  <a:txBody>
+                    <a:bodyPr/>
+                    <a:lstStyle/>
+                    <a:p>
+                      <a:pPr algn="ctr" fontAlgn="b"/>
+                      <a:r>
+                        <a:rPr lang="en-CA" sz="2200" u="none" strike="noStrike" dirty="0">
+                          <a:effectLst/>
+                          <a:latin typeface="Arial" panose="020B0604020202020204" pitchFamily="34" charset="0"/>
+                          <a:cs typeface="Arial" panose="020B0604020202020204" pitchFamily="34" charset="0"/>
+                        </a:rPr>
+                        <a:t>9.33</a:t>
+                      </a:r>
+                      <a:endParaRPr lang="en-CA" sz="2200" b="0" i="0" u="none" strike="noStrike" dirty="0">
+                        <a:solidFill>
+                          <a:srgbClr val="000000"/>
+                        </a:solidFill>
+                        <a:effectLst/>
+                        <a:latin typeface="Arial" panose="020B0604020202020204" pitchFamily="34" charset="0"/>
+                        <a:cs typeface="Arial" panose="020B0604020202020204" pitchFamily="34" charset="0"/>
+                      </a:endParaRPr>
+                    </a:p>
+                  </a:txBody>
+                  <a:tcPr marL="7620" marR="7620" marT="7620" marB="0"/>
+                </a:tc>
+                <a:tc>
+                  <a:txBody>
+                    <a:bodyPr/>
+                    <a:lstStyle/>
+                    <a:p>
+                      <a:pPr algn="ctr" fontAlgn="b"/>
+                      <a:r>
+                        <a:rPr lang="en-CA" sz="2200" u="none" strike="noStrike" dirty="0">
+                          <a:effectLst/>
+                          <a:latin typeface="Arial" panose="020B0604020202020204" pitchFamily="34" charset="0"/>
+                          <a:cs typeface="Arial" panose="020B0604020202020204" pitchFamily="34" charset="0"/>
+                        </a:rPr>
+                        <a:t>106</a:t>
+                      </a:r>
+                      <a:endParaRPr lang="en-CA" sz="2200" b="0" i="0" u="none" strike="noStrike" dirty="0">
+                        <a:solidFill>
+                          <a:srgbClr val="000000"/>
+                        </a:solidFill>
+                        <a:effectLst/>
+                        <a:latin typeface="Arial" panose="020B0604020202020204" pitchFamily="34" charset="0"/>
+                        <a:cs typeface="Arial" panose="020B0604020202020204" pitchFamily="34" charset="0"/>
+                      </a:endParaRPr>
+                    </a:p>
+                  </a:txBody>
+                  <a:tcPr marL="7620" marR="7620" marT="7620" marB="0"/>
+                </a:tc>
+                <a:tc>
+                  <a:txBody>
+                    <a:bodyPr/>
+                    <a:lstStyle/>
+                    <a:p>
+                      <a:pPr algn="ctr" fontAlgn="b"/>
+                      <a:r>
+                        <a:rPr lang="en-CA" sz="2200" u="none" strike="noStrike" dirty="0">
+                          <a:effectLst/>
+                          <a:latin typeface="Arial" panose="020B0604020202020204" pitchFamily="34" charset="0"/>
+                          <a:cs typeface="Arial" panose="020B0604020202020204" pitchFamily="34" charset="0"/>
+                        </a:rPr>
+                        <a:t>0.330</a:t>
+                      </a:r>
+                      <a:endParaRPr lang="en-CA" sz="2200" b="0" i="0" u="none" strike="noStrike" dirty="0">
+                        <a:solidFill>
+                          <a:srgbClr val="000000"/>
+                        </a:solidFill>
+                        <a:effectLst/>
+                        <a:latin typeface="Arial" panose="020B0604020202020204" pitchFamily="34" charset="0"/>
+                        <a:cs typeface="Arial" panose="020B0604020202020204" pitchFamily="34" charset="0"/>
+                      </a:endParaRPr>
+                    </a:p>
+                  </a:txBody>
+                  <a:tcPr marL="7620" marR="7620" marT="7620" marB="0"/>
+                </a:tc>
+                <a:tc>
+                  <a:txBody>
+                    <a:bodyPr/>
+                    <a:lstStyle/>
+                    <a:p>
+                      <a:pPr algn="ctr" fontAlgn="b"/>
+                      <a:r>
+                        <a:rPr lang="en-CA" sz="2200" u="none" strike="noStrike" dirty="0">
+                          <a:effectLst/>
+                          <a:latin typeface="Arial" panose="020B0604020202020204" pitchFamily="34" charset="0"/>
+                          <a:cs typeface="Arial" panose="020B0604020202020204" pitchFamily="34" charset="0"/>
+                        </a:rPr>
+                        <a:t>&lt; 1e-30</a:t>
+                      </a:r>
+                      <a:endParaRPr lang="en-CA" sz="2200" b="0" i="0" u="none" strike="noStrike" dirty="0">
+                        <a:solidFill>
+                          <a:srgbClr val="000000"/>
+                        </a:solidFill>
+                        <a:effectLst/>
+                        <a:latin typeface="Arial" panose="020B0604020202020204" pitchFamily="34" charset="0"/>
+                        <a:cs typeface="Arial" panose="020B0604020202020204" pitchFamily="34" charset="0"/>
+                      </a:endParaRPr>
+                    </a:p>
+                  </a:txBody>
+                  <a:tcPr marL="7620" marR="7620" marT="7620" marB="0"/>
+                </a:tc>
+              </a:tr>
+              <a:tr h="1069613">
+                <a:tc>
+                  <a:txBody>
+                    <a:bodyPr/>
+                    <a:lstStyle/>
+                    <a:p>
+                      <a:pPr algn="ctr" fontAlgn="b"/>
+                      <a:r>
+                        <a:rPr lang="en-CA" sz="2200" u="none" strike="noStrike" dirty="0">
+                          <a:effectLst/>
+                          <a:latin typeface="Arial" panose="020B0604020202020204" pitchFamily="34" charset="0"/>
+                          <a:cs typeface="Arial" panose="020B0604020202020204" pitchFamily="34" charset="0"/>
+                        </a:rPr>
+                        <a:t>GO:0005001</a:t>
+                      </a:r>
+                      <a:endParaRPr lang="en-CA" sz="2200" b="0" i="0" u="none" strike="noStrike" dirty="0">
+                        <a:solidFill>
+                          <a:srgbClr val="000000"/>
+                        </a:solidFill>
+                        <a:effectLst/>
+                        <a:latin typeface="Arial" panose="020B0604020202020204" pitchFamily="34" charset="0"/>
+                        <a:cs typeface="Arial" panose="020B0604020202020204" pitchFamily="34" charset="0"/>
+                      </a:endParaRPr>
+                    </a:p>
+                  </a:txBody>
+                  <a:tcPr marL="7620" marR="7620" marT="7620" marB="0"/>
+                </a:tc>
+                <a:tc>
+                  <a:txBody>
+                    <a:bodyPr/>
+                    <a:lstStyle/>
+                    <a:p>
+                      <a:pPr algn="l" fontAlgn="b"/>
+                      <a:r>
+                        <a:rPr lang="en-CA" sz="2200" u="none" strike="noStrike" dirty="0">
+                          <a:effectLst/>
+                          <a:latin typeface="Arial" panose="020B0604020202020204" pitchFamily="34" charset="0"/>
+                          <a:cs typeface="Arial" panose="020B0604020202020204" pitchFamily="34" charset="0"/>
+                        </a:rPr>
+                        <a:t>transmembrane receptor protein tyrosine </a:t>
+                      </a:r>
+                      <a:r>
+                        <a:rPr lang="en-CA" sz="2200" u="none" strike="noStrike" dirty="0" smtClean="0">
+                          <a:effectLst/>
+                          <a:latin typeface="Arial" panose="020B0604020202020204" pitchFamily="34" charset="0"/>
+                          <a:cs typeface="Arial" panose="020B0604020202020204" pitchFamily="34" charset="0"/>
+                        </a:rPr>
+                        <a:t>phosphatase</a:t>
+                      </a:r>
+                      <a:r>
+                        <a:rPr lang="en-CA" sz="2200" u="none" strike="noStrike" baseline="0" dirty="0" smtClean="0">
+                          <a:effectLst/>
+                          <a:latin typeface="Arial" panose="020B0604020202020204" pitchFamily="34" charset="0"/>
+                          <a:cs typeface="Arial" panose="020B0604020202020204" pitchFamily="34" charset="0"/>
+                        </a:rPr>
+                        <a:t> activity</a:t>
+                      </a:r>
+                      <a:endParaRPr lang="en-CA" sz="2200" b="0" i="0" u="none" strike="noStrike" dirty="0">
+                        <a:solidFill>
+                          <a:srgbClr val="000000"/>
+                        </a:solidFill>
+                        <a:effectLst/>
+                        <a:latin typeface="Arial" panose="020B0604020202020204" pitchFamily="34" charset="0"/>
+                        <a:cs typeface="Arial" panose="020B0604020202020204" pitchFamily="34" charset="0"/>
+                      </a:endParaRPr>
+                    </a:p>
+                  </a:txBody>
+                  <a:tcPr marL="7620" marR="7620" marT="7620" marB="0"/>
+                </a:tc>
+                <a:tc>
+                  <a:txBody>
+                    <a:bodyPr/>
+                    <a:lstStyle/>
+                    <a:p>
+                      <a:pPr algn="ctr" fontAlgn="b"/>
+                      <a:r>
+                        <a:rPr lang="en-CA" sz="2200" u="none" strike="noStrike" dirty="0">
+                          <a:effectLst/>
+                          <a:latin typeface="Arial" panose="020B0604020202020204" pitchFamily="34" charset="0"/>
+                          <a:cs typeface="Arial" panose="020B0604020202020204" pitchFamily="34" charset="0"/>
+                        </a:rPr>
+                        <a:t>98</a:t>
+                      </a:r>
+                      <a:endParaRPr lang="en-CA" sz="2200" b="0" i="0" u="none" strike="noStrike" dirty="0">
+                        <a:solidFill>
+                          <a:srgbClr val="000000"/>
+                        </a:solidFill>
+                        <a:effectLst/>
+                        <a:latin typeface="Arial" panose="020B0604020202020204" pitchFamily="34" charset="0"/>
+                        <a:cs typeface="Arial" panose="020B0604020202020204" pitchFamily="34" charset="0"/>
+                      </a:endParaRPr>
+                    </a:p>
+                  </a:txBody>
+                  <a:tcPr marL="7620" marR="7620" marT="7620" marB="0"/>
+                </a:tc>
+                <a:tc>
+                  <a:txBody>
+                    <a:bodyPr/>
+                    <a:lstStyle/>
+                    <a:p>
+                      <a:pPr algn="ctr" fontAlgn="b"/>
+                      <a:r>
+                        <a:rPr lang="en-CA" sz="2200" u="none" strike="noStrike" dirty="0">
+                          <a:effectLst/>
+                          <a:latin typeface="Arial" panose="020B0604020202020204" pitchFamily="34" charset="0"/>
+                          <a:cs typeface="Arial" panose="020B0604020202020204" pitchFamily="34" charset="0"/>
+                        </a:rPr>
+                        <a:t>0</a:t>
+                      </a:r>
+                      <a:endParaRPr lang="en-CA" sz="2200" b="0" i="0" u="none" strike="noStrike" dirty="0">
+                        <a:solidFill>
+                          <a:srgbClr val="000000"/>
+                        </a:solidFill>
+                        <a:effectLst/>
+                        <a:latin typeface="Arial" panose="020B0604020202020204" pitchFamily="34" charset="0"/>
+                        <a:cs typeface="Arial" panose="020B0604020202020204" pitchFamily="34" charset="0"/>
+                      </a:endParaRPr>
+                    </a:p>
+                  </a:txBody>
+                  <a:tcPr marL="7620" marR="7620" marT="7620" marB="0"/>
+                </a:tc>
+                <a:tc>
+                  <a:txBody>
+                    <a:bodyPr/>
+                    <a:lstStyle/>
+                    <a:p>
+                      <a:pPr algn="ctr" fontAlgn="b"/>
+                      <a:r>
+                        <a:rPr lang="en-CA" sz="2200" u="none" strike="noStrike" dirty="0">
+                          <a:effectLst/>
+                          <a:latin typeface="Arial" panose="020B0604020202020204" pitchFamily="34" charset="0"/>
+                          <a:cs typeface="Arial" panose="020B0604020202020204" pitchFamily="34" charset="0"/>
+                        </a:rPr>
+                        <a:t>0.06</a:t>
+                      </a:r>
+                      <a:endParaRPr lang="en-CA" sz="2200" b="0" i="0" u="none" strike="noStrike" dirty="0">
+                        <a:solidFill>
+                          <a:srgbClr val="000000"/>
+                        </a:solidFill>
+                        <a:effectLst/>
+                        <a:latin typeface="Arial" panose="020B0604020202020204" pitchFamily="34" charset="0"/>
+                        <a:cs typeface="Arial" panose="020B0604020202020204" pitchFamily="34" charset="0"/>
+                      </a:endParaRPr>
+                    </a:p>
+                  </a:txBody>
+                  <a:tcPr marL="7620" marR="7620" marT="7620" marB="0"/>
+                </a:tc>
+                <a:tc>
+                  <a:txBody>
+                    <a:bodyPr/>
+                    <a:lstStyle/>
+                    <a:p>
+                      <a:pPr algn="ctr" fontAlgn="b"/>
+                      <a:r>
+                        <a:rPr lang="en-CA" sz="2200" u="none" strike="noStrike" dirty="0">
+                          <a:effectLst/>
+                          <a:latin typeface="Arial" panose="020B0604020202020204" pitchFamily="34" charset="0"/>
+                          <a:cs typeface="Arial" panose="020B0604020202020204" pitchFamily="34" charset="0"/>
+                        </a:rPr>
+                        <a:t>123</a:t>
+                      </a:r>
+                      <a:endParaRPr lang="en-CA" sz="2200" b="0" i="0" u="none" strike="noStrike" dirty="0">
+                        <a:solidFill>
+                          <a:srgbClr val="000000"/>
+                        </a:solidFill>
+                        <a:effectLst/>
+                        <a:latin typeface="Arial" panose="020B0604020202020204" pitchFamily="34" charset="0"/>
+                        <a:cs typeface="Arial" panose="020B0604020202020204" pitchFamily="34" charset="0"/>
+                      </a:endParaRPr>
+                    </a:p>
+                  </a:txBody>
+                  <a:tcPr marL="7620" marR="7620" marT="7620" marB="0"/>
+                </a:tc>
+                <a:tc>
+                  <a:txBody>
+                    <a:bodyPr/>
+                    <a:lstStyle/>
+                    <a:p>
+                      <a:pPr algn="ctr" fontAlgn="b"/>
+                      <a:r>
+                        <a:rPr lang="en-CA" sz="2200" u="none" strike="noStrike" dirty="0">
+                          <a:effectLst/>
+                          <a:latin typeface="Arial" panose="020B0604020202020204" pitchFamily="34" charset="0"/>
+                          <a:cs typeface="Arial" panose="020B0604020202020204" pitchFamily="34" charset="0"/>
+                        </a:rPr>
+                        <a:t>1.000</a:t>
+                      </a:r>
+                      <a:endParaRPr lang="en-CA" sz="2200" b="0" i="0" u="none" strike="noStrike" dirty="0">
+                        <a:solidFill>
+                          <a:srgbClr val="000000"/>
+                        </a:solidFill>
+                        <a:effectLst/>
+                        <a:latin typeface="Arial" panose="020B0604020202020204" pitchFamily="34" charset="0"/>
+                        <a:cs typeface="Arial" panose="020B0604020202020204" pitchFamily="34" charset="0"/>
+                      </a:endParaRPr>
+                    </a:p>
+                  </a:txBody>
+                  <a:tcPr marL="7620" marR="7620" marT="7620" marB="0"/>
+                </a:tc>
+                <a:tc>
+                  <a:txBody>
+                    <a:bodyPr/>
+                    <a:lstStyle/>
+                    <a:p>
+                      <a:pPr algn="ctr" fontAlgn="b"/>
+                      <a:r>
+                        <a:rPr lang="en-CA" sz="2200" u="none" strike="noStrike" dirty="0">
+                          <a:effectLst/>
+                          <a:latin typeface="Arial" panose="020B0604020202020204" pitchFamily="34" charset="0"/>
+                          <a:cs typeface="Arial" panose="020B0604020202020204" pitchFamily="34" charset="0"/>
+                        </a:rPr>
+                        <a:t>1.1e-11</a:t>
+                      </a:r>
+                      <a:endParaRPr lang="en-CA" sz="2200" b="0" i="0" u="none" strike="noStrike" dirty="0">
+                        <a:solidFill>
+                          <a:srgbClr val="000000"/>
+                        </a:solidFill>
+                        <a:effectLst/>
+                        <a:latin typeface="Arial" panose="020B0604020202020204" pitchFamily="34" charset="0"/>
+                        <a:cs typeface="Arial" panose="020B0604020202020204" pitchFamily="34" charset="0"/>
+                      </a:endParaRPr>
+                    </a:p>
+                  </a:txBody>
+                  <a:tcPr marL="7620" marR="7620" marT="7620" marB="0"/>
+                </a:tc>
+              </a:tr>
+              <a:tr h="509287">
+                <a:tc>
+                  <a:txBody>
+                    <a:bodyPr/>
+                    <a:lstStyle/>
+                    <a:p>
+                      <a:pPr algn="ctr" fontAlgn="b"/>
+                      <a:r>
+                        <a:rPr lang="en-CA" sz="2200" u="none" strike="noStrike" dirty="0">
+                          <a:effectLst/>
+                          <a:latin typeface="Arial" panose="020B0604020202020204" pitchFamily="34" charset="0"/>
+                          <a:cs typeface="Arial" panose="020B0604020202020204" pitchFamily="34" charset="0"/>
+                        </a:rPr>
+                        <a:t>GO:0046332</a:t>
+                      </a:r>
+                      <a:endParaRPr lang="en-CA" sz="2200" b="0" i="0" u="none" strike="noStrike" dirty="0">
+                        <a:solidFill>
+                          <a:srgbClr val="000000"/>
+                        </a:solidFill>
+                        <a:effectLst/>
+                        <a:latin typeface="Arial" panose="020B0604020202020204" pitchFamily="34" charset="0"/>
+                        <a:cs typeface="Arial" panose="020B0604020202020204" pitchFamily="34" charset="0"/>
+                      </a:endParaRPr>
+                    </a:p>
+                  </a:txBody>
+                  <a:tcPr marL="7620" marR="7620" marT="7620" marB="0"/>
+                </a:tc>
+                <a:tc>
+                  <a:txBody>
+                    <a:bodyPr/>
+                    <a:lstStyle/>
+                    <a:p>
+                      <a:pPr algn="l" fontAlgn="b"/>
+                      <a:r>
+                        <a:rPr lang="en-CA" sz="2200" u="none" strike="noStrike" dirty="0">
+                          <a:effectLst/>
+                          <a:latin typeface="Arial" panose="020B0604020202020204" pitchFamily="34" charset="0"/>
+                          <a:cs typeface="Arial" panose="020B0604020202020204" pitchFamily="34" charset="0"/>
+                        </a:rPr>
+                        <a:t>SMAD binding</a:t>
+                      </a:r>
+                      <a:endParaRPr lang="en-CA" sz="2200" b="0" i="0" u="none" strike="noStrike" dirty="0">
+                        <a:solidFill>
+                          <a:srgbClr val="000000"/>
+                        </a:solidFill>
+                        <a:effectLst/>
+                        <a:latin typeface="Arial" panose="020B0604020202020204" pitchFamily="34" charset="0"/>
+                        <a:cs typeface="Arial" panose="020B0604020202020204" pitchFamily="34" charset="0"/>
+                      </a:endParaRPr>
+                    </a:p>
+                  </a:txBody>
+                  <a:tcPr marL="7620" marR="7620" marT="7620" marB="0"/>
+                </a:tc>
+                <a:tc>
+                  <a:txBody>
+                    <a:bodyPr/>
+                    <a:lstStyle/>
+                    <a:p>
+                      <a:pPr algn="ctr" fontAlgn="b"/>
+                      <a:r>
+                        <a:rPr lang="en-CA" sz="2200" u="none" strike="noStrike">
+                          <a:effectLst/>
+                          <a:latin typeface="Arial" panose="020B0604020202020204" pitchFamily="34" charset="0"/>
+                          <a:cs typeface="Arial" panose="020B0604020202020204" pitchFamily="34" charset="0"/>
+                        </a:rPr>
+                        <a:t>128</a:t>
+                      </a:r>
+                      <a:endParaRPr lang="en-CA" sz="2200" b="0" i="0" u="none" strike="noStrike">
+                        <a:solidFill>
+                          <a:srgbClr val="000000"/>
+                        </a:solidFill>
+                        <a:effectLst/>
+                        <a:latin typeface="Arial" panose="020B0604020202020204" pitchFamily="34" charset="0"/>
+                        <a:cs typeface="Arial" panose="020B0604020202020204" pitchFamily="34" charset="0"/>
+                      </a:endParaRPr>
+                    </a:p>
+                  </a:txBody>
+                  <a:tcPr marL="7620" marR="7620" marT="7620" marB="0"/>
+                </a:tc>
+                <a:tc>
+                  <a:txBody>
+                    <a:bodyPr/>
+                    <a:lstStyle/>
+                    <a:p>
+                      <a:pPr algn="ctr" fontAlgn="b"/>
+                      <a:r>
+                        <a:rPr lang="en-CA" sz="2200" u="none" strike="noStrike" dirty="0">
+                          <a:effectLst/>
+                          <a:latin typeface="Arial" panose="020B0604020202020204" pitchFamily="34" charset="0"/>
+                          <a:cs typeface="Arial" panose="020B0604020202020204" pitchFamily="34" charset="0"/>
+                        </a:rPr>
+                        <a:t>0</a:t>
+                      </a:r>
+                      <a:endParaRPr lang="en-CA" sz="2200" b="0" i="0" u="none" strike="noStrike" dirty="0">
+                        <a:solidFill>
+                          <a:srgbClr val="000000"/>
+                        </a:solidFill>
+                        <a:effectLst/>
+                        <a:latin typeface="Arial" panose="020B0604020202020204" pitchFamily="34" charset="0"/>
+                        <a:cs typeface="Arial" panose="020B0604020202020204" pitchFamily="34" charset="0"/>
+                      </a:endParaRPr>
+                    </a:p>
+                  </a:txBody>
+                  <a:tcPr marL="7620" marR="7620" marT="7620" marB="0"/>
+                </a:tc>
+                <a:tc>
+                  <a:txBody>
+                    <a:bodyPr/>
+                    <a:lstStyle/>
+                    <a:p>
+                      <a:pPr algn="ctr" fontAlgn="b"/>
+                      <a:r>
+                        <a:rPr lang="en-CA" sz="2200" u="none" strike="noStrike" dirty="0">
+                          <a:effectLst/>
+                          <a:latin typeface="Arial" panose="020B0604020202020204" pitchFamily="34" charset="0"/>
+                          <a:cs typeface="Arial" panose="020B0604020202020204" pitchFamily="34" charset="0"/>
+                        </a:rPr>
+                        <a:t>0.08</a:t>
+                      </a:r>
+                      <a:endParaRPr lang="en-CA" sz="2200" b="0" i="0" u="none" strike="noStrike" dirty="0">
+                        <a:solidFill>
+                          <a:srgbClr val="000000"/>
+                        </a:solidFill>
+                        <a:effectLst/>
+                        <a:latin typeface="Arial" panose="020B0604020202020204" pitchFamily="34" charset="0"/>
+                        <a:cs typeface="Arial" panose="020B0604020202020204" pitchFamily="34" charset="0"/>
+                      </a:endParaRPr>
+                    </a:p>
+                  </a:txBody>
+                  <a:tcPr marL="7620" marR="7620" marT="7620" marB="0"/>
+                </a:tc>
+                <a:tc>
+                  <a:txBody>
+                    <a:bodyPr/>
+                    <a:lstStyle/>
+                    <a:p>
+                      <a:pPr algn="ctr" fontAlgn="b"/>
+                      <a:r>
+                        <a:rPr lang="en-CA" sz="2200" u="none" strike="noStrike" dirty="0">
+                          <a:effectLst/>
+                          <a:latin typeface="Arial" panose="020B0604020202020204" pitchFamily="34" charset="0"/>
+                          <a:cs typeface="Arial" panose="020B0604020202020204" pitchFamily="34" charset="0"/>
+                        </a:rPr>
+                        <a:t>124</a:t>
+                      </a:r>
+                      <a:endParaRPr lang="en-CA" sz="2200" b="0" i="0" u="none" strike="noStrike" dirty="0">
+                        <a:solidFill>
+                          <a:srgbClr val="000000"/>
+                        </a:solidFill>
+                        <a:effectLst/>
+                        <a:latin typeface="Arial" panose="020B0604020202020204" pitchFamily="34" charset="0"/>
+                        <a:cs typeface="Arial" panose="020B0604020202020204" pitchFamily="34" charset="0"/>
+                      </a:endParaRPr>
+                    </a:p>
+                  </a:txBody>
+                  <a:tcPr marL="7620" marR="7620" marT="7620" marB="0"/>
+                </a:tc>
+                <a:tc>
+                  <a:txBody>
+                    <a:bodyPr/>
+                    <a:lstStyle/>
+                    <a:p>
+                      <a:pPr algn="ctr" fontAlgn="b"/>
+                      <a:r>
+                        <a:rPr lang="en-CA" sz="2200" u="none" strike="noStrike" dirty="0">
+                          <a:effectLst/>
+                          <a:latin typeface="Arial" panose="020B0604020202020204" pitchFamily="34" charset="0"/>
+                          <a:cs typeface="Arial" panose="020B0604020202020204" pitchFamily="34" charset="0"/>
+                        </a:rPr>
+                        <a:t>1.000</a:t>
+                      </a:r>
+                      <a:endParaRPr lang="en-CA" sz="2200" b="0" i="0" u="none" strike="noStrike" dirty="0">
+                        <a:solidFill>
+                          <a:srgbClr val="000000"/>
+                        </a:solidFill>
+                        <a:effectLst/>
+                        <a:latin typeface="Arial" panose="020B0604020202020204" pitchFamily="34" charset="0"/>
+                        <a:cs typeface="Arial" panose="020B0604020202020204" pitchFamily="34" charset="0"/>
+                      </a:endParaRPr>
+                    </a:p>
+                  </a:txBody>
+                  <a:tcPr marL="7620" marR="7620" marT="7620" marB="0"/>
+                </a:tc>
+                <a:tc>
+                  <a:txBody>
+                    <a:bodyPr/>
+                    <a:lstStyle/>
+                    <a:p>
+                      <a:pPr algn="ctr" fontAlgn="b"/>
+                      <a:r>
+                        <a:rPr lang="en-CA" sz="2200" u="none" strike="noStrike" dirty="0">
+                          <a:effectLst/>
+                          <a:latin typeface="Arial" panose="020B0604020202020204" pitchFamily="34" charset="0"/>
+                          <a:cs typeface="Arial" panose="020B0604020202020204" pitchFamily="34" charset="0"/>
+                        </a:rPr>
+                        <a:t>1.8e-10</a:t>
+                      </a:r>
+                      <a:endParaRPr lang="en-CA" sz="2200" b="0" i="0" u="none" strike="noStrike" dirty="0">
+                        <a:solidFill>
+                          <a:srgbClr val="000000"/>
+                        </a:solidFill>
+                        <a:effectLst/>
+                        <a:latin typeface="Arial" panose="020B0604020202020204" pitchFamily="34" charset="0"/>
+                        <a:cs typeface="Arial" panose="020B0604020202020204" pitchFamily="34" charset="0"/>
+                      </a:endParaRPr>
+                    </a:p>
+                  </a:txBody>
+                  <a:tcPr marL="7620" marR="7620" marT="7620" marB="0"/>
+                </a:tc>
+              </a:tr>
+              <a:tr h="758272">
+                <a:tc>
+                  <a:txBody>
+                    <a:bodyPr/>
+                    <a:lstStyle/>
+                    <a:p>
+                      <a:pPr algn="ctr" fontAlgn="b"/>
+                      <a:r>
+                        <a:rPr lang="en-CA" sz="2200" u="none" strike="noStrike" dirty="0">
+                          <a:effectLst/>
+                          <a:latin typeface="Arial" panose="020B0604020202020204" pitchFamily="34" charset="0"/>
+                          <a:cs typeface="Arial" panose="020B0604020202020204" pitchFamily="34" charset="0"/>
+                        </a:rPr>
+                        <a:t>GO:0042288</a:t>
+                      </a:r>
+                      <a:endParaRPr lang="en-CA" sz="2200" b="0" i="0" u="none" strike="noStrike" dirty="0">
+                        <a:solidFill>
+                          <a:srgbClr val="000000"/>
+                        </a:solidFill>
+                        <a:effectLst/>
+                        <a:latin typeface="Arial" panose="020B0604020202020204" pitchFamily="34" charset="0"/>
+                        <a:cs typeface="Arial" panose="020B0604020202020204" pitchFamily="34" charset="0"/>
+                      </a:endParaRPr>
+                    </a:p>
+                  </a:txBody>
+                  <a:tcPr marL="7620" marR="7620" marT="7620" marB="0"/>
+                </a:tc>
+                <a:tc>
+                  <a:txBody>
+                    <a:bodyPr/>
+                    <a:lstStyle/>
+                    <a:p>
+                      <a:pPr algn="l" fontAlgn="b"/>
+                      <a:r>
+                        <a:rPr lang="en-CA" sz="2200" u="none" strike="noStrike" dirty="0">
+                          <a:effectLst/>
+                          <a:latin typeface="Arial" panose="020B0604020202020204" pitchFamily="34" charset="0"/>
+                          <a:cs typeface="Arial" panose="020B0604020202020204" pitchFamily="34" charset="0"/>
+                        </a:rPr>
+                        <a:t>MHC class I protein binding</a:t>
+                      </a:r>
+                      <a:endParaRPr lang="en-CA" sz="2200" b="0" i="0" u="none" strike="noStrike" dirty="0">
+                        <a:solidFill>
+                          <a:srgbClr val="000000"/>
+                        </a:solidFill>
+                        <a:effectLst/>
+                        <a:latin typeface="Arial" panose="020B0604020202020204" pitchFamily="34" charset="0"/>
+                        <a:cs typeface="Arial" panose="020B0604020202020204" pitchFamily="34" charset="0"/>
+                      </a:endParaRPr>
+                    </a:p>
+                  </a:txBody>
+                  <a:tcPr marL="7620" marR="7620" marT="7620" marB="0"/>
+                </a:tc>
+                <a:tc>
+                  <a:txBody>
+                    <a:bodyPr/>
+                    <a:lstStyle/>
+                    <a:p>
+                      <a:pPr algn="ctr" fontAlgn="b"/>
+                      <a:r>
+                        <a:rPr lang="en-CA" sz="2200" u="none" strike="noStrike">
+                          <a:effectLst/>
+                          <a:latin typeface="Arial" panose="020B0604020202020204" pitchFamily="34" charset="0"/>
+                          <a:cs typeface="Arial" panose="020B0604020202020204" pitchFamily="34" charset="0"/>
+                        </a:rPr>
+                        <a:t>10</a:t>
+                      </a:r>
+                      <a:endParaRPr lang="en-CA" sz="2200" b="0" i="0" u="none" strike="noStrike">
+                        <a:solidFill>
+                          <a:srgbClr val="000000"/>
+                        </a:solidFill>
+                        <a:effectLst/>
+                        <a:latin typeface="Arial" panose="020B0604020202020204" pitchFamily="34" charset="0"/>
+                        <a:cs typeface="Arial" panose="020B0604020202020204" pitchFamily="34" charset="0"/>
+                      </a:endParaRPr>
+                    </a:p>
+                  </a:txBody>
+                  <a:tcPr marL="7620" marR="7620" marT="7620" marB="0"/>
+                </a:tc>
+                <a:tc>
+                  <a:txBody>
+                    <a:bodyPr/>
+                    <a:lstStyle/>
+                    <a:p>
+                      <a:pPr algn="ctr" fontAlgn="b"/>
+                      <a:r>
+                        <a:rPr lang="en-CA" sz="2200" u="none" strike="noStrike" dirty="0">
+                          <a:effectLst/>
+                          <a:latin typeface="Arial" panose="020B0604020202020204" pitchFamily="34" charset="0"/>
+                          <a:cs typeface="Arial" panose="020B0604020202020204" pitchFamily="34" charset="0"/>
+                        </a:rPr>
+                        <a:t>0</a:t>
+                      </a:r>
+                      <a:endParaRPr lang="en-CA" sz="2200" b="0" i="0" u="none" strike="noStrike" dirty="0">
+                        <a:solidFill>
+                          <a:srgbClr val="000000"/>
+                        </a:solidFill>
+                        <a:effectLst/>
+                        <a:latin typeface="Arial" panose="020B0604020202020204" pitchFamily="34" charset="0"/>
+                        <a:cs typeface="Arial" panose="020B0604020202020204" pitchFamily="34" charset="0"/>
+                      </a:endParaRPr>
+                    </a:p>
+                  </a:txBody>
+                  <a:tcPr marL="7620" marR="7620" marT="7620" marB="0"/>
+                </a:tc>
+                <a:tc>
+                  <a:txBody>
+                    <a:bodyPr/>
+                    <a:lstStyle/>
+                    <a:p>
+                      <a:pPr algn="ctr" fontAlgn="b"/>
+                      <a:r>
+                        <a:rPr lang="en-CA" sz="2200" u="none" strike="noStrike" dirty="0">
+                          <a:effectLst/>
+                          <a:latin typeface="Arial" panose="020B0604020202020204" pitchFamily="34" charset="0"/>
+                          <a:cs typeface="Arial" panose="020B0604020202020204" pitchFamily="34" charset="0"/>
+                        </a:rPr>
+                        <a:t>0.01</a:t>
+                      </a:r>
+                      <a:endParaRPr lang="en-CA" sz="2200" b="0" i="0" u="none" strike="noStrike" dirty="0">
+                        <a:solidFill>
+                          <a:srgbClr val="000000"/>
+                        </a:solidFill>
+                        <a:effectLst/>
+                        <a:latin typeface="Arial" panose="020B0604020202020204" pitchFamily="34" charset="0"/>
+                        <a:cs typeface="Arial" panose="020B0604020202020204" pitchFamily="34" charset="0"/>
+                      </a:endParaRPr>
+                    </a:p>
+                  </a:txBody>
+                  <a:tcPr marL="7620" marR="7620" marT="7620" marB="0"/>
+                </a:tc>
+                <a:tc>
+                  <a:txBody>
+                    <a:bodyPr/>
+                    <a:lstStyle/>
+                    <a:p>
+                      <a:pPr algn="ctr" fontAlgn="b"/>
+                      <a:r>
+                        <a:rPr lang="en-CA" sz="2200" u="none" strike="noStrike" dirty="0">
+                          <a:effectLst/>
+                          <a:latin typeface="Arial" panose="020B0604020202020204" pitchFamily="34" charset="0"/>
+                          <a:cs typeface="Arial" panose="020B0604020202020204" pitchFamily="34" charset="0"/>
+                        </a:rPr>
+                        <a:t>126</a:t>
+                      </a:r>
+                      <a:endParaRPr lang="en-CA" sz="2200" b="0" i="0" u="none" strike="noStrike" dirty="0">
+                        <a:solidFill>
+                          <a:srgbClr val="000000"/>
+                        </a:solidFill>
+                        <a:effectLst/>
+                        <a:latin typeface="Arial" panose="020B0604020202020204" pitchFamily="34" charset="0"/>
+                        <a:cs typeface="Arial" panose="020B0604020202020204" pitchFamily="34" charset="0"/>
+                      </a:endParaRPr>
+                    </a:p>
+                  </a:txBody>
+                  <a:tcPr marL="7620" marR="7620" marT="7620" marB="0"/>
+                </a:tc>
+                <a:tc>
+                  <a:txBody>
+                    <a:bodyPr/>
+                    <a:lstStyle/>
+                    <a:p>
+                      <a:pPr algn="ctr" fontAlgn="b"/>
+                      <a:r>
+                        <a:rPr lang="en-CA" sz="2200" u="none" strike="noStrike" dirty="0">
+                          <a:effectLst/>
+                          <a:latin typeface="Arial" panose="020B0604020202020204" pitchFamily="34" charset="0"/>
+                          <a:cs typeface="Arial" panose="020B0604020202020204" pitchFamily="34" charset="0"/>
+                        </a:rPr>
+                        <a:t>1.000</a:t>
+                      </a:r>
+                      <a:endParaRPr lang="en-CA" sz="2200" b="0" i="0" u="none" strike="noStrike" dirty="0">
+                        <a:solidFill>
+                          <a:srgbClr val="000000"/>
+                        </a:solidFill>
+                        <a:effectLst/>
+                        <a:latin typeface="Arial" panose="020B0604020202020204" pitchFamily="34" charset="0"/>
+                        <a:cs typeface="Arial" panose="020B0604020202020204" pitchFamily="34" charset="0"/>
+                      </a:endParaRPr>
+                    </a:p>
+                  </a:txBody>
+                  <a:tcPr marL="7620" marR="7620" marT="7620" marB="0"/>
+                </a:tc>
+                <a:tc>
+                  <a:txBody>
+                    <a:bodyPr/>
+                    <a:lstStyle/>
+                    <a:p>
+                      <a:pPr algn="ctr" fontAlgn="b"/>
+                      <a:r>
+                        <a:rPr lang="en-CA" sz="2200" u="none" strike="noStrike" dirty="0">
+                          <a:effectLst/>
+                          <a:latin typeface="Arial" panose="020B0604020202020204" pitchFamily="34" charset="0"/>
+                          <a:cs typeface="Arial" panose="020B0604020202020204" pitchFamily="34" charset="0"/>
+                        </a:rPr>
+                        <a:t>0.0094</a:t>
+                      </a:r>
+                      <a:endParaRPr lang="en-CA" sz="2200" b="0" i="0" u="none" strike="noStrike" dirty="0">
+                        <a:solidFill>
+                          <a:srgbClr val="000000"/>
+                        </a:solidFill>
+                        <a:effectLst/>
+                        <a:latin typeface="Arial" panose="020B0604020202020204" pitchFamily="34" charset="0"/>
+                        <a:cs typeface="Arial" panose="020B0604020202020204" pitchFamily="34" charset="0"/>
+                      </a:endParaRPr>
+                    </a:p>
+                  </a:txBody>
+                  <a:tcPr marL="7620" marR="7620" marT="7620" marB="0"/>
+                </a:tc>
+              </a:tr>
+            </a:tbl>
+          </a:graphicData>
+        </a:graphic>
+      </p:graphicFrame>
+      <p:sp>
+        <p:nvSpPr>
+          <p:cNvPr id="81" name="TextBox 80"/>
+          <p:cNvSpPr txBox="1"/>
+          <p:nvPr/>
+        </p:nvSpPr>
+        <p:spPr>
+          <a:xfrm>
+            <a:off x="14878661" y="23113611"/>
+            <a:ext cx="13721451" cy="2600712"/>
+          </a:xfrm>
+          <a:prstGeom prst="rect">
+            <a:avLst/>
+          </a:prstGeom>
+          <a:noFill/>
+          <a:ln>
+            <a:noFill/>
+          </a:ln>
+        </p:spPr>
+        <p:txBody>
+          <a:bodyPr wrap="square" lIns="137160" tIns="68580" rIns="137160" bIns="68580">
+            <a:spAutoFit/>
+          </a:bodyPr>
+          <a:lstStyle/>
+          <a:p>
+            <a:pPr algn="just">
+              <a:defRPr/>
+            </a:pPr>
+            <a:r>
+              <a:rPr lang="en-US" sz="3200" b="1" dirty="0" smtClean="0">
+                <a:latin typeface="Arial" charset="0"/>
+              </a:rPr>
+              <a:t>Table </a:t>
+            </a:r>
+            <a:r>
+              <a:rPr lang="en-US" sz="3200" b="1" dirty="0" smtClean="0">
+                <a:latin typeface="Arial" charset="0"/>
+              </a:rPr>
+              <a:t>2.</a:t>
+            </a:r>
+            <a:r>
+              <a:rPr lang="en-US" sz="3200" dirty="0" smtClean="0">
+                <a:latin typeface="Arial" charset="0"/>
+              </a:rPr>
+              <a:t> </a:t>
+            </a:r>
+            <a:r>
+              <a:rPr lang="en-CA" sz="3200" dirty="0">
+                <a:latin typeface="Arial" charset="0"/>
+              </a:rPr>
+              <a:t>Enrichment of GO terms according to Fisher’s exact test and Kolmogorov-Smirnov test</a:t>
+            </a:r>
+            <a:r>
+              <a:rPr lang="en-US" sz="3200" dirty="0" smtClean="0">
+                <a:latin typeface="Arial" charset="0"/>
+              </a:rPr>
+              <a:t>.</a:t>
+            </a:r>
+          </a:p>
+          <a:p>
+            <a:pPr algn="just">
+              <a:defRPr/>
+            </a:pPr>
+            <a:r>
+              <a:rPr lang="en-US" sz="3200" dirty="0" smtClean="0">
+                <a:latin typeface="Arial" charset="0"/>
+              </a:rPr>
+              <a:t>1.</a:t>
+            </a:r>
+          </a:p>
+          <a:p>
+            <a:pPr algn="just">
+              <a:defRPr/>
+            </a:pPr>
+            <a:r>
+              <a:rPr lang="en-US" sz="3200" dirty="0" smtClean="0">
+                <a:latin typeface="Arial" charset="0"/>
+              </a:rPr>
+              <a:t>2.</a:t>
+            </a:r>
+          </a:p>
+          <a:p>
+            <a:pPr algn="just">
+              <a:defRPr/>
+            </a:pPr>
+            <a:r>
+              <a:rPr lang="en-US" sz="3200" dirty="0" smtClean="0">
+                <a:latin typeface="Arial" charset="0"/>
+              </a:rPr>
+              <a:t>3.</a:t>
+            </a:r>
+          </a:p>
+        </p:txBody>
+      </p:sp>
+      <p:sp>
+        <p:nvSpPr>
+          <p:cNvPr id="82" name="Rectangle 81"/>
+          <p:cNvSpPr/>
+          <p:nvPr/>
+        </p:nvSpPr>
+        <p:spPr bwMode="auto">
+          <a:xfrm>
+            <a:off x="14873457" y="22997949"/>
+            <a:ext cx="13674855" cy="9442744"/>
+          </a:xfrm>
+          <a:prstGeom prst="rect">
+            <a:avLst/>
+          </a:prstGeom>
+          <a:noFill/>
+          <a:ln w="9525" cap="flat" cmpd="sng" algn="ctr">
+            <a:solidFill>
+              <a:schemeClr val="bg1">
+                <a:lumMod val="50000"/>
+              </a:schemeClr>
+            </a:solidFill>
+            <a:prstDash val="solid"/>
+            <a:round/>
+            <a:headEnd type="none" w="med" len="med"/>
+            <a:tailEnd type="none" w="med" len="med"/>
+          </a:ln>
+          <a:effectLst/>
+        </p:spPr>
+        <p:txBody>
+          <a:bodyPr vert="horz" wrap="square" lIns="91440" tIns="45720" rIns="91440" bIns="45720" numCol="1" rtlCol="0" anchor="t" anchorCtr="0" compatLnSpc="1">
+            <a:prstTxWarp prst="textNoShape">
+              <a:avLst/>
+            </a:prstTxWarp>
+          </a:bodyPr>
+          <a:lstStyle/>
+          <a:p>
+            <a:pPr marL="0" marR="0" indent="0" algn="l" defTabSz="2508250" rtl="0" eaLnBrk="1" fontAlgn="base" latinLnBrk="0" hangingPunct="1">
+              <a:lnSpc>
+                <a:spcPct val="100000"/>
+              </a:lnSpc>
+              <a:spcBef>
+                <a:spcPct val="0"/>
+              </a:spcBef>
+              <a:spcAft>
+                <a:spcPct val="0"/>
+              </a:spcAft>
+              <a:buClrTx/>
+              <a:buSzTx/>
+              <a:buFontTx/>
+              <a:buNone/>
+              <a:tabLst/>
+            </a:pPr>
+            <a:endParaRPr kumimoji="0" lang="en-CA" sz="4900" b="0" i="0" u="none" strike="noStrike" cap="none" normalizeH="0" baseline="0" dirty="0" smtClean="0">
+              <a:ln>
+                <a:noFill/>
+              </a:ln>
+              <a:solidFill>
+                <a:schemeClr val="tx1"/>
+              </a:solidFill>
+              <a:effectLst/>
+              <a:latin typeface="Arial" charset="0"/>
+            </a:endParaRPr>
+          </a:p>
+        </p:txBody>
+      </p:sp>
+      <p:sp>
+        <p:nvSpPr>
+          <p:cNvPr id="84" name="TextBox 2"/>
+          <p:cNvSpPr txBox="1"/>
+          <p:nvPr/>
+        </p:nvSpPr>
+        <p:spPr>
+          <a:xfrm>
+            <a:off x="37028261" y="20236840"/>
+            <a:ext cx="6185004" cy="4708981"/>
+          </a:xfrm>
+          <a:prstGeom prst="rect">
+            <a:avLst/>
+          </a:prstGeom>
+        </p:spPr>
+        <p:style>
+          <a:lnRef idx="2">
+            <a:schemeClr val="dk1"/>
+          </a:lnRef>
+          <a:fillRef idx="1">
+            <a:schemeClr val="lt1"/>
+          </a:fillRef>
+          <a:effectRef idx="0">
+            <a:schemeClr val="dk1"/>
+          </a:effectRef>
+          <a:fontRef idx="minor">
+            <a:schemeClr val="dk1"/>
+          </a:fontRef>
+        </p:style>
+        <p:txBody>
+          <a:bodyPr wrap="square" rtlCol="0">
+            <a:spAutoFit/>
+          </a:bodyPr>
+          <a:lstStyle>
+            <a:defPPr>
+              <a:defRPr lang="en-US"/>
+            </a:defPPr>
+            <a:lvl1pPr marL="0" algn="l" defTabSz="457200" rtl="0" eaLnBrk="1" latinLnBrk="0" hangingPunct="1">
+              <a:defRPr sz="1800" kern="1200">
+                <a:solidFill>
+                  <a:schemeClr val="dk1"/>
+                </a:solidFill>
+                <a:latin typeface="+mn-lt"/>
+                <a:ea typeface="+mn-ea"/>
+                <a:cs typeface="+mn-cs"/>
+              </a:defRPr>
+            </a:lvl1pPr>
+            <a:lvl2pPr marL="457200" algn="l" defTabSz="457200" rtl="0" eaLnBrk="1" latinLnBrk="0" hangingPunct="1">
+              <a:defRPr sz="1800" kern="1200">
+                <a:solidFill>
+                  <a:schemeClr val="dk1"/>
+                </a:solidFill>
+                <a:latin typeface="+mn-lt"/>
+                <a:ea typeface="+mn-ea"/>
+                <a:cs typeface="+mn-cs"/>
+              </a:defRPr>
+            </a:lvl2pPr>
+            <a:lvl3pPr marL="914400" algn="l" defTabSz="457200" rtl="0" eaLnBrk="1" latinLnBrk="0" hangingPunct="1">
+              <a:defRPr sz="1800" kern="1200">
+                <a:solidFill>
+                  <a:schemeClr val="dk1"/>
+                </a:solidFill>
+                <a:latin typeface="+mn-lt"/>
+                <a:ea typeface="+mn-ea"/>
+                <a:cs typeface="+mn-cs"/>
+              </a:defRPr>
+            </a:lvl3pPr>
+            <a:lvl4pPr marL="1371600" algn="l" defTabSz="457200" rtl="0" eaLnBrk="1" latinLnBrk="0" hangingPunct="1">
+              <a:defRPr sz="1800" kern="1200">
+                <a:solidFill>
+                  <a:schemeClr val="dk1"/>
+                </a:solidFill>
+                <a:latin typeface="+mn-lt"/>
+                <a:ea typeface="+mn-ea"/>
+                <a:cs typeface="+mn-cs"/>
+              </a:defRPr>
+            </a:lvl4pPr>
+            <a:lvl5pPr marL="1828800" algn="l" defTabSz="457200" rtl="0" eaLnBrk="1" latinLnBrk="0" hangingPunct="1">
+              <a:defRPr sz="1800" kern="1200">
+                <a:solidFill>
+                  <a:schemeClr val="dk1"/>
+                </a:solidFill>
+                <a:latin typeface="+mn-lt"/>
+                <a:ea typeface="+mn-ea"/>
+                <a:cs typeface="+mn-cs"/>
+              </a:defRPr>
+            </a:lvl5pPr>
+            <a:lvl6pPr marL="2286000" algn="l" defTabSz="457200" rtl="0" eaLnBrk="1" latinLnBrk="0" hangingPunct="1">
+              <a:defRPr sz="1800" kern="1200">
+                <a:solidFill>
+                  <a:schemeClr val="dk1"/>
+                </a:solidFill>
+                <a:latin typeface="+mn-lt"/>
+                <a:ea typeface="+mn-ea"/>
+                <a:cs typeface="+mn-cs"/>
+              </a:defRPr>
+            </a:lvl6pPr>
+            <a:lvl7pPr marL="2743200" algn="l" defTabSz="457200" rtl="0" eaLnBrk="1" latinLnBrk="0" hangingPunct="1">
+              <a:defRPr sz="1800" kern="1200">
+                <a:solidFill>
+                  <a:schemeClr val="dk1"/>
+                </a:solidFill>
+                <a:latin typeface="+mn-lt"/>
+                <a:ea typeface="+mn-ea"/>
+                <a:cs typeface="+mn-cs"/>
+              </a:defRPr>
+            </a:lvl7pPr>
+            <a:lvl8pPr marL="3200400" algn="l" defTabSz="457200" rtl="0" eaLnBrk="1" latinLnBrk="0" hangingPunct="1">
+              <a:defRPr sz="1800" kern="1200">
+                <a:solidFill>
+                  <a:schemeClr val="dk1"/>
+                </a:solidFill>
+                <a:latin typeface="+mn-lt"/>
+                <a:ea typeface="+mn-ea"/>
+                <a:cs typeface="+mn-cs"/>
+              </a:defRPr>
+            </a:lvl8pPr>
+            <a:lvl9pPr marL="3657600" algn="l" defTabSz="457200" rtl="0" eaLnBrk="1" latinLnBrk="0" hangingPunct="1">
+              <a:defRPr sz="1800" kern="1200">
+                <a:solidFill>
+                  <a:schemeClr val="dk1"/>
+                </a:solidFill>
+                <a:latin typeface="+mn-lt"/>
+                <a:ea typeface="+mn-ea"/>
+                <a:cs typeface="+mn-cs"/>
+              </a:defRPr>
+            </a:lvl9pPr>
+          </a:lstStyle>
+          <a:p>
+            <a:endParaRPr lang="en-US" sz="1000" b="1" dirty="0" smtClean="0">
+              <a:latin typeface="Arial"/>
+              <a:cs typeface="Arial"/>
+            </a:endParaRPr>
+          </a:p>
+          <a:p>
+            <a:pPr algn="ctr"/>
+            <a:r>
+              <a:rPr lang="en-US" sz="5400" b="1" dirty="0" smtClean="0">
+                <a:latin typeface="Arial"/>
+                <a:cs typeface="Arial"/>
+              </a:rPr>
+              <a:t>Y </a:t>
+            </a:r>
+            <a:r>
+              <a:rPr lang="en-US" sz="5400" b="1" dirty="0" smtClean="0">
+                <a:latin typeface="Arial"/>
+                <a:cs typeface="Arial"/>
+              </a:rPr>
+              <a:t>= Xα</a:t>
+            </a:r>
+            <a:r>
+              <a:rPr lang="en-US" sz="5400" b="1" baseline="-25000" dirty="0" smtClean="0">
+                <a:latin typeface="Arial"/>
+                <a:cs typeface="Arial"/>
+              </a:rPr>
+              <a:t>1</a:t>
+            </a:r>
+            <a:r>
+              <a:rPr lang="en-US" sz="5400" b="1" dirty="0" smtClean="0">
+                <a:latin typeface="Arial"/>
+                <a:cs typeface="Arial"/>
+              </a:rPr>
+              <a:t> + α</a:t>
+            </a:r>
+            <a:r>
+              <a:rPr lang="en-US" sz="5400" b="1" baseline="-25000" dirty="0" smtClean="0">
+                <a:latin typeface="Arial"/>
+                <a:cs typeface="Arial"/>
+              </a:rPr>
+              <a:t>0</a:t>
+            </a:r>
+            <a:r>
+              <a:rPr lang="en-US" sz="5400" b="1" dirty="0" smtClean="0">
+                <a:latin typeface="Arial"/>
+                <a:cs typeface="Arial"/>
+              </a:rPr>
+              <a:t> + ε</a:t>
+            </a:r>
+            <a:endParaRPr lang="en-US" sz="5400" b="1" baseline="-25000" dirty="0" smtClean="0">
+              <a:latin typeface="Arial"/>
+              <a:cs typeface="Arial"/>
+            </a:endParaRPr>
+          </a:p>
+          <a:p>
+            <a:endParaRPr lang="en-US" sz="1000" b="1" dirty="0" smtClean="0">
+              <a:solidFill>
+                <a:schemeClr val="tx1"/>
+              </a:solidFill>
+              <a:latin typeface="Arial"/>
+              <a:cs typeface="Arial"/>
+            </a:endParaRPr>
+          </a:p>
+          <a:p>
+            <a:r>
+              <a:rPr lang="en-US" sz="2600" b="1" dirty="0" smtClean="0">
+                <a:solidFill>
+                  <a:schemeClr val="tx1"/>
+                </a:solidFill>
+                <a:latin typeface="Arial"/>
+                <a:cs typeface="Arial"/>
+              </a:rPr>
+              <a:t>	w</a:t>
+            </a:r>
+            <a:r>
+              <a:rPr lang="en-US" sz="2600" b="1" dirty="0" smtClean="0">
+                <a:solidFill>
+                  <a:schemeClr val="tx1"/>
+                </a:solidFill>
+                <a:latin typeface="Arial"/>
+                <a:cs typeface="Arial"/>
+              </a:rPr>
+              <a:t>here:</a:t>
+            </a:r>
+          </a:p>
+          <a:p>
+            <a:endParaRPr lang="en-US" sz="1000" b="1" dirty="0" smtClean="0">
+              <a:solidFill>
+                <a:schemeClr val="tx1"/>
+              </a:solidFill>
+              <a:latin typeface="Arial"/>
+              <a:cs typeface="Arial"/>
+            </a:endParaRPr>
+          </a:p>
+          <a:p>
+            <a:r>
+              <a:rPr lang="en-US" sz="2600" dirty="0" smtClean="0">
+                <a:solidFill>
+                  <a:schemeClr val="tx1"/>
+                </a:solidFill>
+                <a:latin typeface="Arial"/>
+                <a:cs typeface="Arial"/>
+              </a:rPr>
+              <a:t>	</a:t>
+            </a:r>
+            <a:r>
+              <a:rPr lang="en-US" sz="2600" b="1" dirty="0" smtClean="0">
+                <a:solidFill>
+                  <a:schemeClr val="tx1"/>
+                </a:solidFill>
+                <a:latin typeface="Arial"/>
+                <a:cs typeface="Arial"/>
+              </a:rPr>
+              <a:t>Y</a:t>
+            </a:r>
+            <a:r>
+              <a:rPr lang="en-US" sz="2600" dirty="0" smtClean="0">
+                <a:solidFill>
+                  <a:schemeClr val="tx1"/>
+                </a:solidFill>
+                <a:latin typeface="Arial"/>
+                <a:cs typeface="Arial"/>
+              </a:rPr>
+              <a:t>	= </a:t>
+            </a:r>
+            <a:r>
+              <a:rPr lang="en-US" sz="2600" dirty="0" smtClean="0">
+                <a:solidFill>
+                  <a:schemeClr val="tx1"/>
+                </a:solidFill>
+                <a:latin typeface="Arial"/>
+                <a:cs typeface="Arial"/>
+              </a:rPr>
+              <a:t>methylation levels (M value)</a:t>
+            </a:r>
+          </a:p>
+          <a:p>
+            <a:r>
+              <a:rPr lang="en-US" sz="2600" dirty="0" smtClean="0">
+                <a:solidFill>
+                  <a:schemeClr val="tx1"/>
+                </a:solidFill>
+                <a:latin typeface="Arial"/>
+                <a:cs typeface="Arial"/>
+              </a:rPr>
+              <a:t>	</a:t>
+            </a:r>
+            <a:r>
+              <a:rPr lang="en-US" sz="2600" b="1" dirty="0" smtClean="0">
+                <a:solidFill>
+                  <a:schemeClr val="tx1"/>
+                </a:solidFill>
+                <a:latin typeface="Arial"/>
+                <a:cs typeface="Arial"/>
+              </a:rPr>
+              <a:t>X</a:t>
+            </a:r>
+            <a:r>
+              <a:rPr lang="en-US" sz="2600" dirty="0" smtClean="0">
+                <a:solidFill>
+                  <a:schemeClr val="tx1"/>
+                </a:solidFill>
+                <a:latin typeface="Arial"/>
+                <a:cs typeface="Arial"/>
+              </a:rPr>
+              <a:t>	= </a:t>
+            </a:r>
+            <a:r>
+              <a:rPr lang="en-US" sz="2600" dirty="0" smtClean="0">
+                <a:solidFill>
+                  <a:schemeClr val="tx1"/>
+                </a:solidFill>
+                <a:latin typeface="Arial"/>
+                <a:cs typeface="Arial"/>
+              </a:rPr>
+              <a:t>design matrix </a:t>
+            </a:r>
+            <a:r>
+              <a:rPr lang="en-US" sz="2600" dirty="0" smtClean="0">
+                <a:solidFill>
+                  <a:schemeClr val="tx1"/>
+                </a:solidFill>
+                <a:latin typeface="Arial"/>
+                <a:cs typeface="Arial"/>
+              </a:rPr>
+              <a:t>indicating different</a:t>
+            </a:r>
+          </a:p>
+          <a:p>
+            <a:r>
+              <a:rPr lang="en-US" sz="2600" dirty="0" smtClean="0">
+                <a:solidFill>
+                  <a:schemeClr val="tx1"/>
+                </a:solidFill>
+                <a:latin typeface="Arial"/>
+                <a:cs typeface="Arial"/>
+              </a:rPr>
+              <a:t>			sample </a:t>
+            </a:r>
+            <a:r>
+              <a:rPr lang="en-US" sz="2600" dirty="0" smtClean="0">
+                <a:solidFill>
+                  <a:schemeClr val="tx1"/>
+                </a:solidFill>
+                <a:latin typeface="Arial"/>
+                <a:cs typeface="Arial"/>
+              </a:rPr>
+              <a:t>groups</a:t>
+            </a:r>
+          </a:p>
+          <a:p>
+            <a:r>
+              <a:rPr lang="en-US" sz="2600" dirty="0" smtClean="0">
+                <a:solidFill>
+                  <a:schemeClr val="tx1"/>
+                </a:solidFill>
+                <a:latin typeface="Arial"/>
+                <a:cs typeface="Arial"/>
+              </a:rPr>
+              <a:t>	</a:t>
+            </a:r>
+            <a:r>
+              <a:rPr lang="en-US" sz="2600" b="1" dirty="0" smtClean="0">
+                <a:solidFill>
+                  <a:schemeClr val="tx1"/>
+                </a:solidFill>
+                <a:latin typeface="Arial"/>
+                <a:cs typeface="Arial"/>
+              </a:rPr>
+              <a:t>α</a:t>
+            </a:r>
+            <a:r>
+              <a:rPr lang="en-US" sz="2600" b="1" baseline="-25000" dirty="0" smtClean="0">
+                <a:solidFill>
+                  <a:schemeClr val="tx1"/>
+                </a:solidFill>
+                <a:latin typeface="Arial"/>
+                <a:cs typeface="Arial"/>
+              </a:rPr>
+              <a:t>1</a:t>
+            </a:r>
+            <a:r>
+              <a:rPr lang="en-US" sz="2600" dirty="0" smtClean="0">
+                <a:solidFill>
+                  <a:schemeClr val="tx1"/>
+                </a:solidFill>
+                <a:latin typeface="Arial"/>
+                <a:cs typeface="Arial"/>
+              </a:rPr>
+              <a:t>	= </a:t>
+            </a:r>
+            <a:r>
+              <a:rPr lang="en-US" sz="2600" dirty="0" smtClean="0">
+                <a:solidFill>
+                  <a:schemeClr val="tx1"/>
+                </a:solidFill>
+                <a:latin typeface="Arial"/>
+                <a:cs typeface="Arial"/>
+              </a:rPr>
+              <a:t>change in mean M value</a:t>
+            </a:r>
+          </a:p>
+          <a:p>
+            <a:r>
+              <a:rPr lang="en-US" sz="2600" dirty="0" smtClean="0">
+                <a:solidFill>
+                  <a:schemeClr val="tx1"/>
+                </a:solidFill>
+                <a:latin typeface="Arial"/>
+                <a:cs typeface="Arial"/>
+              </a:rPr>
+              <a:t>	</a:t>
+            </a:r>
+            <a:r>
+              <a:rPr lang="en-US" sz="2600" b="1" dirty="0" smtClean="0">
+                <a:solidFill>
+                  <a:schemeClr val="tx1"/>
+                </a:solidFill>
+                <a:latin typeface="Arial"/>
+                <a:cs typeface="Arial"/>
+              </a:rPr>
+              <a:t>α</a:t>
+            </a:r>
+            <a:r>
+              <a:rPr lang="en-US" sz="2600" b="1" baseline="-25000" dirty="0" smtClean="0">
+                <a:solidFill>
+                  <a:schemeClr val="tx1"/>
+                </a:solidFill>
+                <a:latin typeface="Arial"/>
+                <a:cs typeface="Arial"/>
+              </a:rPr>
+              <a:t>0</a:t>
+            </a:r>
+            <a:r>
+              <a:rPr lang="en-US" sz="2600" dirty="0" smtClean="0">
+                <a:solidFill>
+                  <a:schemeClr val="tx1"/>
+                </a:solidFill>
+                <a:latin typeface="Arial"/>
+                <a:cs typeface="Arial"/>
+              </a:rPr>
+              <a:t>	= </a:t>
+            </a:r>
+            <a:r>
+              <a:rPr lang="en-US" sz="2600" dirty="0" smtClean="0">
+                <a:solidFill>
+                  <a:schemeClr val="tx1"/>
+                </a:solidFill>
+                <a:latin typeface="Arial"/>
+                <a:cs typeface="Arial"/>
+              </a:rPr>
+              <a:t>mean M value for </a:t>
+            </a:r>
+            <a:r>
+              <a:rPr lang="en-US" sz="2600" dirty="0" smtClean="0">
+                <a:solidFill>
+                  <a:schemeClr val="tx1"/>
+                </a:solidFill>
+                <a:latin typeface="Arial"/>
+                <a:cs typeface="Arial"/>
+              </a:rPr>
+              <a:t>reference</a:t>
+            </a:r>
+          </a:p>
+          <a:p>
+            <a:r>
+              <a:rPr lang="en-US" sz="2600" dirty="0">
+                <a:solidFill>
+                  <a:schemeClr val="tx1"/>
+                </a:solidFill>
+                <a:latin typeface="Arial"/>
+                <a:cs typeface="Arial"/>
+              </a:rPr>
+              <a:t>	</a:t>
+            </a:r>
+            <a:r>
+              <a:rPr lang="en-US" sz="2600" dirty="0" smtClean="0">
+                <a:solidFill>
+                  <a:schemeClr val="tx1"/>
+                </a:solidFill>
+                <a:latin typeface="Arial"/>
+                <a:cs typeface="Arial"/>
+              </a:rPr>
+              <a:t>		</a:t>
+            </a:r>
+            <a:r>
+              <a:rPr lang="en-US" sz="2600" dirty="0" smtClean="0">
+                <a:solidFill>
+                  <a:schemeClr val="tx1"/>
+                </a:solidFill>
+                <a:latin typeface="Arial"/>
+                <a:cs typeface="Arial"/>
+              </a:rPr>
+              <a:t>sample group</a:t>
+            </a:r>
+            <a:r>
+              <a:rPr lang="en-US" sz="2600" dirty="0" smtClean="0">
+                <a:solidFill>
+                  <a:schemeClr val="tx1"/>
+                </a:solidFill>
+                <a:latin typeface="Arial"/>
+                <a:cs typeface="Arial"/>
+              </a:rPr>
+              <a:t>		</a:t>
+            </a:r>
+          </a:p>
+          <a:p>
+            <a:r>
+              <a:rPr lang="en-US" sz="2600" dirty="0" smtClean="0">
+                <a:solidFill>
+                  <a:schemeClr val="tx1"/>
+                </a:solidFill>
+                <a:latin typeface="Arial"/>
+                <a:cs typeface="Arial"/>
+              </a:rPr>
+              <a:t>	</a:t>
+            </a:r>
+            <a:r>
+              <a:rPr lang="en-US" sz="2600" b="1" dirty="0" smtClean="0">
+                <a:solidFill>
+                  <a:schemeClr val="tx1"/>
+                </a:solidFill>
+                <a:latin typeface="Arial"/>
+                <a:cs typeface="Arial"/>
+              </a:rPr>
+              <a:t>ε</a:t>
+            </a:r>
+            <a:r>
+              <a:rPr lang="en-US" sz="2600" dirty="0" smtClean="0">
+                <a:solidFill>
+                  <a:schemeClr val="tx1"/>
+                </a:solidFill>
+                <a:latin typeface="Arial"/>
+                <a:cs typeface="Arial"/>
+              </a:rPr>
+              <a:t>	= </a:t>
+            </a:r>
+            <a:r>
+              <a:rPr lang="en-US" sz="2600" dirty="0" smtClean="0">
+                <a:solidFill>
+                  <a:schemeClr val="tx1"/>
+                </a:solidFill>
+                <a:latin typeface="Arial"/>
+                <a:cs typeface="Arial"/>
+              </a:rPr>
+              <a:t>error ~ N(0, σ</a:t>
+            </a:r>
+            <a:r>
+              <a:rPr lang="en-US" sz="2600" baseline="30000" dirty="0" smtClean="0">
+                <a:solidFill>
+                  <a:schemeClr val="tx1"/>
+                </a:solidFill>
+                <a:latin typeface="Arial"/>
+                <a:cs typeface="Arial"/>
+              </a:rPr>
+              <a:t>2</a:t>
+            </a:r>
+            <a:r>
+              <a:rPr lang="en-US" sz="2600" dirty="0" smtClean="0">
+                <a:solidFill>
+                  <a:schemeClr val="tx1"/>
+                </a:solidFill>
+                <a:latin typeface="Arial"/>
+                <a:cs typeface="Arial"/>
+              </a:rPr>
+              <a:t>)</a:t>
+            </a:r>
+          </a:p>
+          <a:p>
+            <a:endParaRPr lang="en-US" sz="1000" dirty="0" smtClean="0">
+              <a:solidFill>
+                <a:schemeClr val="tx1"/>
+              </a:solidFill>
+              <a:latin typeface="Arial"/>
+              <a:cs typeface="Arial"/>
+            </a:endParaRPr>
+          </a:p>
+        </p:txBody>
+      </p:sp>
+      <p:sp>
+        <p:nvSpPr>
+          <p:cNvPr id="85" name="TextBox 84"/>
+          <p:cNvSpPr txBox="1"/>
+          <p:nvPr/>
+        </p:nvSpPr>
+        <p:spPr>
+          <a:xfrm>
+            <a:off x="36855401" y="25101721"/>
+            <a:ext cx="6426200" cy="2062103"/>
+          </a:xfrm>
+          <a:prstGeom prst="rect">
+            <a:avLst/>
+          </a:prstGeom>
+          <a:noFill/>
+        </p:spPr>
+        <p:txBody>
+          <a:bodyPr wrap="square" rtlCol="0">
+            <a:spAutoFit/>
+          </a:bodyPr>
+          <a:lstStyle/>
+          <a:p>
+            <a:pPr algn="just"/>
+            <a:r>
+              <a:rPr lang="en-US" sz="3200" b="1" dirty="0" smtClean="0">
+                <a:latin typeface="Arial" charset="0"/>
+              </a:rPr>
+              <a:t>Equation 1.</a:t>
+            </a:r>
+            <a:r>
+              <a:rPr lang="en-US" sz="3200" dirty="0">
+                <a:latin typeface="Arial" charset="0"/>
+              </a:rPr>
+              <a:t> </a:t>
+            </a:r>
+            <a:r>
+              <a:rPr lang="en-US" sz="3200" dirty="0" smtClean="0">
+                <a:latin typeface="Arial" charset="0"/>
+              </a:rPr>
+              <a:t>Linear m</a:t>
+            </a:r>
+            <a:r>
+              <a:rPr lang="en-US" sz="3200" dirty="0" smtClean="0">
+                <a:latin typeface="Arial" charset="0"/>
+              </a:rPr>
+              <a:t>odel of  methylation level of each CGI using sample groups as single covariate.</a:t>
+            </a:r>
+            <a:endParaRPr lang="en-US" sz="3200" dirty="0">
+              <a:latin typeface="Arial" charset="0"/>
+            </a:endParaRPr>
+          </a:p>
+        </p:txBody>
+      </p:sp>
       <p:grpSp>
         <p:nvGrpSpPr>
-          <p:cNvPr id="19" name="Group 18"/>
+          <p:cNvPr id="22" name="Group 21"/>
           <p:cNvGrpSpPr/>
           <p:nvPr/>
         </p:nvGrpSpPr>
         <p:grpSpPr>
           <a:xfrm>
-            <a:off x="29275963" y="5670673"/>
-            <a:ext cx="13769661" cy="7157744"/>
-            <a:chOff x="29275963" y="5670673"/>
-            <a:chExt cx="13769661" cy="7157744"/>
+            <a:off x="29517918" y="20118139"/>
+            <a:ext cx="6761434" cy="5133442"/>
+            <a:chOff x="29467118" y="20549939"/>
+            <a:chExt cx="6761434" cy="5133442"/>
           </a:xfrm>
         </p:grpSpPr>
-        <p:pic>
-          <p:nvPicPr>
-            <p:cNvPr id="2053" name="Picture 2052"/>
-            <p:cNvPicPr>
-              <a:picLocks noChangeAspect="1"/>
-            </p:cNvPicPr>
+        <p:sp>
+          <p:nvSpPr>
+            <p:cNvPr id="6" name="TextBox 5"/>
+            <p:cNvSpPr txBox="1"/>
             <p:nvPr/>
-          </p:nvPicPr>
-          <p:blipFill rotWithShape="1">
-            <a:blip r:embed="rId12">
-              <a:extLst>
-                <a:ext uri="{28A0092B-C50C-407E-A947-70E740481C1C}">
-                  <a14:useLocalDpi xmlns:a14="http://schemas.microsoft.com/office/drawing/2010/main" val="0"/>
-                </a:ext>
-              </a:extLst>
-            </a:blip>
-            <a:srcRect l="27282" t="3480" r="17605" b="7066"/>
-            <a:stretch/>
-          </p:blipFill>
+          </p:nvSpPr>
           <p:spPr>
             <a:xfrm>
-              <a:off x="34247075" y="5808860"/>
-              <a:ext cx="4323099" cy="7016931"/>
+              <a:off x="29467118" y="20549939"/>
+              <a:ext cx="3145413" cy="461665"/>
             </a:xfrm>
             <a:prstGeom prst="rect">
               <a:avLst/>
             </a:prstGeom>
+            <a:solidFill>
+              <a:schemeClr val="bg1"/>
+            </a:solidFill>
           </p:spPr>
-        </p:pic>
-        <p:pic>
-          <p:nvPicPr>
-            <p:cNvPr id="2052" name="Picture 2051"/>
-            <p:cNvPicPr>
-              <a:picLocks noChangeAspect="1"/>
-            </p:cNvPicPr>
+          <p:txBody>
+            <a:bodyPr wrap="none" rtlCol="0">
+              <a:spAutoFit/>
+            </a:bodyPr>
+            <a:lstStyle/>
+            <a:p>
+              <a:pPr algn="ctr"/>
+              <a:r>
+                <a:rPr lang="en-CA" sz="2400" b="1" dirty="0" smtClean="0"/>
+                <a:t>Adenoma vs Cancer</a:t>
+              </a:r>
+              <a:endParaRPr lang="en-CA" sz="2400" b="1" dirty="0"/>
+            </a:p>
+          </p:txBody>
+        </p:sp>
+        <p:sp>
+          <p:nvSpPr>
+            <p:cNvPr id="66" name="TextBox 65"/>
+            <p:cNvSpPr txBox="1"/>
             <p:nvPr/>
-          </p:nvPicPr>
-          <p:blipFill rotWithShape="1">
-            <a:blip r:embed="rId13">
-              <a:extLst>
-                <a:ext uri="{28A0092B-C50C-407E-A947-70E740481C1C}">
-                  <a14:useLocalDpi xmlns:a14="http://schemas.microsoft.com/office/drawing/2010/main" val="0"/>
-                </a:ext>
-              </a:extLst>
-            </a:blip>
-            <a:srcRect l="27307" t="3444" r="17618" b="6993"/>
-            <a:stretch/>
-          </p:blipFill>
+          </p:nvSpPr>
           <p:spPr>
             <a:xfrm>
-              <a:off x="29778959" y="5800316"/>
-              <a:ext cx="4320118" cy="7025476"/>
+              <a:off x="32958298" y="20549939"/>
+              <a:ext cx="3270254" cy="461665"/>
             </a:xfrm>
             <a:prstGeom prst="rect">
               <a:avLst/>
             </a:prstGeom>
+            <a:solidFill>
+              <a:schemeClr val="bg1"/>
+            </a:solidFill>
           </p:spPr>
-        </p:pic>
-        <p:pic>
-          <p:nvPicPr>
-            <p:cNvPr id="2057" name="Picture 2056"/>
-            <p:cNvPicPr>
-              <a:picLocks noChangeAspect="1"/>
-            </p:cNvPicPr>
+          <p:txBody>
+            <a:bodyPr wrap="none" rtlCol="0">
+              <a:spAutoFit/>
+            </a:bodyPr>
+            <a:lstStyle/>
+            <a:p>
+              <a:pPr algn="ctr"/>
+              <a:r>
+                <a:rPr lang="en-CA" sz="2400" b="1" dirty="0" smtClean="0"/>
+                <a:t>Normal vs Adenoma</a:t>
+              </a:r>
+              <a:endParaRPr lang="en-CA" sz="2400" b="1" dirty="0"/>
+            </a:p>
+          </p:txBody>
+        </p:sp>
+        <p:sp>
+          <p:nvSpPr>
+            <p:cNvPr id="68" name="TextBox 67"/>
+            <p:cNvSpPr txBox="1"/>
             <p:nvPr/>
-          </p:nvPicPr>
-          <p:blipFill rotWithShape="1">
-            <a:blip r:embed="rId14">
-              <a:extLst>
-                <a:ext uri="{28A0092B-C50C-407E-A947-70E740481C1C}">
-                  <a14:useLocalDpi xmlns:a14="http://schemas.microsoft.com/office/drawing/2010/main" val="0"/>
-                </a:ext>
-              </a:extLst>
-            </a:blip>
-            <a:srcRect l="27219" t="3371" r="17611" b="7032"/>
-            <a:stretch/>
-          </p:blipFill>
+          </p:nvSpPr>
           <p:spPr>
             <a:xfrm>
-              <a:off x="38718171" y="5800316"/>
-              <a:ext cx="4327453" cy="7028101"/>
+              <a:off x="31456521" y="25221716"/>
+              <a:ext cx="2803973" cy="461665"/>
             </a:xfrm>
             <a:prstGeom prst="rect">
               <a:avLst/>
             </a:prstGeom>
+            <a:solidFill>
+              <a:schemeClr val="bg1"/>
+            </a:solidFill>
           </p:spPr>
-        </p:pic>
+          <p:txBody>
+            <a:bodyPr wrap="none" rtlCol="0">
+              <a:spAutoFit/>
+            </a:bodyPr>
+            <a:lstStyle/>
+            <a:p>
+              <a:pPr algn="ctr"/>
+              <a:r>
+                <a:rPr lang="en-CA" sz="2400" b="1" dirty="0" smtClean="0"/>
+                <a:t>Normal vs Cancer</a:t>
+              </a:r>
+              <a:endParaRPr lang="en-CA" sz="2400" b="1" dirty="0"/>
+            </a:p>
+          </p:txBody>
+        </p:sp>
         <p:pic>
           <p:nvPicPr>
-            <p:cNvPr id="2063" name="Picture 2062"/>
+            <p:cNvPr id="21" name="Picture 20"/>
             <p:cNvPicPr>
               <a:picLocks noChangeAspect="1"/>
             </p:cNvPicPr>
             <p:nvPr/>
           </p:nvPicPr>
           <p:blipFill>
-            <a:blip r:embed="rId15">
+            <a:blip r:embed="rId19">
               <a:extLst>
                 <a:ext uri="{28A0092B-C50C-407E-A947-70E740481C1C}">
                   <a14:useLocalDpi xmlns:a14="http://schemas.microsoft.com/office/drawing/2010/main" val="0"/>
@@ -8035,50 +10094,127 @@
           </p:blipFill>
           <p:spPr>
             <a:xfrm>
-              <a:off x="37836043" y="5670673"/>
-              <a:ext cx="1666016" cy="1089317"/>
+              <a:off x="30551395" y="21044460"/>
+              <a:ext cx="4520635" cy="4114286"/>
             </a:xfrm>
             <a:prstGeom prst="rect">
               <a:avLst/>
             </a:prstGeom>
           </p:spPr>
         </p:pic>
-        <p:sp>
-          <p:nvSpPr>
-            <p:cNvPr id="18" name="TextBox 17"/>
-            <p:cNvSpPr txBox="1"/>
-            <p:nvPr/>
-          </p:nvSpPr>
-          <p:spPr>
-            <a:xfrm>
-              <a:off x="29275963" y="7903377"/>
-              <a:ext cx="461665" cy="4922422"/>
-            </a:xfrm>
-            <a:prstGeom prst="rect">
+      </p:grpSp>
+      <p:sp>
+        <p:nvSpPr>
+          <p:cNvPr id="86" name="Rectangle 85"/>
+          <p:cNvSpPr/>
+          <p:nvPr/>
+        </p:nvSpPr>
+        <p:spPr bwMode="auto">
+          <a:xfrm>
+            <a:off x="29252272" y="28848961"/>
+            <a:ext cx="14160212" cy="3591732"/>
+          </a:xfrm>
+          <a:prstGeom prst="rect">
+            <a:avLst/>
+          </a:prstGeom>
+          <a:noFill/>
+          <a:ln w="9525" cap="flat" cmpd="sng" algn="ctr">
+            <a:solidFill>
+              <a:schemeClr val="bg1">
+                <a:lumMod val="50000"/>
+              </a:schemeClr>
+            </a:solidFill>
+            <a:prstDash val="solid"/>
+            <a:round/>
+            <a:headEnd type="none" w="med" len="med"/>
+            <a:tailEnd type="none" w="med" len="med"/>
+          </a:ln>
+          <a:effectLst/>
+        </p:spPr>
+        <p:txBody>
+          <a:bodyPr vert="horz" wrap="square" lIns="91440" tIns="45720" rIns="91440" bIns="45720" numCol="1" rtlCol="0" anchor="t" anchorCtr="0" compatLnSpc="1">
+            <a:prstTxWarp prst="textNoShape">
               <a:avLst/>
-            </a:prstGeom>
-            <a:noFill/>
-          </p:spPr>
-          <p:txBody>
-            <a:bodyPr vert="vert270" wrap="square" rtlCol="0">
-              <a:spAutoFit/>
-            </a:bodyPr>
-            <a:lstStyle/>
-            <a:p>
-              <a:pPr algn="ctr"/>
-              <a:r>
-                <a:rPr lang="en-CA" sz="1800" b="1" dirty="0" err="1" smtClean="0"/>
-                <a:t>CpG</a:t>
-              </a:r>
-              <a:r>
-                <a:rPr lang="en-CA" sz="1800" b="1" dirty="0" smtClean="0"/>
-                <a:t> islands</a:t>
-              </a:r>
-              <a:endParaRPr lang="en-CA" sz="1800" b="1" dirty="0"/>
-            </a:p>
-          </p:txBody>
-        </p:sp>
-      </p:grpSp>
+            </a:prstTxWarp>
+          </a:bodyPr>
+          <a:lstStyle/>
+          <a:p>
+            <a:pPr marL="0" marR="0" indent="0" algn="l" defTabSz="2508250" rtl="0" eaLnBrk="1" fontAlgn="base" latinLnBrk="0" hangingPunct="1">
+              <a:lnSpc>
+                <a:spcPct val="100000"/>
+              </a:lnSpc>
+              <a:spcBef>
+                <a:spcPct val="0"/>
+              </a:spcBef>
+              <a:spcAft>
+                <a:spcPct val="0"/>
+              </a:spcAft>
+              <a:buClrTx/>
+              <a:buSzTx/>
+              <a:buFontTx/>
+              <a:buNone/>
+              <a:tabLst/>
+            </a:pPr>
+            <a:endParaRPr kumimoji="0" lang="en-CA" sz="4900" b="0" i="0" u="none" strike="noStrike" cap="none" normalizeH="0" baseline="0" dirty="0" smtClean="0">
+              <a:ln>
+                <a:noFill/>
+              </a:ln>
+              <a:solidFill>
+                <a:schemeClr val="tx1"/>
+              </a:solidFill>
+              <a:effectLst/>
+              <a:latin typeface="Arial" charset="0"/>
+            </a:endParaRPr>
+          </a:p>
+        </p:txBody>
+      </p:sp>
+      <p:sp>
+        <p:nvSpPr>
+          <p:cNvPr id="23" name="TextBox 22"/>
+          <p:cNvSpPr txBox="1"/>
+          <p:nvPr/>
+        </p:nvSpPr>
+        <p:spPr>
+          <a:xfrm>
+            <a:off x="29275964" y="28900741"/>
+            <a:ext cx="14136520" cy="1569660"/>
+          </a:xfrm>
+          <a:prstGeom prst="rect">
+            <a:avLst/>
+          </a:prstGeom>
+          <a:noFill/>
+        </p:spPr>
+        <p:txBody>
+          <a:bodyPr wrap="square" rtlCol="0">
+            <a:spAutoFit/>
+          </a:bodyPr>
+          <a:lstStyle/>
+          <a:p>
+            <a:pPr algn="just"/>
+            <a:r>
+              <a:rPr lang="en-CA" sz="3200" dirty="0" smtClean="0"/>
+              <a:t>We identified aberrant </a:t>
+            </a:r>
+            <a:r>
+              <a:rPr lang="en-CA" sz="3200" dirty="0"/>
+              <a:t>methylation of </a:t>
+            </a:r>
+            <a:r>
+              <a:rPr lang="en-CA" sz="3200" dirty="0" smtClean="0"/>
+              <a:t>34 CGIs </a:t>
+            </a:r>
+            <a:r>
+              <a:rPr lang="en-CA" sz="3200" dirty="0"/>
+              <a:t>associated with </a:t>
+            </a:r>
+            <a:r>
+              <a:rPr lang="en-CA" sz="3200" dirty="0" smtClean="0"/>
+              <a:t>21 genes in CRC progression. These genes could potentially be markers for disease monitoring of CRC.</a:t>
+            </a:r>
+            <a:endParaRPr lang="en-CA" sz="3200" dirty="0"/>
+          </a:p>
+        </p:txBody>
+      </p:sp>
     </p:spTree>
   </p:cSld>
   <p:clrMapOvr>

</xml_diff>

<commit_message>
prettified poster; conclusion needs work; FEA needs summary
</commit_message>
<xml_diff>
--- a/poster/poster.pptx
+++ b/poster/poster.pptx
@@ -4250,6 +4250,120 @@
           <a:chExt cx="0" cy="0"/>
         </a:xfrm>
       </p:grpSpPr>
+      <p:sp>
+        <p:nvSpPr>
+          <p:cNvPr id="3" name="Rectangle 2"/>
+          <p:cNvSpPr/>
+          <p:nvPr/>
+        </p:nvSpPr>
+        <p:spPr bwMode="auto">
+          <a:xfrm>
+            <a:off x="0" y="0"/>
+            <a:ext cx="43891200" cy="3831771"/>
+          </a:xfrm>
+          <a:prstGeom prst="rect">
+            <a:avLst/>
+          </a:prstGeom>
+          <a:solidFill>
+            <a:srgbClr val="000066"/>
+          </a:solidFill>
+          <a:ln w="9525" cap="flat" cmpd="sng" algn="ctr">
+            <a:solidFill>
+              <a:srgbClr val="333399"/>
+            </a:solidFill>
+            <a:prstDash val="solid"/>
+            <a:round/>
+            <a:headEnd type="none" w="med" len="med"/>
+            <a:tailEnd type="none" w="med" len="med"/>
+          </a:ln>
+          <a:effectLst/>
+        </p:spPr>
+        <p:txBody>
+          <a:bodyPr vert="horz" wrap="square" lIns="91440" tIns="45720" rIns="91440" bIns="45720" numCol="1" rtlCol="0" anchor="t" anchorCtr="0" compatLnSpc="1">
+            <a:prstTxWarp prst="textNoShape">
+              <a:avLst/>
+            </a:prstTxWarp>
+          </a:bodyPr>
+          <a:lstStyle/>
+          <a:p>
+            <a:pPr marL="0" marR="0" indent="0" algn="l" defTabSz="2508250" rtl="0" eaLnBrk="1" fontAlgn="base" latinLnBrk="0" hangingPunct="1">
+              <a:lnSpc>
+                <a:spcPct val="100000"/>
+              </a:lnSpc>
+              <a:spcBef>
+                <a:spcPct val="0"/>
+              </a:spcBef>
+              <a:spcAft>
+                <a:spcPct val="0"/>
+              </a:spcAft>
+              <a:buClrTx/>
+              <a:buSzTx/>
+              <a:buFontTx/>
+              <a:buNone/>
+              <a:tabLst/>
+            </a:pPr>
+            <a:endParaRPr kumimoji="0" lang="en-CA" sz="4900" b="0" i="0" u="none" strike="noStrike" cap="none" normalizeH="0" baseline="0" smtClean="0">
+              <a:ln>
+                <a:noFill/>
+              </a:ln>
+              <a:solidFill>
+                <a:schemeClr val="tx1"/>
+              </a:solidFill>
+              <a:effectLst/>
+              <a:latin typeface="Arial" charset="0"/>
+            </a:endParaRPr>
+          </a:p>
+        </p:txBody>
+      </p:sp>
+      <p:pic>
+        <p:nvPicPr>
+          <p:cNvPr id="2" name="Picture 1"/>
+          <p:cNvPicPr>
+            <a:picLocks/>
+          </p:cNvPicPr>
+          <p:nvPr/>
+        </p:nvPicPr>
+        <p:blipFill>
+          <a:blip r:embed="rId4">
+            <a:duotone>
+              <a:schemeClr val="accent6">
+                <a:shade val="45000"/>
+                <a:satMod val="135000"/>
+              </a:schemeClr>
+              <a:prstClr val="white"/>
+            </a:duotone>
+            <a:extLst>
+              <a:ext uri="{BEBA8EAE-BF5A-486C-A8C5-ECC9F3942E4B}">
+                <a14:imgProps xmlns:a14="http://schemas.microsoft.com/office/drawing/2010/main">
+                  <a14:imgLayer r:embed="rId5">
+                    <a14:imgEffect>
+                      <a14:artisticCrisscrossEtching/>
+                    </a14:imgEffect>
+                    <a14:imgEffect>
+                      <a14:saturation sat="0"/>
+                    </a14:imgEffect>
+                  </a14:imgLayer>
+                </a14:imgProps>
+              </a:ext>
+              <a:ext uri="{28A0092B-C50C-407E-A947-70E740481C1C}">
+                <a14:useLocalDpi xmlns:a14="http://schemas.microsoft.com/office/drawing/2010/main" val="0"/>
+              </a:ext>
+            </a:extLst>
+          </a:blip>
+          <a:stretch>
+            <a:fillRect/>
+          </a:stretch>
+        </p:blipFill>
+        <p:spPr>
+          <a:xfrm flipH="1">
+            <a:off x="34480498" y="69447"/>
+            <a:ext cx="7584618" cy="3726000"/>
+          </a:xfrm>
+          <a:prstGeom prst="rect">
+            <a:avLst/>
+          </a:prstGeom>
+        </p:spPr>
+      </p:pic>
       <p:grpSp>
         <p:nvGrpSpPr>
           <p:cNvPr id="19" name="Group 18"/>
@@ -4273,7 +4387,7 @@
             <p:nvPr/>
           </p:nvPicPr>
           <p:blipFill rotWithShape="1">
-            <a:blip r:embed="rId4">
+            <a:blip r:embed="rId6">
               <a:extLst>
                 <a:ext uri="{28A0092B-C50C-407E-A947-70E740481C1C}">
                   <a14:useLocalDpi xmlns:a14="http://schemas.microsoft.com/office/drawing/2010/main" val="0"/>
@@ -4302,7 +4416,7 @@
             <p:nvPr/>
           </p:nvPicPr>
           <p:blipFill rotWithShape="1">
-            <a:blip r:embed="rId5">
+            <a:blip r:embed="rId7">
               <a:extLst>
                 <a:ext uri="{28A0092B-C50C-407E-A947-70E740481C1C}">
                   <a14:useLocalDpi xmlns:a14="http://schemas.microsoft.com/office/drawing/2010/main" val="0"/>
@@ -4331,7 +4445,7 @@
             <p:nvPr/>
           </p:nvPicPr>
           <p:blipFill rotWithShape="1">
-            <a:blip r:embed="rId6">
+            <a:blip r:embed="rId8">
               <a:extLst>
                 <a:ext uri="{28A0092B-C50C-407E-A947-70E740481C1C}">
                   <a14:useLocalDpi xmlns:a14="http://schemas.microsoft.com/office/drawing/2010/main" val="0"/>
@@ -4360,7 +4474,7 @@
             <p:nvPr/>
           </p:nvPicPr>
           <p:blipFill>
-            <a:blip r:embed="rId7">
+            <a:blip r:embed="rId9">
               <a:extLst>
                 <a:ext uri="{28A0092B-C50C-407E-A947-70E740481C1C}">
                   <a14:useLocalDpi xmlns:a14="http://schemas.microsoft.com/office/drawing/2010/main" val="0"/>
@@ -4419,71 +4533,6 @@
       </p:grpSp>
       <p:sp>
         <p:nvSpPr>
-          <p:cNvPr id="3" name="Rectangle 2"/>
-          <p:cNvSpPr/>
-          <p:nvPr/>
-        </p:nvSpPr>
-        <p:spPr bwMode="auto">
-          <a:xfrm>
-            <a:off x="0" y="0"/>
-            <a:ext cx="43891200" cy="3831771"/>
-          </a:xfrm>
-          <a:prstGeom prst="rect">
-            <a:avLst/>
-          </a:prstGeom>
-          <a:solidFill>
-            <a:srgbClr val="000066"/>
-          </a:solidFill>
-          <a:ln w="9525" cap="flat" cmpd="sng" algn="ctr">
-            <a:solidFill>
-              <a:srgbClr val="333399"/>
-            </a:solidFill>
-            <a:prstDash val="solid"/>
-            <a:round/>
-            <a:headEnd type="none" w="med" len="med"/>
-            <a:tailEnd type="none" w="med" len="med"/>
-          </a:ln>
-          <a:effectLst/>
-        </p:spPr>
-        <p:txBody>
-          <a:bodyPr vert="horz" wrap="square" lIns="91440" tIns="45720" rIns="91440" bIns="45720" numCol="1" rtlCol="0" anchor="t" anchorCtr="0" compatLnSpc="1">
-            <a:prstTxWarp prst="textNoShape">
-              <a:avLst/>
-            </a:prstTxWarp>
-          </a:bodyPr>
-          <a:lstStyle/>
-          <a:p>
-            <a:pPr marL="0" marR="0" indent="0" algn="l" defTabSz="2508250" rtl="0" eaLnBrk="1" fontAlgn="base" latinLnBrk="0" hangingPunct="1">
-              <a:lnSpc>
-                <a:spcPct val="100000"/>
-              </a:lnSpc>
-              <a:spcBef>
-                <a:spcPct val="0"/>
-              </a:spcBef>
-              <a:spcAft>
-                <a:spcPct val="0"/>
-              </a:spcAft>
-              <a:buClrTx/>
-              <a:buSzTx/>
-              <a:buFontTx/>
-              <a:buNone/>
-              <a:tabLst/>
-            </a:pPr>
-            <a:endParaRPr kumimoji="0" lang="en-CA" sz="4900" b="0" i="0" u="none" strike="noStrike" cap="none" normalizeH="0" baseline="0" smtClean="0">
-              <a:ln>
-                <a:noFill/>
-              </a:ln>
-              <a:solidFill>
-                <a:schemeClr val="tx1"/>
-              </a:solidFill>
-              <a:effectLst/>
-              <a:latin typeface="Arial" charset="0"/>
-            </a:endParaRPr>
-          </a:p>
-        </p:txBody>
-      </p:sp>
-      <p:sp>
-        <p:nvSpPr>
           <p:cNvPr id="77" name="TextBox 76"/>
           <p:cNvSpPr txBox="1"/>
           <p:nvPr/>
@@ -4551,47 +4600,6 @@
                 <a:latin typeface="Arial" charset="0"/>
               </a:rPr>
               <a:t> normalization.</a:t>
-            </a:r>
-          </a:p>
-        </p:txBody>
-      </p:sp>
-      <p:sp>
-        <p:nvSpPr>
-          <p:cNvPr id="2055" name="Text Box 9"/>
-          <p:cNvSpPr txBox="1">
-            <a:spLocks noChangeArrowheads="1"/>
-          </p:cNvSpPr>
-          <p:nvPr/>
-        </p:nvSpPr>
-        <p:spPr bwMode="auto">
-          <a:xfrm>
-            <a:off x="2916076" y="554511"/>
-            <a:ext cx="40068589" cy="1231106"/>
-          </a:xfrm>
-          <a:prstGeom prst="rect">
-            <a:avLst/>
-          </a:prstGeom>
-          <a:noFill/>
-          <a:ln w="9525">
-            <a:noFill/>
-            <a:miter lim="800000"/>
-            <a:headEnd/>
-            <a:tailEnd/>
-          </a:ln>
-        </p:spPr>
-        <p:txBody>
-          <a:bodyPr wrap="square" lIns="0" tIns="0" rIns="0" bIns="0">
-            <a:spAutoFit/>
-          </a:bodyPr>
-          <a:lstStyle/>
-          <a:p>
-            <a:r>
-              <a:rPr lang="en-CA" sz="8000" b="1" dirty="0">
-                <a:solidFill>
-                  <a:schemeClr val="bg1"/>
-                </a:solidFill>
-              </a:rPr>
-              <a:t>Identifying aberrant methylation patterns underlying colorectal cancer progression</a:t>
             </a:r>
           </a:p>
         </p:txBody>
@@ -4805,234 +4813,6 @@
           </a:p>
         </p:txBody>
       </p:sp>
-      <p:sp>
-        <p:nvSpPr>
-          <p:cNvPr id="114" name="Rectangle 113"/>
-          <p:cNvSpPr/>
-          <p:nvPr/>
-        </p:nvSpPr>
-        <p:spPr>
-          <a:xfrm>
-            <a:off x="2916077" y="2234927"/>
-            <a:ext cx="40068588" cy="1015663"/>
-          </a:xfrm>
-          <a:prstGeom prst="rect">
-            <a:avLst/>
-          </a:prstGeom>
-        </p:spPr>
-        <p:txBody>
-          <a:bodyPr wrap="square">
-            <a:spAutoFit/>
-          </a:bodyPr>
-          <a:lstStyle/>
-          <a:p>
-            <a:pPr algn="ctr"/>
-            <a:r>
-              <a:rPr lang="en-US" sz="6000" dirty="0" smtClean="0">
-                <a:solidFill>
-                  <a:schemeClr val="bg1">
-                    <a:lumMod val="65000"/>
-                  </a:schemeClr>
-                </a:solidFill>
-              </a:rPr>
-              <a:t> </a:t>
-            </a:r>
-            <a:r>
-              <a:rPr lang="en-US" sz="6000" dirty="0" smtClean="0">
-                <a:solidFill>
-                  <a:schemeClr val="bg1"/>
-                </a:solidFill>
-              </a:rPr>
-              <a:t>Beryl </a:t>
-            </a:r>
-            <a:r>
-              <a:rPr lang="en-US" sz="6000" dirty="0" smtClean="0">
-                <a:solidFill>
-                  <a:schemeClr val="bg1"/>
-                </a:solidFill>
-              </a:rPr>
-              <a:t>Zhuang </a:t>
-            </a:r>
-            <a:r>
-              <a:rPr lang="en-US" sz="6000" dirty="0" smtClean="0">
-                <a:solidFill>
-                  <a:schemeClr val="bg1"/>
-                </a:solidFill>
-                <a:sym typeface="Wingdings 2" panose="05020102010507070707" pitchFamily="18" charset="2"/>
-              </a:rPr>
-              <a:t></a:t>
-            </a:r>
-            <a:r>
-              <a:rPr lang="en-US" sz="6000" dirty="0" smtClean="0">
-                <a:solidFill>
-                  <a:schemeClr val="bg1"/>
-                </a:solidFill>
-              </a:rPr>
-              <a:t> </a:t>
-            </a:r>
-            <a:r>
-              <a:rPr lang="en-US" sz="6000" dirty="0" smtClean="0">
-                <a:solidFill>
-                  <a:schemeClr val="bg1"/>
-                </a:solidFill>
-              </a:rPr>
-              <a:t>Eva Yap </a:t>
-            </a:r>
-            <a:r>
-              <a:rPr lang="en-US" sz="6000" dirty="0">
-                <a:solidFill>
-                  <a:schemeClr val="bg1"/>
-                </a:solidFill>
-                <a:sym typeface="Wingdings 2" panose="05020102010507070707" pitchFamily="18" charset="2"/>
-              </a:rPr>
-              <a:t> </a:t>
-            </a:r>
-            <a:r>
-              <a:rPr lang="en-US" sz="6000" dirty="0" err="1" smtClean="0">
-                <a:solidFill>
-                  <a:schemeClr val="bg1"/>
-                </a:solidFill>
-              </a:rPr>
-              <a:t>Ka</a:t>
-            </a:r>
-            <a:r>
-              <a:rPr lang="en-US" sz="6000" dirty="0" smtClean="0">
-                <a:solidFill>
-                  <a:schemeClr val="bg1"/>
-                </a:solidFill>
-              </a:rPr>
-              <a:t> </a:t>
-            </a:r>
-            <a:r>
-              <a:rPr lang="en-US" sz="6000" dirty="0" smtClean="0">
-                <a:solidFill>
-                  <a:schemeClr val="bg1"/>
-                </a:solidFill>
-              </a:rPr>
-              <a:t>Ming Nip </a:t>
-            </a:r>
-            <a:r>
-              <a:rPr lang="en-US" sz="6000" dirty="0">
-                <a:solidFill>
-                  <a:schemeClr val="bg1"/>
-                </a:solidFill>
-                <a:sym typeface="Wingdings 2" panose="05020102010507070707" pitchFamily="18" charset="2"/>
-              </a:rPr>
-              <a:t> </a:t>
-            </a:r>
-            <a:r>
-              <a:rPr lang="en-US" sz="6000" dirty="0" err="1" smtClean="0">
-                <a:solidFill>
-                  <a:schemeClr val="bg1"/>
-                </a:solidFill>
-              </a:rPr>
-              <a:t>Rashedul</a:t>
-            </a:r>
-            <a:r>
-              <a:rPr lang="en-US" sz="6000" dirty="0" smtClean="0">
-                <a:solidFill>
-                  <a:schemeClr val="bg1"/>
-                </a:solidFill>
-              </a:rPr>
-              <a:t> </a:t>
-            </a:r>
-            <a:r>
-              <a:rPr lang="en-US" sz="6000" dirty="0" smtClean="0">
-                <a:solidFill>
-                  <a:schemeClr val="bg1"/>
-                </a:solidFill>
-              </a:rPr>
-              <a:t>Islam </a:t>
-            </a:r>
-            <a:r>
-              <a:rPr lang="en-US" sz="6000" dirty="0">
-                <a:solidFill>
-                  <a:schemeClr val="bg1"/>
-                </a:solidFill>
-                <a:sym typeface="Wingdings 2" panose="05020102010507070707" pitchFamily="18" charset="2"/>
-              </a:rPr>
-              <a:t></a:t>
-            </a:r>
-            <a:r>
-              <a:rPr lang="en-US" sz="6000" dirty="0" smtClean="0">
-                <a:solidFill>
-                  <a:schemeClr val="bg1"/>
-                </a:solidFill>
-              </a:rPr>
-              <a:t> </a:t>
-            </a:r>
-            <a:r>
-              <a:rPr lang="en-US" sz="6000" dirty="0" err="1" smtClean="0">
-                <a:solidFill>
-                  <a:schemeClr val="bg1"/>
-                </a:solidFill>
-              </a:rPr>
-              <a:t>Santina</a:t>
-            </a:r>
-            <a:r>
-              <a:rPr lang="en-US" sz="6000" dirty="0" smtClean="0">
-                <a:solidFill>
-                  <a:schemeClr val="bg1"/>
-                </a:solidFill>
-              </a:rPr>
-              <a:t> </a:t>
-            </a:r>
-            <a:r>
-              <a:rPr lang="en-US" sz="6000" dirty="0" smtClean="0">
-                <a:solidFill>
-                  <a:schemeClr val="bg1"/>
-                </a:solidFill>
-              </a:rPr>
-              <a:t>Lin</a:t>
-            </a:r>
-            <a:endParaRPr lang="en-US" sz="6000" baseline="30000" dirty="0">
-              <a:solidFill>
-                <a:schemeClr val="bg1"/>
-              </a:solidFill>
-            </a:endParaRPr>
-          </a:p>
-        </p:txBody>
-      </p:sp>
-      <p:pic>
-        <p:nvPicPr>
-          <p:cNvPr id="125" name="Picture 124"/>
-          <p:cNvPicPr>
-            <a:picLocks noChangeAspect="1"/>
-          </p:cNvPicPr>
-          <p:nvPr/>
-        </p:nvPicPr>
-        <p:blipFill>
-          <a:blip r:embed="rId8">
-            <a:lum bright="70000" contrast="-70000"/>
-            <a:extLst>
-              <a:ext uri="{BEBA8EAE-BF5A-486C-A8C5-ECC9F3942E4B}">
-                <a14:imgProps xmlns:a14="http://schemas.microsoft.com/office/drawing/2010/main">
-                  <a14:imgLayer r:embed="rId9">
-                    <a14:imgEffect>
-                      <a14:colorTemperature colorTemp="4700"/>
-                    </a14:imgEffect>
-                    <a14:imgEffect>
-                      <a14:saturation sat="0"/>
-                    </a14:imgEffect>
-                  </a14:imgLayer>
-                </a14:imgProps>
-              </a:ext>
-            </a:extLst>
-          </a:blip>
-          <a:stretch>
-            <a:fillRect/>
-          </a:stretch>
-        </p:blipFill>
-        <p:spPr>
-          <a:xfrm>
-            <a:off x="256680" y="368055"/>
-            <a:ext cx="2165829" cy="2947206"/>
-          </a:xfrm>
-          <a:prstGeom prst="rect">
-            <a:avLst/>
-          </a:prstGeom>
-        </p:spPr>
-      </p:pic>
       <p:sp>
         <p:nvSpPr>
           <p:cNvPr id="126" name="Rounded Rectangle 113"/>
@@ -5069,7 +4849,7 @@
           <a:p>
             <a:pPr algn="ctr" defTabSz="1881188"/>
             <a:r>
-              <a:rPr lang="en-US" sz="4500" dirty="0">
+              <a:rPr lang="en-US" sz="6000" dirty="0">
                 <a:solidFill>
                   <a:schemeClr val="bg1"/>
                 </a:solidFill>
@@ -5078,7 +4858,7 @@
               <a:t></a:t>
             </a:r>
             <a:r>
-              <a:rPr lang="en-US" sz="4500" b="1" dirty="0">
+              <a:rPr lang="en-US" sz="6000" b="1" dirty="0">
                 <a:solidFill>
                   <a:schemeClr val="bg1"/>
                 </a:solidFill>
@@ -5095,7 +4875,7 @@
               <a:t>Dataset</a:t>
             </a:r>
             <a:r>
-              <a:rPr lang="en-US" sz="4500" dirty="0" smtClean="0">
+              <a:rPr lang="en-US" sz="6000" dirty="0" smtClean="0">
                 <a:solidFill>
                   <a:schemeClr val="bg1"/>
                 </a:solidFill>
@@ -5103,7 +4883,7 @@
               <a:t> </a:t>
             </a:r>
             <a:r>
-              <a:rPr lang="en-US" sz="4500" dirty="0">
+              <a:rPr lang="en-US" sz="6000" dirty="0">
                 <a:solidFill>
                   <a:schemeClr val="bg1"/>
                 </a:solidFill>
@@ -5161,7 +4941,7 @@
           <a:p>
             <a:pPr algn="ctr" defTabSz="1881188"/>
             <a:r>
-              <a:rPr lang="en-US" sz="4500" dirty="0" smtClean="0">
+              <a:rPr lang="en-US" sz="6000" dirty="0" smtClean="0">
                 <a:solidFill>
                   <a:schemeClr val="bg1"/>
                 </a:solidFill>
@@ -5170,32 +4950,32 @@
               <a:t></a:t>
             </a:r>
             <a:r>
+              <a:rPr lang="en-US" sz="6000" b="1" dirty="0" smtClean="0">
+                <a:solidFill>
+                  <a:schemeClr val="bg1"/>
+                </a:solidFill>
+                <a:sym typeface="Wingdings 2" panose="05020102010507070707" pitchFamily="18" charset="2"/>
+              </a:rPr>
+              <a:t> </a:t>
+            </a:r>
+            <a:r>
               <a:rPr lang="en-US" sz="4500" b="1" dirty="0" smtClean="0">
                 <a:solidFill>
                   <a:schemeClr val="bg1"/>
                 </a:solidFill>
-                <a:sym typeface="Wingdings 2" panose="05020102010507070707" pitchFamily="18" charset="2"/>
-              </a:rPr>
-              <a:t> </a:t>
-            </a:r>
-            <a:r>
-              <a:rPr lang="en-US" sz="4500" b="1" dirty="0" smtClean="0">
+              </a:rPr>
+              <a:t>Research Question</a:t>
+            </a:r>
+            <a:r>
+              <a:rPr lang="en-US" sz="6000" dirty="0" smtClean="0">
                 <a:solidFill>
                   <a:schemeClr val="bg1"/>
                 </a:solidFill>
               </a:rPr>
-              <a:t>Research Question</a:t>
-            </a:r>
-            <a:r>
-              <a:rPr lang="en-US" sz="4500" dirty="0" smtClean="0">
-                <a:solidFill>
-                  <a:schemeClr val="bg1"/>
-                </a:solidFill>
-              </a:rPr>
               <a:t> </a:t>
             </a:r>
             <a:r>
-              <a:rPr lang="en-US" sz="4500" dirty="0" smtClean="0">
+              <a:rPr lang="en-US" sz="6000" dirty="0" smtClean="0">
                 <a:solidFill>
                   <a:schemeClr val="bg1"/>
                 </a:solidFill>
@@ -5203,7 +4983,7 @@
               </a:rPr>
               <a:t></a:t>
             </a:r>
-            <a:endParaRPr lang="en-US" sz="4500" dirty="0">
+            <a:endParaRPr lang="en-US" sz="6000" dirty="0">
               <a:solidFill>
                 <a:schemeClr val="bg1"/>
               </a:solidFill>
@@ -5326,7 +5106,7 @@
           <a:p>
             <a:pPr algn="ctr" defTabSz="1881188"/>
             <a:r>
-              <a:rPr lang="en-US" sz="4500" dirty="0">
+              <a:rPr lang="en-US" sz="6000" dirty="0">
                 <a:solidFill>
                   <a:schemeClr val="bg1"/>
                 </a:solidFill>
@@ -5335,32 +5115,32 @@
               <a:t></a:t>
             </a:r>
             <a:r>
+              <a:rPr lang="en-US" sz="6000" b="1" dirty="0">
+                <a:solidFill>
+                  <a:schemeClr val="bg1"/>
+                </a:solidFill>
+                <a:sym typeface="Wingdings 2" panose="05020102010507070707" pitchFamily="18" charset="2"/>
+              </a:rPr>
+              <a:t> </a:t>
+            </a:r>
+            <a:r>
               <a:rPr lang="en-US" sz="4500" b="1" dirty="0">
                 <a:solidFill>
                   <a:schemeClr val="bg1"/>
                 </a:solidFill>
-                <a:sym typeface="Wingdings 2" panose="05020102010507070707" pitchFamily="18" charset="2"/>
-              </a:rPr>
-              <a:t> </a:t>
-            </a:r>
-            <a:r>
-              <a:rPr lang="en-US" sz="4500" b="1" dirty="0">
+              </a:rPr>
+              <a:t>Exploratory Analysis</a:t>
+            </a:r>
+            <a:r>
+              <a:rPr lang="en-US" sz="6000" dirty="0">
                 <a:solidFill>
                   <a:schemeClr val="bg1"/>
                 </a:solidFill>
               </a:rPr>
-              <a:t>Exploratory Analysis</a:t>
-            </a:r>
-            <a:r>
-              <a:rPr lang="en-US" sz="4500" dirty="0">
-                <a:solidFill>
-                  <a:schemeClr val="bg1"/>
-                </a:solidFill>
-              </a:rPr>
               <a:t> </a:t>
             </a:r>
             <a:r>
-              <a:rPr lang="en-US" sz="4500" dirty="0" smtClean="0">
+              <a:rPr lang="en-US" sz="6000" dirty="0" smtClean="0">
                 <a:solidFill>
                   <a:schemeClr val="bg1"/>
                 </a:solidFill>
@@ -5368,7 +5148,7 @@
               </a:rPr>
               <a:t></a:t>
             </a:r>
-            <a:endParaRPr lang="en-US" sz="4500" b="1" dirty="0">
+            <a:endParaRPr lang="en-US" sz="6000" b="1" dirty="0">
               <a:solidFill>
                 <a:schemeClr val="bg1"/>
               </a:solidFill>
@@ -5410,7 +5190,7 @@
           <a:p>
             <a:pPr algn="ctr" defTabSz="1881188"/>
             <a:r>
-              <a:rPr lang="en-US" sz="4500" dirty="0">
+              <a:rPr lang="en-US" sz="6000" dirty="0">
                 <a:solidFill>
                   <a:schemeClr val="bg1"/>
                 </a:solidFill>
@@ -5419,7 +5199,7 @@
               <a:t></a:t>
             </a:r>
             <a:r>
-              <a:rPr lang="en-US" sz="4500" b="1" dirty="0">
+              <a:rPr lang="en-US" sz="6000" b="1" dirty="0">
                 <a:solidFill>
                   <a:schemeClr val="bg1"/>
                 </a:solidFill>
@@ -5436,7 +5216,7 @@
               <a:t>Differential Methylation Analysis</a:t>
             </a:r>
             <a:r>
-              <a:rPr lang="en-US" sz="4500" dirty="0">
+              <a:rPr lang="en-US" sz="6000" dirty="0">
                 <a:solidFill>
                   <a:schemeClr val="bg1"/>
                 </a:solidFill>
@@ -5444,7 +5224,7 @@
               <a:t> </a:t>
             </a:r>
             <a:r>
-              <a:rPr lang="en-US" sz="4500" dirty="0">
+              <a:rPr lang="en-US" sz="6000" dirty="0">
                 <a:solidFill>
                   <a:schemeClr val="bg1"/>
                 </a:solidFill>
@@ -5452,7 +5232,7 @@
               </a:rPr>
               <a:t></a:t>
             </a:r>
-            <a:endParaRPr lang="en-US" sz="4500" b="1" dirty="0">
+            <a:endParaRPr lang="en-US" sz="6000" b="1" dirty="0">
               <a:solidFill>
                 <a:schemeClr val="bg1"/>
               </a:solidFill>
@@ -5496,7 +5276,7 @@
           <a:p>
             <a:pPr algn="ctr" defTabSz="1881188"/>
             <a:r>
-              <a:rPr lang="en-US" sz="4500" dirty="0">
+              <a:rPr lang="en-US" sz="6000" dirty="0">
                 <a:solidFill>
                   <a:schemeClr val="bg1"/>
                 </a:solidFill>
@@ -5505,32 +5285,32 @@
               <a:t></a:t>
             </a:r>
             <a:r>
+              <a:rPr lang="en-US" sz="6000" b="1" dirty="0">
+                <a:solidFill>
+                  <a:schemeClr val="bg1"/>
+                </a:solidFill>
+                <a:sym typeface="Wingdings 2" panose="05020102010507070707" pitchFamily="18" charset="2"/>
+              </a:rPr>
+              <a:t> </a:t>
+            </a:r>
+            <a:r>
               <a:rPr lang="en-US" sz="4500" b="1" dirty="0">
                 <a:solidFill>
                   <a:schemeClr val="bg1"/>
                 </a:solidFill>
-                <a:sym typeface="Wingdings 2" panose="05020102010507070707" pitchFamily="18" charset="2"/>
-              </a:rPr>
-              <a:t> </a:t>
-            </a:r>
-            <a:r>
-              <a:rPr lang="en-US" sz="4500" b="1" dirty="0">
+              </a:rPr>
+              <a:t>Data Normalization</a:t>
+            </a:r>
+            <a:r>
+              <a:rPr lang="en-US" sz="6000" dirty="0">
                 <a:solidFill>
                   <a:schemeClr val="bg1"/>
                 </a:solidFill>
               </a:rPr>
-              <a:t>Data Normalization</a:t>
-            </a:r>
-            <a:r>
-              <a:rPr lang="en-US" sz="4500" dirty="0">
-                <a:solidFill>
-                  <a:schemeClr val="bg1"/>
-                </a:solidFill>
-              </a:rPr>
               <a:t> </a:t>
             </a:r>
             <a:r>
-              <a:rPr lang="en-US" sz="4500" dirty="0" smtClean="0">
+              <a:rPr lang="en-US" sz="6000" dirty="0" smtClean="0">
                 <a:solidFill>
                   <a:schemeClr val="bg1"/>
                 </a:solidFill>
@@ -5538,7 +5318,7 @@
               </a:rPr>
               <a:t></a:t>
             </a:r>
-            <a:endParaRPr lang="en-US" sz="4500" b="1" dirty="0">
+            <a:endParaRPr lang="en-US" sz="6000" b="1" dirty="0">
               <a:solidFill>
                 <a:schemeClr val="bg1"/>
               </a:solidFill>
@@ -5697,7 +5477,7 @@
           <a:p>
             <a:pPr algn="ctr" defTabSz="1881188"/>
             <a:r>
-              <a:rPr lang="en-US" sz="4500" dirty="0">
+              <a:rPr lang="en-US" sz="6000" dirty="0">
                 <a:solidFill>
                   <a:schemeClr val="bg1"/>
                 </a:solidFill>
@@ -5706,7 +5486,7 @@
               <a:t></a:t>
             </a:r>
             <a:r>
-              <a:rPr lang="en-US" sz="4500" b="1" dirty="0">
+              <a:rPr lang="en-US" sz="6000" b="1" dirty="0">
                 <a:solidFill>
                   <a:schemeClr val="bg1"/>
                 </a:solidFill>
@@ -5723,7 +5503,7 @@
               <a:t>Functional Enrichment Analysis</a:t>
             </a:r>
             <a:r>
-              <a:rPr lang="en-US" sz="4500" dirty="0">
+              <a:rPr lang="en-US" sz="6000" dirty="0">
                 <a:solidFill>
                   <a:schemeClr val="bg1"/>
                 </a:solidFill>
@@ -5731,7 +5511,7 @@
               <a:t> </a:t>
             </a:r>
             <a:r>
-              <a:rPr lang="en-US" sz="4500" dirty="0">
+              <a:rPr lang="en-US" sz="6000" dirty="0">
                 <a:solidFill>
                   <a:schemeClr val="bg1"/>
                 </a:solidFill>
@@ -5739,7 +5519,7 @@
               </a:rPr>
               <a:t></a:t>
             </a:r>
-            <a:endParaRPr lang="en-US" sz="4500" b="1" dirty="0">
+            <a:endParaRPr lang="en-US" sz="6000" b="1" dirty="0">
               <a:solidFill>
                 <a:schemeClr val="bg1"/>
               </a:solidFill>
@@ -6439,7 +6219,7 @@
           <a:p>
             <a:pPr algn="ctr" defTabSz="1881188"/>
             <a:r>
-              <a:rPr lang="en-US" sz="4500" dirty="0">
+              <a:rPr lang="en-US" sz="6000" dirty="0" smtClean="0">
                 <a:solidFill>
                   <a:schemeClr val="bg1"/>
                 </a:solidFill>
@@ -6448,7 +6228,7 @@
               <a:t></a:t>
             </a:r>
             <a:r>
-              <a:rPr lang="en-US" sz="4500" b="1" dirty="0">
+              <a:rPr lang="en-US" sz="6000" b="1" dirty="0" smtClean="0">
                 <a:solidFill>
                   <a:schemeClr val="bg1"/>
                 </a:solidFill>
@@ -6465,7 +6245,7 @@
               <a:t>Conclusion</a:t>
             </a:r>
             <a:r>
-              <a:rPr lang="en-US" sz="4500" dirty="0">
+              <a:rPr lang="en-US" sz="6000" dirty="0" smtClean="0">
                 <a:solidFill>
                   <a:schemeClr val="bg1"/>
                 </a:solidFill>
@@ -6473,7 +6253,7 @@
               <a:t> </a:t>
             </a:r>
             <a:r>
-              <a:rPr lang="en-US" sz="4500" dirty="0">
+              <a:rPr lang="en-US" sz="6000" dirty="0">
                 <a:solidFill>
                   <a:schemeClr val="bg1"/>
                 </a:solidFill>
@@ -6481,7 +6261,7 @@
               </a:rPr>
               <a:t></a:t>
             </a:r>
-            <a:endParaRPr lang="en-US" sz="4500" b="1" dirty="0">
+            <a:endParaRPr lang="en-US" sz="6000" b="1" dirty="0">
               <a:solidFill>
                 <a:schemeClr val="bg1"/>
               </a:solidFill>
@@ -8005,7 +7785,7 @@
           <a:graphicData uri="http://schemas.openxmlformats.org/presentationml/2006/ole">
             <mc:AlternateContent xmlns:mc="http://schemas.openxmlformats.org/markup-compatibility/2006">
               <mc:Choice xmlns:v="urn:schemas-microsoft-com:vml" Requires="v">
-                <p:oleObj spid="_x0000_s1036" name="Worksheet" r:id="rId17" imgW="1226997" imgH="373530" progId="Excel.Sheet.12">
+                <p:oleObj spid="_x0000_s1043" name="Worksheet" r:id="rId17" imgW="1226997" imgH="373530" progId="Excel.Sheet.12">
                   <p:embed/>
                 </p:oleObj>
               </mc:Choice>
@@ -9211,13 +8991,7 @@
               <a:rPr lang="en-US" sz="3200" b="1" dirty="0" smtClean="0">
                 <a:latin typeface="Arial" charset="0"/>
               </a:rPr>
-              <a:t>Table </a:t>
-            </a:r>
-            <a:r>
-              <a:rPr lang="en-US" sz="3200" b="1" dirty="0" smtClean="0">
-                <a:latin typeface="Arial" charset="0"/>
-              </a:rPr>
-              <a:t>2.</a:t>
+              <a:t>Table 2.</a:t>
             </a:r>
             <a:r>
               <a:rPr lang="en-US" sz="3200" dirty="0" smtClean="0">
@@ -9479,14 +9253,7 @@
                 <a:latin typeface="Arial"/>
                 <a:cs typeface="Arial"/>
               </a:rPr>
-              <a:t>Y </a:t>
-            </a:r>
-            <a:r>
-              <a:rPr lang="en-US" sz="5400" b="1" dirty="0" smtClean="0">
-                <a:latin typeface="Arial"/>
-                <a:cs typeface="Arial"/>
-              </a:rPr>
-              <a:t>= Xα</a:t>
+              <a:t>Y = Xα</a:t>
             </a:r>
             <a:r>
               <a:rPr lang="en-US" sz="5400" b="1" baseline="-25000" dirty="0" smtClean="0">
@@ -9539,17 +9306,7 @@
                 <a:latin typeface="Arial"/>
                 <a:cs typeface="Arial"/>
               </a:rPr>
-              <a:t>	w</a:t>
-            </a:r>
-            <a:r>
-              <a:rPr lang="en-US" sz="2600" b="1" dirty="0" smtClean="0">
-                <a:solidFill>
-                  <a:schemeClr val="tx1"/>
-                </a:solidFill>
-                <a:latin typeface="Arial"/>
-                <a:cs typeface="Arial"/>
-              </a:rPr>
-              <a:t>here:</a:t>
+              <a:t>	where:</a:t>
             </a:r>
           </a:p>
           <a:p>
@@ -9590,8 +9347,10 @@
                 <a:latin typeface="Arial"/>
                 <a:cs typeface="Arial"/>
               </a:rPr>
-              <a:t>	= </a:t>
-            </a:r>
+              <a:t>	= methylation levels (M value)</a:t>
+            </a:r>
+          </a:p>
+          <a:p>
             <a:r>
               <a:rPr lang="en-US" sz="2600" dirty="0" smtClean="0">
                 <a:solidFill>
@@ -9600,10 +9359,18 @@
                 <a:latin typeface="Arial"/>
                 <a:cs typeface="Arial"/>
               </a:rPr>
-              <a:t>methylation levels (M value)</a:t>
-            </a:r>
-          </a:p>
-          <a:p>
+              <a:t>	</a:t>
+            </a:r>
+            <a:r>
+              <a:rPr lang="en-US" sz="2600" b="1" dirty="0" smtClean="0">
+                <a:solidFill>
+                  <a:schemeClr val="tx1"/>
+                </a:solidFill>
+                <a:latin typeface="Arial"/>
+                <a:cs typeface="Arial"/>
+              </a:rPr>
+              <a:t>X</a:t>
+            </a:r>
             <a:r>
               <a:rPr lang="en-US" sz="2600" dirty="0" smtClean="0">
                 <a:solidFill>
@@ -9612,6 +9379,30 @@
                 <a:latin typeface="Arial"/>
                 <a:cs typeface="Arial"/>
               </a:rPr>
+              <a:t>	= design matrix indicating different</a:t>
+            </a:r>
+          </a:p>
+          <a:p>
+            <a:r>
+              <a:rPr lang="en-US" sz="2600" dirty="0" smtClean="0">
+                <a:solidFill>
+                  <a:schemeClr val="tx1"/>
+                </a:solidFill>
+                <a:latin typeface="Arial"/>
+                <a:cs typeface="Arial"/>
+              </a:rPr>
+              <a:t>			sample groups</a:t>
+            </a:r>
+          </a:p>
+          <a:p>
+            <a:r>
+              <a:rPr lang="en-US" sz="2600" dirty="0" smtClean="0">
+                <a:solidFill>
+                  <a:schemeClr val="tx1"/>
+                </a:solidFill>
+                <a:latin typeface="Arial"/>
+                <a:cs typeface="Arial"/>
+              </a:rPr>
               <a:t>	</a:t>
             </a:r>
             <a:r>
@@ -9622,7 +9413,17 @@
                 <a:latin typeface="Arial"/>
                 <a:cs typeface="Arial"/>
               </a:rPr>
-              <a:t>X</a:t>
+              <a:t>α</a:t>
+            </a:r>
+            <a:r>
+              <a:rPr lang="en-US" sz="2600" b="1" baseline="-25000" dirty="0" smtClean="0">
+                <a:solidFill>
+                  <a:schemeClr val="tx1"/>
+                </a:solidFill>
+                <a:latin typeface="Arial"/>
+                <a:cs typeface="Arial"/>
+              </a:rPr>
+              <a:t>1</a:t>
             </a:r>
             <a:r>
               <a:rPr lang="en-US" sz="2600" dirty="0" smtClean="0">
@@ -9632,8 +9433,10 @@
                 <a:latin typeface="Arial"/>
                 <a:cs typeface="Arial"/>
               </a:rPr>
-              <a:t>	= </a:t>
-            </a:r>
+              <a:t>	= change in mean M value</a:t>
+            </a:r>
+          </a:p>
+          <a:p>
             <a:r>
               <a:rPr lang="en-US" sz="2600" dirty="0" smtClean="0">
                 <a:solidFill>
@@ -9642,7 +9445,27 @@
                 <a:latin typeface="Arial"/>
                 <a:cs typeface="Arial"/>
               </a:rPr>
-              <a:t>design matrix </a:t>
+              <a:t>	</a:t>
+            </a:r>
+            <a:r>
+              <a:rPr lang="en-US" sz="2600" b="1" dirty="0" smtClean="0">
+                <a:solidFill>
+                  <a:schemeClr val="tx1"/>
+                </a:solidFill>
+                <a:latin typeface="Arial"/>
+                <a:cs typeface="Arial"/>
+              </a:rPr>
+              <a:t>α</a:t>
+            </a:r>
+            <a:r>
+              <a:rPr lang="en-US" sz="2600" b="1" baseline="-25000" dirty="0" smtClean="0">
+                <a:solidFill>
+                  <a:schemeClr val="tx1"/>
+                </a:solidFill>
+                <a:latin typeface="Arial"/>
+                <a:cs typeface="Arial"/>
+              </a:rPr>
+              <a:t>0</a:t>
             </a:r>
             <a:r>
               <a:rPr lang="en-US" sz="2600" dirty="0" smtClean="0">
@@ -9652,10 +9475,20 @@
                 <a:latin typeface="Arial"/>
                 <a:cs typeface="Arial"/>
               </a:rPr>
-              <a:t>indicating different</a:t>
-            </a:r>
-          </a:p>
-          <a:p>
+              <a:t>	= mean M value for reference</a:t>
+            </a:r>
+          </a:p>
+          <a:p>
+            <a:r>
+              <a:rPr lang="en-US" sz="2600" dirty="0">
+                <a:solidFill>
+                  <a:schemeClr val="tx1"/>
+                </a:solidFill>
+                <a:latin typeface="Arial"/>
+                <a:cs typeface="Arial"/>
+              </a:rPr>
+              <a:t>	</a:t>
+            </a:r>
             <a:r>
               <a:rPr lang="en-US" sz="2600" dirty="0" smtClean="0">
                 <a:solidFill>
@@ -9664,8 +9497,10 @@
                 <a:latin typeface="Arial"/>
                 <a:cs typeface="Arial"/>
               </a:rPr>
-              <a:t>			sample </a:t>
-            </a:r>
+              <a:t>		sample group		</a:t>
+            </a:r>
+          </a:p>
+          <a:p>
             <a:r>
               <a:rPr lang="en-US" sz="2600" dirty="0" smtClean="0">
                 <a:solidFill>
@@ -9674,10 +9509,18 @@
                 <a:latin typeface="Arial"/>
                 <a:cs typeface="Arial"/>
               </a:rPr>
-              <a:t>groups</a:t>
-            </a:r>
-          </a:p>
-          <a:p>
+              <a:t>	</a:t>
+            </a:r>
+            <a:r>
+              <a:rPr lang="en-US" sz="2600" b="1" dirty="0" smtClean="0">
+                <a:solidFill>
+                  <a:schemeClr val="tx1"/>
+                </a:solidFill>
+                <a:latin typeface="Arial"/>
+                <a:cs typeface="Arial"/>
+              </a:rPr>
+              <a:t>ε</a:t>
+            </a:r>
             <a:r>
               <a:rPr lang="en-US" sz="2600" dirty="0" smtClean="0">
                 <a:solidFill>
@@ -9686,193 +9529,7 @@
                 <a:latin typeface="Arial"/>
                 <a:cs typeface="Arial"/>
               </a:rPr>
-              <a:t>	</a:t>
-            </a:r>
-            <a:r>
-              <a:rPr lang="en-US" sz="2600" b="1" dirty="0" smtClean="0">
-                <a:solidFill>
-                  <a:schemeClr val="tx1"/>
-                </a:solidFill>
-                <a:latin typeface="Arial"/>
-                <a:cs typeface="Arial"/>
-              </a:rPr>
-              <a:t>α</a:t>
-            </a:r>
-            <a:r>
-              <a:rPr lang="en-US" sz="2600" b="1" baseline="-25000" dirty="0" smtClean="0">
-                <a:solidFill>
-                  <a:schemeClr val="tx1"/>
-                </a:solidFill>
-                <a:latin typeface="Arial"/>
-                <a:cs typeface="Arial"/>
-              </a:rPr>
-              <a:t>1</a:t>
-            </a:r>
-            <a:r>
-              <a:rPr lang="en-US" sz="2600" dirty="0" smtClean="0">
-                <a:solidFill>
-                  <a:schemeClr val="tx1"/>
-                </a:solidFill>
-                <a:latin typeface="Arial"/>
-                <a:cs typeface="Arial"/>
-              </a:rPr>
-              <a:t>	= </a:t>
-            </a:r>
-            <a:r>
-              <a:rPr lang="en-US" sz="2600" dirty="0" smtClean="0">
-                <a:solidFill>
-                  <a:schemeClr val="tx1"/>
-                </a:solidFill>
-                <a:latin typeface="Arial"/>
-                <a:cs typeface="Arial"/>
-              </a:rPr>
-              <a:t>change in mean M value</a:t>
-            </a:r>
-          </a:p>
-          <a:p>
-            <a:r>
-              <a:rPr lang="en-US" sz="2600" dirty="0" smtClean="0">
-                <a:solidFill>
-                  <a:schemeClr val="tx1"/>
-                </a:solidFill>
-                <a:latin typeface="Arial"/>
-                <a:cs typeface="Arial"/>
-              </a:rPr>
-              <a:t>	</a:t>
-            </a:r>
-            <a:r>
-              <a:rPr lang="en-US" sz="2600" b="1" dirty="0" smtClean="0">
-                <a:solidFill>
-                  <a:schemeClr val="tx1"/>
-                </a:solidFill>
-                <a:latin typeface="Arial"/>
-                <a:cs typeface="Arial"/>
-              </a:rPr>
-              <a:t>α</a:t>
-            </a:r>
-            <a:r>
-              <a:rPr lang="en-US" sz="2600" b="1" baseline="-25000" dirty="0" smtClean="0">
-                <a:solidFill>
-                  <a:schemeClr val="tx1"/>
-                </a:solidFill>
-                <a:latin typeface="Arial"/>
-                <a:cs typeface="Arial"/>
-              </a:rPr>
-              <a:t>0</a:t>
-            </a:r>
-            <a:r>
-              <a:rPr lang="en-US" sz="2600" dirty="0" smtClean="0">
-                <a:solidFill>
-                  <a:schemeClr val="tx1"/>
-                </a:solidFill>
-                <a:latin typeface="Arial"/>
-                <a:cs typeface="Arial"/>
-              </a:rPr>
-              <a:t>	= </a:t>
-            </a:r>
-            <a:r>
-              <a:rPr lang="en-US" sz="2600" dirty="0" smtClean="0">
-                <a:solidFill>
-                  <a:schemeClr val="tx1"/>
-                </a:solidFill>
-                <a:latin typeface="Arial"/>
-                <a:cs typeface="Arial"/>
-              </a:rPr>
-              <a:t>mean M value for </a:t>
-            </a:r>
-            <a:r>
-              <a:rPr lang="en-US" sz="2600" dirty="0" smtClean="0">
-                <a:solidFill>
-                  <a:schemeClr val="tx1"/>
-                </a:solidFill>
-                <a:latin typeface="Arial"/>
-                <a:cs typeface="Arial"/>
-              </a:rPr>
-              <a:t>reference</a:t>
-            </a:r>
-          </a:p>
-          <a:p>
-            <a:r>
-              <a:rPr lang="en-US" sz="2600" dirty="0">
-                <a:solidFill>
-                  <a:schemeClr val="tx1"/>
-                </a:solidFill>
-                <a:latin typeface="Arial"/>
-                <a:cs typeface="Arial"/>
-              </a:rPr>
-              <a:t>	</a:t>
-            </a:r>
-            <a:r>
-              <a:rPr lang="en-US" sz="2600" dirty="0" smtClean="0">
-                <a:solidFill>
-                  <a:schemeClr val="tx1"/>
-                </a:solidFill>
-                <a:latin typeface="Arial"/>
-                <a:cs typeface="Arial"/>
-              </a:rPr>
-              <a:t>		</a:t>
-            </a:r>
-            <a:r>
-              <a:rPr lang="en-US" sz="2600" dirty="0" smtClean="0">
-                <a:solidFill>
-                  <a:schemeClr val="tx1"/>
-                </a:solidFill>
-                <a:latin typeface="Arial"/>
-                <a:cs typeface="Arial"/>
-              </a:rPr>
-              <a:t>sample group</a:t>
-            </a:r>
-            <a:r>
-              <a:rPr lang="en-US" sz="2600" dirty="0" smtClean="0">
-                <a:solidFill>
-                  <a:schemeClr val="tx1"/>
-                </a:solidFill>
-                <a:latin typeface="Arial"/>
-                <a:cs typeface="Arial"/>
-              </a:rPr>
-              <a:t>		</a:t>
-            </a:r>
-          </a:p>
-          <a:p>
-            <a:r>
-              <a:rPr lang="en-US" sz="2600" dirty="0" smtClean="0">
-                <a:solidFill>
-                  <a:schemeClr val="tx1"/>
-                </a:solidFill>
-                <a:latin typeface="Arial"/>
-                <a:cs typeface="Arial"/>
-              </a:rPr>
-              <a:t>	</a:t>
-            </a:r>
-            <a:r>
-              <a:rPr lang="en-US" sz="2600" b="1" dirty="0" smtClean="0">
-                <a:solidFill>
-                  <a:schemeClr val="tx1"/>
-                </a:solidFill>
-                <a:latin typeface="Arial"/>
-                <a:cs typeface="Arial"/>
-              </a:rPr>
-              <a:t>ε</a:t>
-            </a:r>
-            <a:r>
-              <a:rPr lang="en-US" sz="2600" dirty="0" smtClean="0">
-                <a:solidFill>
-                  <a:schemeClr val="tx1"/>
-                </a:solidFill>
-                <a:latin typeface="Arial"/>
-                <a:cs typeface="Arial"/>
-              </a:rPr>
-              <a:t>	= </a:t>
-            </a:r>
-            <a:r>
-              <a:rPr lang="en-US" sz="2600" dirty="0" smtClean="0">
-                <a:solidFill>
-                  <a:schemeClr val="tx1"/>
-                </a:solidFill>
-                <a:latin typeface="Arial"/>
-                <a:cs typeface="Arial"/>
-              </a:rPr>
-              <a:t>error ~ N(0, σ</a:t>
+              <a:t>	= error ~ N(0, σ</a:t>
             </a:r>
             <a:r>
               <a:rPr lang="en-US" sz="2600" baseline="30000" dirty="0" smtClean="0">
@@ -9945,13 +9602,7 @@
               <a:rPr lang="en-US" sz="3200" dirty="0" smtClean="0">
                 <a:latin typeface="Arial" charset="0"/>
               </a:rPr>
-              <a:t>Linear m</a:t>
-            </a:r>
-            <a:r>
-              <a:rPr lang="en-US" sz="3200" dirty="0" smtClean="0">
-                <a:latin typeface="Arial" charset="0"/>
-              </a:rPr>
-              <a:t>odel of  methylation level of each CGI using sample groups as single covariate.</a:t>
+              <a:t>Linear model of  methylation level of each CGI using sample groups as single covariate.</a:t>
             </a:r>
             <a:endParaRPr lang="en-US" sz="3200" dirty="0">
               <a:latin typeface="Arial" charset="0"/>
@@ -10212,6 +9863,284 @@
               <a:t>21 genes in CRC progression. These genes could potentially be markers for disease monitoring of CRC.</a:t>
             </a:r>
             <a:endParaRPr lang="en-CA" sz="3200" dirty="0"/>
+          </a:p>
+        </p:txBody>
+      </p:sp>
+      <p:pic>
+        <p:nvPicPr>
+          <p:cNvPr id="79" name="Picture 78"/>
+          <p:cNvPicPr>
+            <a:picLocks noChangeAspect="1"/>
+          </p:cNvPicPr>
+          <p:nvPr/>
+        </p:nvPicPr>
+        <p:blipFill>
+          <a:blip r:embed="rId4">
+            <a:duotone>
+              <a:schemeClr val="accent6">
+                <a:shade val="45000"/>
+                <a:satMod val="135000"/>
+              </a:schemeClr>
+              <a:prstClr val="white"/>
+            </a:duotone>
+            <a:extLst>
+              <a:ext uri="{BEBA8EAE-BF5A-486C-A8C5-ECC9F3942E4B}">
+                <a14:imgProps xmlns:a14="http://schemas.microsoft.com/office/drawing/2010/main">
+                  <a14:imgLayer r:embed="rId5">
+                    <a14:imgEffect>
+                      <a14:artisticCrisscrossEtching/>
+                    </a14:imgEffect>
+                    <a14:imgEffect>
+                      <a14:saturation sat="0"/>
+                    </a14:imgEffect>
+                  </a14:imgLayer>
+                </a14:imgProps>
+              </a:ext>
+              <a:ext uri="{28A0092B-C50C-407E-A947-70E740481C1C}">
+                <a14:useLocalDpi xmlns:a14="http://schemas.microsoft.com/office/drawing/2010/main" val="0"/>
+              </a:ext>
+            </a:extLst>
+          </a:blip>
+          <a:stretch>
+            <a:fillRect/>
+          </a:stretch>
+        </p:blipFill>
+        <p:spPr>
+          <a:xfrm>
+            <a:off x="2009541" y="40356"/>
+            <a:ext cx="7613430" cy="3724665"/>
+          </a:xfrm>
+          <a:prstGeom prst="rect">
+            <a:avLst/>
+          </a:prstGeom>
+        </p:spPr>
+      </p:pic>
+      <p:sp>
+        <p:nvSpPr>
+          <p:cNvPr id="2055" name="Text Box 9"/>
+          <p:cNvSpPr txBox="1">
+            <a:spLocks noChangeArrowheads="1"/>
+          </p:cNvSpPr>
+          <p:nvPr/>
+        </p:nvSpPr>
+        <p:spPr bwMode="auto">
+          <a:xfrm>
+            <a:off x="2916076" y="554511"/>
+            <a:ext cx="40068589" cy="1231106"/>
+          </a:xfrm>
+          <a:prstGeom prst="rect">
+            <a:avLst/>
+          </a:prstGeom>
+          <a:noFill/>
+          <a:ln w="9525">
+            <a:noFill/>
+            <a:miter lim="800000"/>
+            <a:headEnd/>
+            <a:tailEnd/>
+          </a:ln>
+        </p:spPr>
+        <p:txBody>
+          <a:bodyPr wrap="square" lIns="0" tIns="0" rIns="0" bIns="0">
+            <a:spAutoFit/>
+          </a:bodyPr>
+          <a:lstStyle/>
+          <a:p>
+            <a:r>
+              <a:rPr lang="en-CA" sz="8000" b="1" dirty="0">
+                <a:solidFill>
+                  <a:schemeClr val="bg1"/>
+                </a:solidFill>
+              </a:rPr>
+              <a:t>Identifying aberrant methylation patterns underlying colorectal cancer progression</a:t>
+            </a:r>
+          </a:p>
+        </p:txBody>
+      </p:sp>
+      <p:pic>
+        <p:nvPicPr>
+          <p:cNvPr id="125" name="Picture 124"/>
+          <p:cNvPicPr>
+            <a:picLocks noChangeAspect="1"/>
+          </p:cNvPicPr>
+          <p:nvPr/>
+        </p:nvPicPr>
+        <p:blipFill>
+          <a:blip r:embed="rId20">
+            <a:lum bright="70000" contrast="-70000"/>
+            <a:extLst>
+              <a:ext uri="{BEBA8EAE-BF5A-486C-A8C5-ECC9F3942E4B}">
+                <a14:imgProps xmlns:a14="http://schemas.microsoft.com/office/drawing/2010/main">
+                  <a14:imgLayer r:embed="rId21">
+                    <a14:imgEffect>
+                      <a14:colorTemperature colorTemp="4700"/>
+                    </a14:imgEffect>
+                    <a14:imgEffect>
+                      <a14:saturation sat="0"/>
+                    </a14:imgEffect>
+                  </a14:imgLayer>
+                </a14:imgProps>
+              </a:ext>
+            </a:extLst>
+          </a:blip>
+          <a:stretch>
+            <a:fillRect/>
+          </a:stretch>
+        </p:blipFill>
+        <p:spPr>
+          <a:xfrm>
+            <a:off x="256680" y="368055"/>
+            <a:ext cx="2165829" cy="2947206"/>
+          </a:xfrm>
+          <a:prstGeom prst="rect">
+            <a:avLst/>
+          </a:prstGeom>
+        </p:spPr>
+      </p:pic>
+      <p:sp>
+        <p:nvSpPr>
+          <p:cNvPr id="114" name="Rectangle 113"/>
+          <p:cNvSpPr/>
+          <p:nvPr/>
+        </p:nvSpPr>
+        <p:spPr>
+          <a:xfrm>
+            <a:off x="0" y="2244625"/>
+            <a:ext cx="43891200" cy="1054942"/>
+          </a:xfrm>
+          <a:prstGeom prst="rect">
+            <a:avLst/>
+          </a:prstGeom>
+        </p:spPr>
+        <p:txBody>
+          <a:bodyPr wrap="square">
+            <a:spAutoFit/>
+          </a:bodyPr>
+          <a:lstStyle/>
+          <a:p>
+            <a:pPr algn="ctr"/>
+            <a:r>
+              <a:rPr lang="en-US" sz="6000" dirty="0" smtClean="0">
+                <a:solidFill>
+                  <a:schemeClr val="bg1">
+                    <a:lumMod val="65000"/>
+                  </a:schemeClr>
+                </a:solidFill>
+              </a:rPr>
+              <a:t> </a:t>
+            </a:r>
+            <a:r>
+              <a:rPr lang="en-US" sz="6000" dirty="0" smtClean="0">
+                <a:solidFill>
+                  <a:schemeClr val="bg1"/>
+                </a:solidFill>
+              </a:rPr>
+              <a:t>Beryl Zhuang </a:t>
+            </a:r>
+            <a:r>
+              <a:rPr lang="en-US" sz="6000" dirty="0" smtClean="0">
+                <a:solidFill>
+                  <a:schemeClr val="bg1"/>
+                </a:solidFill>
+                <a:sym typeface="Wingdings 2" panose="05020102010507070707" pitchFamily="18" charset="2"/>
+              </a:rPr>
+              <a:t></a:t>
+            </a:r>
+            <a:r>
+              <a:rPr lang="en-US" sz="6000" dirty="0" smtClean="0">
+                <a:solidFill>
+                  <a:schemeClr val="bg1"/>
+                </a:solidFill>
+              </a:rPr>
+              <a:t> Eva Yap </a:t>
+            </a:r>
+            <a:r>
+              <a:rPr lang="en-US" sz="6000" dirty="0">
+                <a:solidFill>
+                  <a:schemeClr val="bg1"/>
+                </a:solidFill>
+                <a:sym typeface="Wingdings 2" panose="05020102010507070707" pitchFamily="18" charset="2"/>
+              </a:rPr>
+              <a:t> </a:t>
+            </a:r>
+            <a:r>
+              <a:rPr lang="en-US" sz="6000" dirty="0" err="1" smtClean="0">
+                <a:solidFill>
+                  <a:schemeClr val="bg1"/>
+                </a:solidFill>
+              </a:rPr>
+              <a:t>Ka</a:t>
+            </a:r>
+            <a:r>
+              <a:rPr lang="en-US" sz="6000" dirty="0" smtClean="0">
+                <a:solidFill>
+                  <a:schemeClr val="bg1"/>
+                </a:solidFill>
+              </a:rPr>
+              <a:t> Ming Nip </a:t>
+            </a:r>
+            <a:r>
+              <a:rPr lang="en-US" sz="6000" dirty="0">
+                <a:solidFill>
+                  <a:schemeClr val="bg1"/>
+                </a:solidFill>
+                <a:sym typeface="Wingdings 2" panose="05020102010507070707" pitchFamily="18" charset="2"/>
+              </a:rPr>
+              <a:t> </a:t>
+            </a:r>
+            <a:r>
+              <a:rPr lang="en-US" sz="6000" dirty="0" err="1" smtClean="0">
+                <a:solidFill>
+                  <a:schemeClr val="bg1"/>
+                </a:solidFill>
+              </a:rPr>
+              <a:t>Rashedul</a:t>
+            </a:r>
+            <a:r>
+              <a:rPr lang="en-US" sz="6000" dirty="0" smtClean="0">
+                <a:solidFill>
+                  <a:schemeClr val="bg1"/>
+                </a:solidFill>
+              </a:rPr>
+              <a:t> Islam </a:t>
+            </a:r>
+            <a:r>
+              <a:rPr lang="en-US" sz="6000" dirty="0">
+                <a:solidFill>
+                  <a:schemeClr val="bg1"/>
+                </a:solidFill>
+                <a:sym typeface="Wingdings 2" panose="05020102010507070707" pitchFamily="18" charset="2"/>
+              </a:rPr>
+              <a:t></a:t>
+            </a:r>
+            <a:r>
+              <a:rPr lang="en-US" sz="6000" dirty="0" smtClean="0">
+                <a:solidFill>
+                  <a:schemeClr val="bg1"/>
+                </a:solidFill>
+              </a:rPr>
+              <a:t> </a:t>
+            </a:r>
+            <a:r>
+              <a:rPr lang="en-US" sz="6000" dirty="0" err="1" smtClean="0">
+                <a:solidFill>
+                  <a:schemeClr val="bg1"/>
+                </a:solidFill>
+              </a:rPr>
+              <a:t>Santina</a:t>
+            </a:r>
+            <a:r>
+              <a:rPr lang="en-US" sz="6000" dirty="0" smtClean="0">
+                <a:solidFill>
+                  <a:schemeClr val="bg1"/>
+                </a:solidFill>
+              </a:rPr>
+              <a:t> Lin</a:t>
+            </a:r>
+            <a:endParaRPr lang="en-US" sz="6000" baseline="30000" dirty="0">
+              <a:solidFill>
+                <a:schemeClr val="bg1"/>
+              </a:solidFill>
+            </a:endParaRPr>
           </a:p>
         </p:txBody>
       </p:sp>

</xml_diff>

<commit_message>
adding final changes to poster. adding PDF.
</commit_message>
<xml_diff>
--- a/poster/poster.pptx
+++ b/poster/poster.pptx
@@ -562,7 +562,7 @@
               <a:pPr>
                 <a:defRPr/>
               </a:pPr>
-              <a:t>4/6/2015</a:t>
+              <a:t>4/7/2015</a:t>
             </a:fld>
             <a:endParaRPr lang="en-US"/>
           </a:p>
@@ -4356,8 +4356,8 @@
         </p:blipFill>
         <p:spPr>
           <a:xfrm flipH="1">
-            <a:off x="34480498" y="69447"/>
-            <a:ext cx="7584618" cy="3726000"/>
+            <a:off x="34804348" y="69447"/>
+            <a:ext cx="7200000" cy="3726000"/>
           </a:xfrm>
           <a:prstGeom prst="rect">
             <a:avLst/>
@@ -4539,7 +4539,7 @@
         </p:nvSpPr>
         <p:spPr>
           <a:xfrm>
-            <a:off x="472296" y="28629225"/>
+            <a:off x="472296" y="28686375"/>
             <a:ext cx="13697201" cy="1123384"/>
           </a:xfrm>
           <a:prstGeom prst="rect">
@@ -4835,7 +4835,7 @@
         </p:nvSpPr>
         <p:spPr bwMode="auto">
           <a:xfrm>
-            <a:off x="406392" y="13662817"/>
+            <a:off x="406392" y="13700917"/>
             <a:ext cx="13822492" cy="1019160"/>
           </a:xfrm>
           <a:prstGeom prst="roundRect">
@@ -5026,7 +5026,7 @@
         </p:nvSpPr>
         <p:spPr>
           <a:xfrm>
-            <a:off x="470298" y="14800778"/>
+            <a:off x="470298" y="14838878"/>
             <a:ext cx="13721451" cy="1123384"/>
           </a:xfrm>
           <a:prstGeom prst="rect">
@@ -5295,7 +5295,7 @@
         </p:nvSpPr>
         <p:spPr bwMode="auto">
           <a:xfrm>
-            <a:off x="406389" y="19201834"/>
+            <a:off x="406389" y="19258984"/>
             <a:ext cx="13822493" cy="1030605"/>
           </a:xfrm>
           <a:prstGeom prst="roundRect">
@@ -5492,7 +5492,19 @@
               <a:rPr lang="en-US" sz="3200" dirty="0" smtClean="0">
                 <a:latin typeface="Arial" charset="0"/>
               </a:rPr>
-              <a:t> normalized beta values averaged across each CGI.</a:t>
+              <a:t> normalized beta values averaged across each CGI</a:t>
+            </a:r>
+            <a:r>
+              <a:rPr lang="en-US" sz="3200" baseline="30000" dirty="0" smtClean="0">
+                <a:latin typeface="Arial" charset="0"/>
+              </a:rPr>
+              <a:t>4</a:t>
+            </a:r>
+            <a:r>
+              <a:rPr lang="en-US" sz="3200" dirty="0" smtClean="0">
+                <a:latin typeface="Arial" charset="0"/>
+              </a:rPr>
+              <a:t>.</a:t>
             </a:r>
           </a:p>
         </p:txBody>
@@ -5598,8 +5610,8 @@
         </p:nvSpPr>
         <p:spPr>
           <a:xfrm>
-            <a:off x="468305" y="29932314"/>
-            <a:ext cx="13701192" cy="2354491"/>
+            <a:off x="468305" y="30084714"/>
+            <a:ext cx="13701192" cy="2354490"/>
           </a:xfrm>
           <a:prstGeom prst="rect">
             <a:avLst/>
@@ -5698,7 +5710,15 @@
             </a:r>
             <a:r>
               <a:rPr lang="en-CA" sz="1200" dirty="0"/>
-              <a:t>Mar 6;2014:464015</a:t>
+              <a:t>Mar 6</a:t>
+            </a:r>
+            <a:r>
+              <a:rPr lang="en-CA" sz="1200" dirty="0" smtClean="0"/>
+              <a:t>; 2014</a:t>
+            </a:r>
+            <a:r>
+              <a:rPr lang="en-CA" sz="1200" dirty="0"/>
+              <a:t>:464015</a:t>
             </a:r>
             <a:r>
               <a:rPr lang="en-CA" sz="1200" dirty="0" smtClean="0"/>
@@ -5747,7 +5767,19 @@
               <a:rPr lang="en-US" sz="1200" dirty="0">
                 <a:latin typeface="Arial" charset="0"/>
               </a:rPr>
-              <a:t>. 2014 Aug;147(2):418-29.e8.</a:t>
+              <a:t>. 2014 Aug</a:t>
+            </a:r>
+            <a:r>
+              <a:rPr lang="en-US" sz="1200" dirty="0" smtClean="0">
+                <a:latin typeface="Arial" charset="0"/>
+              </a:rPr>
+              <a:t>; 147</a:t>
+            </a:r>
+            <a:r>
+              <a:rPr lang="en-US" sz="1200" dirty="0">
+                <a:latin typeface="Arial" charset="0"/>
+              </a:rPr>
+              <a:t>(2):418-29.e8.</a:t>
             </a:r>
             <a:endParaRPr lang="en-CA" sz="1200" dirty="0">
               <a:latin typeface="Arial" charset="0"/>
@@ -5800,7 +5832,25 @@
               <a:rPr lang="pl-PL" sz="1200" dirty="0">
                 <a:latin typeface="Arial" charset="0"/>
               </a:rPr>
-              <a:t>Proc Natl Acad Sci U S A. 2010 Feb 23;107(8):</a:t>
+              <a:t>Proc Natl Acad Sci U S A. 2010 </a:t>
+            </a:r>
+            <a:r>
+              <a:rPr lang="pl-PL" sz="1200" dirty="0" err="1" smtClean="0">
+                <a:latin typeface="Arial" charset="0"/>
+              </a:rPr>
+              <a:t>Feb</a:t>
+            </a:r>
+            <a:r>
+              <a:rPr lang="pl-PL" sz="1200" dirty="0" smtClean="0">
+                <a:latin typeface="Arial" charset="0"/>
+              </a:rPr>
+              <a:t>; 107</a:t>
+            </a:r>
+            <a:r>
+              <a:rPr lang="pl-PL" sz="1200" dirty="0">
+                <a:latin typeface="Arial" charset="0"/>
+              </a:rPr>
+              <a:t>(8):</a:t>
             </a:r>
             <a:r>
               <a:rPr lang="pl-PL" sz="1200" dirty="0" smtClean="0">
@@ -5821,20 +5871,41 @@
               <a:defRPr/>
             </a:pPr>
             <a:r>
-              <a:rPr lang="en-CA" sz="1200" dirty="0" err="1">
+              <a:rPr lang="en-CA" sz="1200" dirty="0" err="1" smtClean="0">
                 <a:latin typeface="Arial" charset="0"/>
               </a:rPr>
               <a:t>Ostman</a:t>
+            </a:r>
+            <a:r>
+              <a:rPr lang="en-CA" sz="1200" dirty="0" smtClean="0">
+                <a:latin typeface="Arial" charset="0"/>
+              </a:rPr>
+              <a:t>, A. </a:t>
             </a:r>
             <a:r>
               <a:rPr lang="en-CA" sz="1200" dirty="0">
                 <a:latin typeface="Arial" charset="0"/>
               </a:rPr>
-              <a:t> A, et al. "Protein-tyrosine phosphatases and cancer." Nat Rev Cancer. 2006 Apr;6(4):307-20.</a:t>
-            </a:r>
-            <a:endParaRPr lang="en-CA" sz="1200" dirty="0" smtClean="0">
-              <a:latin typeface="Arial" charset="0"/>
-            </a:endParaRPr>
+              <a:t>et al. "Protein-tyrosine phosphatases and cancer." Nat Rev Cancer. 2006 Apr</a:t>
+            </a:r>
+            <a:r>
+              <a:rPr lang="en-CA" sz="1200" dirty="0" smtClean="0">
+                <a:latin typeface="Arial" charset="0"/>
+              </a:rPr>
+              <a:t>; 6</a:t>
+            </a:r>
+            <a:r>
+              <a:rPr lang="en-CA" sz="1200" dirty="0">
+                <a:latin typeface="Arial" charset="0"/>
+              </a:rPr>
+              <a:t>(4):307-20</a:t>
+            </a:r>
+            <a:r>
+              <a:rPr lang="en-CA" sz="1200" dirty="0" smtClean="0">
+                <a:latin typeface="Arial" charset="0"/>
+              </a:rPr>
+              <a:t>.</a:t>
+            </a:r>
           </a:p>
           <a:p>
             <a:pPr marL="457200" indent="-457200" algn="just">
@@ -5842,44 +5913,64 @@
               <a:defRPr/>
             </a:pPr>
             <a:r>
-              <a:rPr lang="en-CA" sz="1200" dirty="0"/>
-              <a:t>Cabrera, C. M., et al. "Total loss of MHC class I in colorectal tumors can be explained by two molecular pathways: </a:t>
-            </a:r>
-            <a:r>
-              <a:rPr lang="el-GR" sz="1200" dirty="0"/>
-              <a:t>β2‐</a:t>
-            </a:r>
-            <a:r>
-              <a:rPr lang="en-CA" sz="1200" dirty="0" err="1"/>
-              <a:t>microglobulin</a:t>
-            </a:r>
-            <a:r>
-              <a:rPr lang="en-CA" sz="1200" dirty="0"/>
-              <a:t> inactivation in MSI‐positive tumors and LMP7/TAP2 </a:t>
-            </a:r>
-            <a:r>
-              <a:rPr lang="en-CA" sz="1200" dirty="0" err="1"/>
-              <a:t>downregulation</a:t>
-            </a:r>
-            <a:r>
-              <a:rPr lang="en-CA" sz="1200" dirty="0"/>
-              <a:t> in MSI‐negative </a:t>
-            </a:r>
-            <a:r>
-              <a:rPr lang="en-CA" sz="1200" dirty="0" err="1"/>
-              <a:t>tumors."</a:t>
-            </a:r>
-            <a:r>
-              <a:rPr lang="en-CA" sz="1200" i="1" dirty="0" err="1"/>
-              <a:t>Tissue</a:t>
-            </a:r>
-            <a:r>
-              <a:rPr lang="en-CA" sz="1200" i="1" dirty="0"/>
-              <a:t> antigens</a:t>
-            </a:r>
-            <a:r>
-              <a:rPr lang="en-CA" sz="1200" dirty="0"/>
-              <a:t> 61.3 (2003): 211-219.</a:t>
+              <a:rPr lang="en-CA" sz="1200" dirty="0" err="1" smtClean="0">
+                <a:latin typeface="Arial" charset="0"/>
+              </a:rPr>
+              <a:t>Derynck</a:t>
+            </a:r>
+            <a:r>
+              <a:rPr lang="en-CA" sz="1200" dirty="0" smtClean="0">
+                <a:latin typeface="Arial" charset="0"/>
+              </a:rPr>
+              <a:t>, R. et al. “ TGF-β </a:t>
+            </a:r>
+            <a:r>
+              <a:rPr lang="en-CA" sz="1200" dirty="0" err="1" smtClean="0">
+                <a:latin typeface="Arial" charset="0"/>
+              </a:rPr>
+              <a:t>signaling</a:t>
+            </a:r>
+            <a:r>
+              <a:rPr lang="en-CA" sz="1200" dirty="0" smtClean="0">
+                <a:latin typeface="Arial" charset="0"/>
+              </a:rPr>
+              <a:t> in </a:t>
+            </a:r>
+            <a:r>
+              <a:rPr lang="en-CA" sz="1200" dirty="0" err="1" smtClean="0">
+                <a:latin typeface="Arial" charset="0"/>
+              </a:rPr>
+              <a:t>tumor</a:t>
+            </a:r>
+            <a:r>
+              <a:rPr lang="en-CA" sz="1200" dirty="0" smtClean="0">
+                <a:latin typeface="Arial" charset="0"/>
+              </a:rPr>
+              <a:t> suppression and cancer progression.” Nat Genet. 2001 Oct; 29(2): 117-29.</a:t>
+            </a:r>
+          </a:p>
+          <a:p>
+            <a:pPr marL="457200" indent="-457200" algn="just">
+              <a:buAutoNum type="arabicPeriod"/>
+              <a:defRPr/>
+            </a:pPr>
+            <a:r>
+              <a:rPr lang="en-US" sz="1200" dirty="0" smtClean="0">
+                <a:latin typeface="Arial" charset="0"/>
+              </a:rPr>
+              <a:t>Garcia-Lora, A. et al. “MHC Class I Antigens, Immune Surveillance, and </a:t>
+            </a:r>
+            <a:r>
+              <a:rPr lang="en-US" sz="1200" dirty="0" err="1" smtClean="0">
+                <a:latin typeface="Arial" charset="0"/>
+              </a:rPr>
+              <a:t>Tumour</a:t>
+            </a:r>
+            <a:r>
+              <a:rPr lang="en-US" sz="1200" dirty="0" smtClean="0">
+                <a:latin typeface="Arial" charset="0"/>
+              </a:rPr>
+              <a:t> Immune Escape.” J Cell Physiol. 2003 Jun; 195(3): 346-55.</a:t>
             </a:r>
             <a:endParaRPr lang="en-US" sz="1200" dirty="0">
               <a:latin typeface="Arial" charset="0"/>
@@ -5908,7 +5999,7 @@
         </p:blipFill>
         <p:spPr>
           <a:xfrm>
-            <a:off x="928103" y="20419797"/>
+            <a:off x="928103" y="20476947"/>
             <a:ext cx="13137724" cy="8171328"/>
           </a:xfrm>
           <a:prstGeom prst="rect">
@@ -5925,13 +6016,13 @@
           <p:nvPr>
             <p:extLst>
               <p:ext uri="{D42A27DB-BD31-4B8C-83A1-F6EECF244321}">
-                <p14:modId xmlns:p14="http://schemas.microsoft.com/office/powerpoint/2010/main" val="1184645090"/>
+                <p14:modId xmlns:p14="http://schemas.microsoft.com/office/powerpoint/2010/main" val="318034354"/>
               </p:ext>
             </p:extLst>
           </p:nvPr>
         </p:nvGraphicFramePr>
         <p:xfrm>
-          <a:off x="680028" y="16055346"/>
+          <a:off x="680028" y="16093446"/>
           <a:ext cx="13360399" cy="2743200"/>
         </p:xfrm>
         <a:graphic>
@@ -7233,7 +7324,7 @@
         </p:nvSpPr>
         <p:spPr bwMode="auto">
           <a:xfrm>
-            <a:off x="468306" y="20264972"/>
+            <a:off x="468306" y="20322122"/>
             <a:ext cx="13701192" cy="9464182"/>
           </a:xfrm>
           <a:prstGeom prst="rect">
@@ -7298,7 +7389,7 @@
         </p:nvSpPr>
         <p:spPr bwMode="auto">
           <a:xfrm>
-            <a:off x="495276" y="14717833"/>
+            <a:off x="495276" y="14755933"/>
             <a:ext cx="13674221" cy="4341125"/>
           </a:xfrm>
           <a:prstGeom prst="rect">
@@ -7694,7 +7785,19 @@
               <a:rPr lang="en-US" sz="3200" dirty="0">
                 <a:latin typeface="Arial" charset="0"/>
               </a:rPr>
-              <a:t>Top 3 differentially methylated and 3 non-differentially methylated CGIs for each pair-wise group comparison</a:t>
+              <a:t>Top 3 differentially methylated and 3 non-differentially methylated CGIs for each </a:t>
+            </a:r>
+            <a:r>
+              <a:rPr lang="en-US" sz="3200" dirty="0" smtClean="0">
+                <a:latin typeface="Arial" charset="0"/>
+              </a:rPr>
+              <a:t>pairwise </a:t>
+            </a:r>
+            <a:r>
+              <a:rPr lang="en-US" sz="3200" dirty="0">
+                <a:latin typeface="Arial" charset="0"/>
+              </a:rPr>
+              <a:t>group comparison</a:t>
             </a:r>
             <a:r>
               <a:rPr lang="en-US" sz="3200" dirty="0" smtClean="0">
@@ -7920,7 +8023,7 @@
           <p:nvPr>
             <p:extLst>
               <p:ext uri="{D42A27DB-BD31-4B8C-83A1-F6EECF244321}">
-                <p14:modId xmlns:p14="http://schemas.microsoft.com/office/powerpoint/2010/main" val="3252565837"/>
+                <p14:modId xmlns:p14="http://schemas.microsoft.com/office/powerpoint/2010/main" val="1350445863"/>
               </p:ext>
             </p:extLst>
           </p:nvPr>
@@ -8447,7 +8550,7 @@
                           <a:latin typeface="Arial" panose="020B0604020202020204" pitchFamily="34" charset="0"/>
                           <a:cs typeface="Arial" panose="020B0604020202020204" pitchFamily="34" charset="0"/>
                         </a:rPr>
-                        <a:t>phosphatase</a:t>
+                        <a:t>phosphatase (TR-PTP)</a:t>
                       </a:r>
                       <a:r>
                         <a:rPr lang="en-CA" sz="2200" u="none" strike="noStrike" baseline="0" dirty="0" smtClean="0">
@@ -9081,11 +9184,66 @@
               <a:defRPr/>
             </a:pPr>
             <a:r>
-              <a:rPr lang="en-US" sz="3200" dirty="0" smtClean="0">
-                <a:latin typeface="Arial" charset="0"/>
-              </a:rPr>
-              <a:t>1.a</a:t>
-            </a:r>
+              <a:rPr lang="en-US" sz="3200" dirty="0" smtClean="0"/>
+              <a:t>TR</a:t>
+            </a:r>
+            <a:r>
+              <a:rPr lang="en-US" sz="3200" dirty="0"/>
+              <a:t>-</a:t>
+            </a:r>
+            <a:r>
+              <a:rPr lang="en-US" sz="3200" dirty="0" smtClean="0"/>
+              <a:t>PTPs </a:t>
+            </a:r>
+            <a:r>
+              <a:rPr lang="en-US" sz="3200" dirty="0"/>
+              <a:t>carry out </a:t>
+            </a:r>
+            <a:r>
+              <a:rPr lang="en-US" sz="3200" dirty="0" err="1"/>
+              <a:t>tumour</a:t>
+            </a:r>
+            <a:r>
+              <a:rPr lang="en-US" sz="3200" dirty="0"/>
+              <a:t>-</a:t>
+            </a:r>
+            <a:r>
+              <a:rPr lang="en-US" sz="3200" dirty="0" smtClean="0"/>
+              <a:t>suppressing </a:t>
+            </a:r>
+            <a:r>
+              <a:rPr lang="en-US" sz="3200" dirty="0"/>
+              <a:t>activity </a:t>
+            </a:r>
+            <a:r>
+              <a:rPr lang="en-US" sz="3200" dirty="0" smtClean="0"/>
+              <a:t>through antagonizing RTK signaling and inactivation </a:t>
+            </a:r>
+            <a:r>
+              <a:rPr lang="en-US" sz="3200" dirty="0"/>
+              <a:t>of TR-PTP </a:t>
+            </a:r>
+            <a:r>
+              <a:rPr lang="en-US" sz="3200" dirty="0" smtClean="0"/>
+              <a:t>has </a:t>
+            </a:r>
+            <a:r>
+              <a:rPr lang="en-US" sz="3200" dirty="0"/>
+              <a:t>been implicated in </a:t>
+            </a:r>
+            <a:r>
+              <a:rPr lang="en-US" sz="3200" dirty="0" smtClean="0"/>
+              <a:t>CRC</a:t>
+            </a:r>
+            <a:r>
+              <a:rPr lang="en-US" sz="3200" baseline="30000" dirty="0"/>
+              <a:t>5</a:t>
+            </a:r>
+            <a:r>
+              <a:rPr lang="en-US" sz="3200" dirty="0" smtClean="0"/>
+              <a:t>. </a:t>
+            </a:r>
+            <a:endParaRPr lang="en-US" sz="3200" dirty="0"/>
           </a:p>
           <a:p>
             <a:pPr marL="457200" indent="-457200" algn="just">
@@ -9094,20 +9252,32 @@
               <a:defRPr/>
             </a:pPr>
             <a:r>
-              <a:rPr lang="en-CA" sz="3200" dirty="0"/>
-              <a:t>Transmembrane receptor protein tyrosine phosphatase is a group of multifunctional proteins regulating signal transduction. Enrichment of this function is relevant to cancer progression, more importantly PTPRO has been implicated in </a:t>
-            </a:r>
-            <a:r>
-              <a:rPr lang="en-CA" sz="3200" dirty="0" smtClean="0"/>
+              <a:rPr lang="en-US" sz="3200" dirty="0" smtClean="0"/>
+              <a:t>SMAD </a:t>
+            </a:r>
+            <a:r>
+              <a:rPr lang="en-US" sz="3200" dirty="0"/>
+              <a:t>proteins </a:t>
+            </a:r>
+            <a:r>
+              <a:rPr lang="en-US" sz="3200" dirty="0" smtClean="0"/>
+              <a:t>are transcriptional activators and their suppression leads to the progression of various </a:t>
+            </a:r>
+            <a:r>
+              <a:rPr lang="en-US" sz="3200" dirty="0"/>
+              <a:t>cancer types including </a:t>
+            </a:r>
+            <a:r>
+              <a:rPr lang="en-US" sz="3200" dirty="0" smtClean="0"/>
               <a:t>CRC</a:t>
             </a:r>
             <a:r>
-              <a:rPr lang="en-CA" sz="3200" baseline="30000" dirty="0" smtClean="0"/>
-              <a:t>5</a:t>
-            </a:r>
-            <a:r>
-              <a:rPr lang="en-CA" sz="3200" dirty="0" smtClean="0"/>
-              <a:t>.</a:t>
+              <a:rPr lang="en-US" sz="3200" baseline="30000" dirty="0"/>
+              <a:t>6</a:t>
+            </a:r>
+            <a:r>
+              <a:rPr lang="en-US" sz="3200" dirty="0" smtClean="0"/>
+              <a:t>. </a:t>
             </a:r>
           </a:p>
           <a:p>
@@ -9117,65 +9287,49 @@
               <a:defRPr/>
             </a:pPr>
             <a:r>
-              <a:rPr lang="en-CA" sz="3200" dirty="0" smtClean="0"/>
-              <a:t>The </a:t>
-            </a:r>
-            <a:r>
-              <a:rPr lang="en-CA" sz="3200" dirty="0"/>
-              <a:t>MHC </a:t>
-            </a:r>
-            <a:r>
-              <a:rPr lang="en-CA" sz="3200" dirty="0" smtClean="0"/>
-              <a:t>class </a:t>
-            </a:r>
-            <a:r>
-              <a:rPr lang="en-CA" sz="3200" dirty="0"/>
-              <a:t>I molecules </a:t>
-            </a:r>
-            <a:r>
-              <a:rPr lang="en-CA" sz="3200" dirty="0" smtClean="0"/>
-              <a:t>invoke </a:t>
-            </a:r>
-            <a:r>
-              <a:rPr lang="en-CA" sz="3200" dirty="0"/>
-              <a:t>immune </a:t>
-            </a:r>
-            <a:r>
-              <a:rPr lang="en-CA" sz="3200" dirty="0" smtClean="0"/>
-              <a:t>response </a:t>
-            </a:r>
-            <a:r>
-              <a:rPr lang="en-CA" sz="3200" dirty="0"/>
-              <a:t>by binding to foreign peptides and presenting </a:t>
-            </a:r>
-            <a:r>
-              <a:rPr lang="en-CA" sz="3200" dirty="0" smtClean="0"/>
-              <a:t>them </a:t>
-            </a:r>
-            <a:r>
-              <a:rPr lang="en-CA" sz="3200" dirty="0"/>
-              <a:t>to T </a:t>
-            </a:r>
-            <a:r>
-              <a:rPr lang="en-CA" sz="3200" dirty="0" smtClean="0"/>
-              <a:t>cells. </a:t>
-            </a:r>
-            <a:r>
-              <a:rPr lang="en-CA" sz="3200" dirty="0"/>
-              <a:t>Both reduced and total lost of MHC class I expression have been observed in </a:t>
-            </a:r>
-            <a:r>
-              <a:rPr lang="en-CA" sz="3200" dirty="0" smtClean="0"/>
-              <a:t>CRC</a:t>
-            </a:r>
-            <a:r>
-              <a:rPr lang="en-CA" sz="3200" baseline="30000" dirty="0" smtClean="0"/>
-              <a:t>6</a:t>
-            </a:r>
-            <a:r>
-              <a:rPr lang="en-CA" sz="3200" dirty="0" smtClean="0"/>
-              <a:t>.</a:t>
-            </a:r>
+              <a:rPr lang="en-US" sz="3200" dirty="0" smtClean="0"/>
+              <a:t>Most cancer cells express </a:t>
+            </a:r>
+            <a:r>
+              <a:rPr lang="en-US" sz="3200" dirty="0"/>
+              <a:t>low levels of MHC class I molecules to evade immune </a:t>
+            </a:r>
+            <a:r>
+              <a:rPr lang="en-US" sz="3200" dirty="0" smtClean="0"/>
+              <a:t>clearance</a:t>
+            </a:r>
+            <a:r>
+              <a:rPr lang="en-US" sz="3200" baseline="30000" dirty="0"/>
+              <a:t>7</a:t>
+            </a:r>
+            <a:r>
+              <a:rPr lang="en-US" sz="3200" dirty="0" smtClean="0"/>
+              <a:t>. </a:t>
+            </a:r>
+          </a:p>
+          <a:p>
+            <a:pPr marL="457200" indent="-457200" algn="just">
+              <a:buFont typeface="Arial" panose="020B0604020202020204" pitchFamily="34" charset="0"/>
+              <a:buChar char="•"/>
+              <a:defRPr/>
+            </a:pPr>
+            <a:r>
+              <a:rPr lang="en-US" sz="3200" dirty="0" smtClean="0"/>
+              <a:t>Enrichment of GO </a:t>
+            </a:r>
+            <a:r>
+              <a:rPr lang="en-US" sz="3200" dirty="0"/>
+              <a:t>terms </a:t>
+            </a:r>
+            <a:r>
+              <a:rPr lang="en-US" sz="3200" dirty="0" smtClean="0"/>
+              <a:t>like molecular function and binding (not shown) are uninformative and likely caused by over-citations</a:t>
+            </a:r>
+            <a:r>
+              <a:rPr lang="en-US" sz="3200" b="1" dirty="0" smtClean="0"/>
+              <a:t>. </a:t>
+            </a:r>
+            <a:endParaRPr lang="en-US" sz="3200" dirty="0"/>
           </a:p>
         </p:txBody>
       </p:sp>
@@ -9960,7 +10114,7 @@
         <p:spPr>
           <a:xfrm>
             <a:off x="29275964" y="28900741"/>
-            <a:ext cx="14136520" cy="1569660"/>
+            <a:ext cx="14136520" cy="3046988"/>
           </a:xfrm>
           <a:prstGeom prst="rect">
             <a:avLst/>
@@ -9976,15 +10130,7 @@
             <a:pPr algn="just"/>
             <a:r>
               <a:rPr lang="en-CA" sz="3200" dirty="0" smtClean="0"/>
-              <a:t>We identified aberrant </a:t>
-            </a:r>
-            <a:r>
-              <a:rPr lang="en-CA" sz="3200" dirty="0"/>
-              <a:t>methylation of </a:t>
-            </a:r>
-            <a:r>
-              <a:rPr lang="en-CA" sz="3200" dirty="0" smtClean="0"/>
-              <a:t>34 CGIs </a:t>
+              <a:t>We identified 34 DM CGIs </a:t>
             </a:r>
             <a:r>
               <a:rPr lang="en-CA" sz="3200" dirty="0"/>
@@ -9992,7 +10138,7 @@
             </a:r>
             <a:r>
               <a:rPr lang="en-CA" sz="3200" dirty="0" smtClean="0"/>
-              <a:t>21 genes in CRC progression. These genes could potentially be markers for disease monitoring of CRC.</a:t>
+              <a:t>21 genes in our pairwise comparisons between sample groups. Enriched functions are implicated in progression of various cancer types including CRC. Given that these DM CGIs are also identified in adenomas compared to normal mucosa, these aberrant methylation patterns could be markers for early detection, risk assessment, and disease monitoring of CRC.</a:t>
             </a:r>
             <a:endParaRPr lang="en-CA" sz="3200" dirty="0"/>
           </a:p>
@@ -10002,7 +10148,7 @@
         <p:nvPicPr>
           <p:cNvPr id="79" name="Picture 78"/>
           <p:cNvPicPr>
-            <a:picLocks noChangeAspect="1"/>
+            <a:picLocks/>
           </p:cNvPicPr>
           <p:nvPr/>
         </p:nvPicPr>
@@ -10039,8 +10185,8 @@
         </p:blipFill>
         <p:spPr>
           <a:xfrm>
-            <a:off x="2009541" y="40356"/>
-            <a:ext cx="7613430" cy="3724665"/>
+            <a:off x="2142891" y="40356"/>
+            <a:ext cx="7200000" cy="3724665"/>
           </a:xfrm>
           <a:prstGeom prst="rect">
             <a:avLst/>
@@ -10057,7 +10203,7 @@
         </p:nvSpPr>
         <p:spPr bwMode="auto">
           <a:xfrm>
-            <a:off x="2916076" y="554511"/>
+            <a:off x="2916076" y="402111"/>
             <a:ext cx="40068589" cy="1231106"/>
           </a:xfrm>
           <a:prstGeom prst="rect">
@@ -10136,8 +10282,8 @@
         </p:nvSpPr>
         <p:spPr>
           <a:xfrm>
-            <a:off x="0" y="2244625"/>
-            <a:ext cx="43891200" cy="1054942"/>
+            <a:off x="0" y="1825525"/>
+            <a:ext cx="43891200" cy="1015663"/>
           </a:xfrm>
           <a:prstGeom prst="rect">
             <a:avLst/>
@@ -10298,11 +10444,6 @@
               </a:rPr>
               <a:t> Lin</a:t>
             </a:r>
-            <a:endParaRPr lang="en-US" sz="6000" baseline="30000" dirty="0">
-              <a:solidFill>
-                <a:schemeClr val="bg1"/>
-              </a:solidFill>
-            </a:endParaRPr>
           </a:p>
         </p:txBody>
       </p:sp>
@@ -10470,6 +10611,53 @@
               <a:t>FDR &lt; 9.51e-6</a:t>
             </a:r>
             <a:endParaRPr lang="en-CA" sz="2000" b="1" dirty="0"/>
+          </a:p>
+        </p:txBody>
+      </p:sp>
+      <p:sp>
+        <p:nvSpPr>
+          <p:cNvPr id="8" name="TextBox 7"/>
+          <p:cNvSpPr txBox="1"/>
+          <p:nvPr/>
+        </p:nvSpPr>
+        <p:spPr>
+          <a:xfrm>
+            <a:off x="0" y="3001882"/>
+            <a:ext cx="43891200" cy="707886"/>
+          </a:xfrm>
+          <a:prstGeom prst="rect">
+            <a:avLst/>
+          </a:prstGeom>
+          <a:noFill/>
+        </p:spPr>
+        <p:txBody>
+          <a:bodyPr wrap="square" rtlCol="0" anchor="ctr">
+            <a:spAutoFit/>
+          </a:bodyPr>
+          <a:lstStyle/>
+          <a:p>
+            <a:pPr algn="ctr"/>
+            <a:r>
+              <a:rPr lang="en-US" sz="4000" dirty="0">
+                <a:solidFill>
+                  <a:schemeClr val="bg1"/>
+                </a:solidFill>
+              </a:rPr>
+              <a:t>The University of British Columbia, Vancouver, BC, </a:t>
+            </a:r>
+            <a:r>
+              <a:rPr lang="en-US" sz="4000" dirty="0" smtClean="0">
+                <a:solidFill>
+                  <a:schemeClr val="bg1"/>
+                </a:solidFill>
+              </a:rPr>
+              <a:t>Canada</a:t>
+            </a:r>
+            <a:endParaRPr lang="en-CA" sz="4000" dirty="0">
+              <a:solidFill>
+                <a:schemeClr val="bg1"/>
+              </a:solidFill>
+            </a:endParaRPr>
           </a:p>
         </p:txBody>
       </p:sp>

</xml_diff>